<commit_message>
new paper and meeting notes
</commit_message>
<xml_diff>
--- a/MeetingNotes.pptx
+++ b/MeetingNotes.pptx
@@ -10,6 +10,9 @@
     <p:sldId id="258" r:id="rId4"/>
     <p:sldId id="259" r:id="rId5"/>
     <p:sldId id="260" r:id="rId6"/>
+    <p:sldId id="261" r:id="rId7"/>
+    <p:sldId id="262" r:id="rId8"/>
+    <p:sldId id="263" r:id="rId9"/>
   </p:sldIdLst>
   <p:sldSz cx="9144000" cy="5715000" type="screen16x10"/>
   <p:notesSz cx="6858000" cy="9144000"/>
@@ -633,7 +636,7 @@
           <a:p>
             <a:fld id="{907AEC89-51F8-8C49-8F5C-7B8970AE8955}" type="datetimeFigureOut">
               <a:rPr lang="de-DE" smtClean="0"/>
-              <a:t>11.01.21</a:t>
+              <a:t>25.01.21</a:t>
             </a:fld>
             <a:endParaRPr lang="en-US"/>
           </a:p>
@@ -803,7 +806,7 @@
           <a:p>
             <a:fld id="{907AEC89-51F8-8C49-8F5C-7B8970AE8955}" type="datetimeFigureOut">
               <a:rPr lang="de-DE" smtClean="0"/>
-              <a:t>11.01.21</a:t>
+              <a:t>25.01.21</a:t>
             </a:fld>
             <a:endParaRPr lang="en-US"/>
           </a:p>
@@ -983,7 +986,7 @@
           <a:p>
             <a:fld id="{907AEC89-51F8-8C49-8F5C-7B8970AE8955}" type="datetimeFigureOut">
               <a:rPr lang="de-DE" smtClean="0"/>
-              <a:t>11.01.21</a:t>
+              <a:t>25.01.21</a:t>
             </a:fld>
             <a:endParaRPr lang="en-US"/>
           </a:p>
@@ -1101,7 +1104,7 @@
           <a:p>
             <a:fld id="{907AEC89-51F8-8C49-8F5C-7B8970AE8955}" type="datetimeFigureOut">
               <a:rPr lang="de-DE" smtClean="0"/>
-              <a:t>11.01.21</a:t>
+              <a:t>25.01.21</a:t>
             </a:fld>
             <a:endParaRPr lang="en-US"/>
           </a:p>
@@ -1421,7 +1424,7 @@
           <a:p>
             <a:fld id="{907AEC89-51F8-8C49-8F5C-7B8970AE8955}" type="datetimeFigureOut">
               <a:rPr lang="de-DE" smtClean="0"/>
-              <a:t>11.01.21</a:t>
+              <a:t>25.01.21</a:t>
             </a:fld>
             <a:endParaRPr lang="en-US"/>
           </a:p>
@@ -1973,7 +1976,7 @@
           <a:p>
             <a:fld id="{907AEC89-51F8-8C49-8F5C-7B8970AE8955}" type="datetimeFigureOut">
               <a:rPr lang="de-DE" smtClean="0"/>
-              <a:t>11.01.21</a:t>
+              <a:t>25.01.21</a:t>
             </a:fld>
             <a:endParaRPr lang="en-US"/>
           </a:p>
@@ -2395,7 +2398,7 @@
           <a:p>
             <a:fld id="{907AEC89-51F8-8C49-8F5C-7B8970AE8955}" type="datetimeFigureOut">
               <a:rPr lang="de-DE" smtClean="0"/>
-              <a:t>11.01.21</a:t>
+              <a:t>25.01.21</a:t>
             </a:fld>
             <a:endParaRPr lang="en-US"/>
           </a:p>
@@ -2513,7 +2516,7 @@
           <a:p>
             <a:fld id="{907AEC89-51F8-8C49-8F5C-7B8970AE8955}" type="datetimeFigureOut">
               <a:rPr lang="de-DE" smtClean="0"/>
-              <a:t>11.01.21</a:t>
+              <a:t>25.01.21</a:t>
             </a:fld>
             <a:endParaRPr lang="en-US"/>
           </a:p>
@@ -2608,7 +2611,7 @@
           <a:p>
             <a:fld id="{907AEC89-51F8-8C49-8F5C-7B8970AE8955}" type="datetimeFigureOut">
               <a:rPr lang="de-DE" smtClean="0"/>
-              <a:t>11.01.21</a:t>
+              <a:t>25.01.21</a:t>
             </a:fld>
             <a:endParaRPr lang="en-US"/>
           </a:p>
@@ -2885,7 +2888,7 @@
           <a:p>
             <a:fld id="{907AEC89-51F8-8C49-8F5C-7B8970AE8955}" type="datetimeFigureOut">
               <a:rPr lang="de-DE" smtClean="0"/>
-              <a:t>11.01.21</a:t>
+              <a:t>25.01.21</a:t>
             </a:fld>
             <a:endParaRPr lang="en-US"/>
           </a:p>
@@ -3098,7 +3101,7 @@
           <a:p>
             <a:fld id="{907AEC89-51F8-8C49-8F5C-7B8970AE8955}" type="datetimeFigureOut">
               <a:rPr lang="de-DE" smtClean="0"/>
-              <a:t>11.01.21</a:t>
+              <a:t>25.01.21</a:t>
             </a:fld>
             <a:endParaRPr lang="en-US"/>
           </a:p>
@@ -5757,11 +5760,7 @@
             </a:r>
             <a:r>
               <a:rPr lang="en-US" dirty="0" smtClean="0"/>
-              <a:t> </a:t>
-            </a:r>
-            <a:r>
-              <a:rPr lang="en-US" dirty="0" smtClean="0"/>
-              <a:t>die linear </a:t>
+              <a:t> die linear </a:t>
             </a:r>
             <a:r>
               <a:rPr lang="en-US" dirty="0" err="1" smtClean="0"/>
@@ -6344,6 +6343,1749 @@
     <p:extLst>
       <p:ext uri="{BB962C8B-B14F-4D97-AF65-F5344CB8AC3E}">
         <p14:creationId xmlns:p14="http://schemas.microsoft.com/office/powerpoint/2010/main" val="3647875010"/>
+      </p:ext>
+    </p:extLst>
+  </p:cSld>
+  <p:clrMapOvr>
+    <a:masterClrMapping/>
+  </p:clrMapOvr>
+</p:sld>
+</file>
+
+<file path=ppt/slides/slide6.xml><?xml version="1.0" encoding="utf-8"?>
+<p:sld xmlns:a="http://schemas.openxmlformats.org/drawingml/2006/main" xmlns:r="http://schemas.openxmlformats.org/officeDocument/2006/relationships" xmlns:p="http://schemas.openxmlformats.org/presentationml/2006/main">
+  <p:cSld>
+    <p:spTree>
+      <p:nvGrpSpPr>
+        <p:cNvPr id="1" name=""/>
+        <p:cNvGrpSpPr/>
+        <p:nvPr/>
+      </p:nvGrpSpPr>
+      <p:grpSpPr>
+        <a:xfrm>
+          <a:off x="0" y="0"/>
+          <a:ext cx="0" cy="0"/>
+          <a:chOff x="0" y="0"/>
+          <a:chExt cx="0" cy="0"/>
+        </a:xfrm>
+      </p:grpSpPr>
+      <p:sp>
+        <p:nvSpPr>
+          <p:cNvPr id="2" name="Inhaltsplatzhalter 1"/>
+          <p:cNvSpPr>
+            <a:spLocks noGrp="1"/>
+          </p:cNvSpPr>
+          <p:nvPr>
+            <p:ph sz="half" idx="1"/>
+          </p:nvPr>
+        </p:nvSpPr>
+        <p:spPr/>
+        <p:txBody>
+          <a:bodyPr/>
+          <a:lstStyle/>
+          <a:p>
+            <a:r>
+              <a:rPr lang="en-US" dirty="0" smtClean="0"/>
+              <a:t>Lit review </a:t>
+            </a:r>
+            <a:r>
+              <a:rPr lang="en-US" dirty="0" err="1" smtClean="0"/>
+              <a:t>dauert</a:t>
+            </a:r>
+            <a:r>
+              <a:rPr lang="en-US" dirty="0" smtClean="0"/>
+              <a:t> </a:t>
+            </a:r>
+            <a:r>
+              <a:rPr lang="en-US" dirty="0" err="1" smtClean="0"/>
+              <a:t>noch</a:t>
+            </a:r>
+            <a:r>
+              <a:rPr lang="en-US" dirty="0" smtClean="0"/>
+              <a:t> </a:t>
+            </a:r>
+            <a:r>
+              <a:rPr lang="en-US" dirty="0" err="1" smtClean="0"/>
+              <a:t>ein</a:t>
+            </a:r>
+            <a:r>
+              <a:rPr lang="en-US" dirty="0" smtClean="0"/>
+              <a:t> </a:t>
+            </a:r>
+            <a:r>
+              <a:rPr lang="en-US" dirty="0" err="1" smtClean="0"/>
+              <a:t>bisschen</a:t>
+            </a:r>
+            <a:r>
+              <a:rPr lang="en-US" dirty="0" smtClean="0"/>
+              <a:t> (</a:t>
+            </a:r>
+            <a:r>
+              <a:rPr lang="en-US" dirty="0" err="1" smtClean="0"/>
+              <a:t>mache</a:t>
+            </a:r>
+            <a:r>
+              <a:rPr lang="en-US" dirty="0" smtClean="0"/>
+              <a:t> das parallel </a:t>
+            </a:r>
+            <a:r>
+              <a:rPr lang="en-US" dirty="0" err="1" smtClean="0"/>
+              <a:t>zum</a:t>
+            </a:r>
+            <a:r>
+              <a:rPr lang="en-US" dirty="0" smtClean="0"/>
+              <a:t> </a:t>
+            </a:r>
+            <a:r>
+              <a:rPr lang="en-US" dirty="0" err="1" smtClean="0"/>
+              <a:t>Methoden</a:t>
+            </a:r>
+            <a:r>
+              <a:rPr lang="en-US" dirty="0" smtClean="0"/>
+              <a:t> </a:t>
+            </a:r>
+            <a:r>
+              <a:rPr lang="en-US" dirty="0" err="1" smtClean="0"/>
+              <a:t>ausdenken</a:t>
+            </a:r>
+            <a:r>
+              <a:rPr lang="en-US" dirty="0" smtClean="0"/>
+              <a:t>): </a:t>
+            </a:r>
+            <a:r>
+              <a:rPr lang="en-US" dirty="0" err="1" smtClean="0"/>
+              <a:t>sollte</a:t>
+            </a:r>
+            <a:r>
+              <a:rPr lang="en-US" dirty="0" smtClean="0"/>
+              <a:t> </a:t>
+            </a:r>
+            <a:r>
+              <a:rPr lang="en-US" dirty="0" err="1" smtClean="0"/>
+              <a:t>aber</a:t>
+            </a:r>
+            <a:r>
+              <a:rPr lang="en-US" dirty="0" smtClean="0"/>
+              <a:t> </a:t>
+            </a:r>
+            <a:r>
+              <a:rPr lang="en-US" dirty="0" err="1" smtClean="0"/>
+              <a:t>diese</a:t>
+            </a:r>
+            <a:r>
+              <a:rPr lang="en-US" dirty="0" smtClean="0"/>
+              <a:t> </a:t>
+            </a:r>
+            <a:r>
+              <a:rPr lang="en-US" dirty="0" err="1" smtClean="0"/>
+              <a:t>Woche</a:t>
+            </a:r>
+            <a:r>
+              <a:rPr lang="en-US" dirty="0" smtClean="0"/>
+              <a:t> </a:t>
+            </a:r>
+            <a:r>
+              <a:rPr lang="en-US" dirty="0" err="1" smtClean="0"/>
+              <a:t>fertig</a:t>
+            </a:r>
+            <a:r>
+              <a:rPr lang="en-US" dirty="0" smtClean="0"/>
+              <a:t> </a:t>
+            </a:r>
+            <a:r>
+              <a:rPr lang="en-US" dirty="0" err="1" smtClean="0"/>
+              <a:t>werden</a:t>
+            </a:r>
+            <a:r>
+              <a:rPr lang="en-US" dirty="0" smtClean="0"/>
+              <a:t> </a:t>
+            </a:r>
+          </a:p>
+          <a:p>
+            <a:r>
+              <a:rPr lang="en-US" dirty="0" err="1" smtClean="0"/>
+              <a:t>Hab</a:t>
+            </a:r>
+            <a:r>
+              <a:rPr lang="en-US" dirty="0" smtClean="0"/>
+              <a:t> </a:t>
+            </a:r>
+            <a:r>
+              <a:rPr lang="en-US" dirty="0" err="1" smtClean="0"/>
+              <a:t>jetzt</a:t>
+            </a:r>
+            <a:r>
+              <a:rPr lang="en-US" dirty="0" smtClean="0"/>
+              <a:t> 3 </a:t>
+            </a:r>
+            <a:r>
+              <a:rPr lang="en-US" dirty="0" err="1" smtClean="0"/>
+              <a:t>spannende</a:t>
+            </a:r>
+            <a:r>
+              <a:rPr lang="en-US" dirty="0" smtClean="0"/>
+              <a:t> </a:t>
+            </a:r>
+            <a:r>
+              <a:rPr lang="en-US" dirty="0" err="1" smtClean="0"/>
+              <a:t>Methoden</a:t>
+            </a:r>
+            <a:r>
+              <a:rPr lang="en-US" dirty="0" smtClean="0"/>
+              <a:t>: </a:t>
+            </a:r>
+            <a:r>
+              <a:rPr lang="en-US" dirty="0" err="1" smtClean="0"/>
+              <a:t>vorstellen</a:t>
+            </a:r>
+            <a:endParaRPr lang="en-US" dirty="0" smtClean="0"/>
+          </a:p>
+          <a:p>
+            <a:r>
+              <a:rPr lang="en-US" dirty="0" err="1" smtClean="0"/>
+              <a:t>Wir</a:t>
+            </a:r>
+            <a:r>
+              <a:rPr lang="en-US" dirty="0" smtClean="0"/>
+              <a:t> </a:t>
+            </a:r>
+            <a:r>
+              <a:rPr lang="en-US" dirty="0" err="1" smtClean="0"/>
+              <a:t>müssen</a:t>
+            </a:r>
+            <a:r>
+              <a:rPr lang="en-US" dirty="0" smtClean="0"/>
+              <a:t> </a:t>
+            </a:r>
+            <a:r>
+              <a:rPr lang="en-US" dirty="0" err="1" smtClean="0"/>
+              <a:t>uns</a:t>
+            </a:r>
+            <a:r>
+              <a:rPr lang="en-US" dirty="0" smtClean="0"/>
+              <a:t> </a:t>
+            </a:r>
+            <a:r>
+              <a:rPr lang="en-US" dirty="0" err="1" smtClean="0"/>
+              <a:t>auch</a:t>
+            </a:r>
+            <a:r>
+              <a:rPr lang="en-US" dirty="0" smtClean="0"/>
+              <a:t> </a:t>
+            </a:r>
+            <a:r>
+              <a:rPr lang="en-US" dirty="0" err="1" smtClean="0"/>
+              <a:t>überlegen</a:t>
+            </a:r>
+            <a:r>
+              <a:rPr lang="en-US" dirty="0" smtClean="0"/>
+              <a:t> </a:t>
+            </a:r>
+            <a:r>
+              <a:rPr lang="en-US" dirty="0" err="1" smtClean="0"/>
+              <a:t>wie</a:t>
+            </a:r>
+            <a:r>
+              <a:rPr lang="en-US" dirty="0" smtClean="0"/>
+              <a:t> </a:t>
+            </a:r>
+            <a:r>
+              <a:rPr lang="en-US" dirty="0" err="1" smtClean="0"/>
+              <a:t>wir</a:t>
+            </a:r>
+            <a:r>
+              <a:rPr lang="en-US" dirty="0" smtClean="0"/>
+              <a:t> </a:t>
+            </a:r>
+            <a:r>
+              <a:rPr lang="en-US" dirty="0" err="1" smtClean="0"/>
+              <a:t>Kausalität</a:t>
+            </a:r>
+            <a:r>
+              <a:rPr lang="en-US" dirty="0" smtClean="0"/>
+              <a:t> </a:t>
+            </a:r>
+            <a:r>
+              <a:rPr lang="en-US" dirty="0" err="1" smtClean="0"/>
+              <a:t>denken</a:t>
+            </a:r>
+            <a:r>
+              <a:rPr lang="en-US" dirty="0" smtClean="0"/>
+              <a:t>: </a:t>
+            </a:r>
+            <a:r>
+              <a:rPr lang="en-US" dirty="0" err="1" smtClean="0"/>
+              <a:t>im</a:t>
+            </a:r>
+            <a:r>
+              <a:rPr lang="en-US" dirty="0" smtClean="0"/>
+              <a:t> causal attention context </a:t>
+            </a:r>
+            <a:r>
+              <a:rPr lang="en-US" dirty="0" err="1" smtClean="0"/>
+              <a:t>ist</a:t>
+            </a:r>
+            <a:r>
+              <a:rPr lang="en-US" dirty="0" smtClean="0"/>
+              <a:t> </a:t>
+            </a:r>
+            <a:r>
+              <a:rPr lang="en-US" dirty="0" err="1" smtClean="0"/>
+              <a:t>es</a:t>
+            </a:r>
+            <a:r>
+              <a:rPr lang="en-US" dirty="0" smtClean="0"/>
+              <a:t> </a:t>
+            </a:r>
+            <a:r>
+              <a:rPr lang="en-US" dirty="0" err="1" smtClean="0"/>
+              <a:t>ja</a:t>
+            </a:r>
+            <a:r>
+              <a:rPr lang="en-US" dirty="0" smtClean="0"/>
+              <a:t> </a:t>
+            </a:r>
+            <a:r>
+              <a:rPr lang="en-US" dirty="0" err="1" smtClean="0"/>
+              <a:t>vor</a:t>
+            </a:r>
+            <a:r>
+              <a:rPr lang="en-US" dirty="0" smtClean="0"/>
+              <a:t> </a:t>
+            </a:r>
+            <a:r>
+              <a:rPr lang="en-US" dirty="0" err="1" smtClean="0"/>
+              <a:t>allem</a:t>
+            </a:r>
+            <a:r>
+              <a:rPr lang="en-US" dirty="0" smtClean="0"/>
+              <a:t> influence </a:t>
+            </a:r>
+            <a:r>
+              <a:rPr lang="en-US" dirty="0" err="1" smtClean="0"/>
+              <a:t>soweit</a:t>
+            </a:r>
+            <a:r>
+              <a:rPr lang="en-US" dirty="0" smtClean="0"/>
+              <a:t> </a:t>
+            </a:r>
+            <a:r>
+              <a:rPr lang="en-US" dirty="0" err="1" smtClean="0"/>
+              <a:t>ich</a:t>
+            </a:r>
+            <a:r>
+              <a:rPr lang="en-US" dirty="0" smtClean="0"/>
+              <a:t> das </a:t>
+            </a:r>
+            <a:r>
+              <a:rPr lang="en-US" dirty="0" err="1" smtClean="0"/>
+              <a:t>verstanden</a:t>
+            </a:r>
+            <a:r>
+              <a:rPr lang="en-US" dirty="0" smtClean="0"/>
+              <a:t> </a:t>
+            </a:r>
+            <a:r>
+              <a:rPr lang="en-US" dirty="0" err="1" smtClean="0"/>
+              <a:t>habe</a:t>
+            </a:r>
+            <a:r>
+              <a:rPr lang="en-US" dirty="0" smtClean="0"/>
+              <a:t>?</a:t>
+            </a:r>
+            <a:r>
+              <a:rPr lang="en-US" dirty="0" smtClean="0"/>
+              <a:t> </a:t>
+            </a:r>
+          </a:p>
+          <a:p>
+            <a:endParaRPr lang="en-US" dirty="0" smtClean="0"/>
+          </a:p>
+          <a:p>
+            <a:pPr lvl="1"/>
+            <a:endParaRPr lang="en-US" dirty="0" smtClean="0"/>
+          </a:p>
+          <a:p>
+            <a:pPr lvl="1"/>
+            <a:endParaRPr lang="en-US" dirty="0" smtClean="0"/>
+          </a:p>
+        </p:txBody>
+      </p:sp>
+      <p:sp>
+        <p:nvSpPr>
+          <p:cNvPr id="3" name="Titel 2"/>
+          <p:cNvSpPr>
+            <a:spLocks noGrp="1"/>
+          </p:cNvSpPr>
+          <p:nvPr>
+            <p:ph type="title"/>
+          </p:nvPr>
+        </p:nvSpPr>
+        <p:spPr/>
+        <p:txBody>
+          <a:bodyPr/>
+          <a:lstStyle/>
+          <a:p>
+            <a:pPr algn="l"/>
+            <a:r>
+              <a:rPr lang="en-US" dirty="0" smtClean="0"/>
+              <a:t>11.01.21</a:t>
+            </a:r>
+            <a:endParaRPr lang="en-US" dirty="0"/>
+          </a:p>
+        </p:txBody>
+      </p:sp>
+      <p:sp>
+        <p:nvSpPr>
+          <p:cNvPr id="4" name="Inhaltsplatzhalter 3"/>
+          <p:cNvSpPr>
+            <a:spLocks noGrp="1"/>
+          </p:cNvSpPr>
+          <p:nvPr>
+            <p:ph sz="half" idx="10"/>
+          </p:nvPr>
+        </p:nvSpPr>
+        <p:spPr/>
+        <p:txBody>
+          <a:bodyPr/>
+          <a:lstStyle/>
+          <a:p>
+            <a:endParaRPr lang="en-US" dirty="0"/>
+          </a:p>
+          <a:p>
+            <a:pPr lvl="1"/>
+            <a:r>
+              <a:rPr lang="en-US" dirty="0" smtClean="0"/>
+              <a:t>Feedback </a:t>
+            </a:r>
+            <a:r>
+              <a:rPr lang="en-US" dirty="0" err="1" smtClean="0"/>
+              <a:t>zu</a:t>
+            </a:r>
+            <a:r>
+              <a:rPr lang="en-US" dirty="0" smtClean="0"/>
+              <a:t> den </a:t>
+            </a:r>
+            <a:r>
+              <a:rPr lang="en-US" dirty="0" err="1" smtClean="0"/>
+              <a:t>Ideen</a:t>
+            </a:r>
+            <a:r>
+              <a:rPr lang="en-US" dirty="0" smtClean="0"/>
+              <a:t> die </a:t>
+            </a:r>
+            <a:r>
+              <a:rPr lang="en-US" dirty="0" err="1" smtClean="0"/>
+              <a:t>ich</a:t>
+            </a:r>
+            <a:r>
+              <a:rPr lang="en-US" dirty="0" smtClean="0"/>
+              <a:t> </a:t>
+            </a:r>
+            <a:r>
+              <a:rPr lang="en-US" dirty="0" err="1" smtClean="0"/>
+              <a:t>entwickelt</a:t>
+            </a:r>
+            <a:r>
+              <a:rPr lang="en-US" dirty="0" smtClean="0"/>
+              <a:t> </a:t>
+            </a:r>
+            <a:r>
+              <a:rPr lang="en-US" dirty="0" err="1" smtClean="0"/>
+              <a:t>habe</a:t>
+            </a:r>
+            <a:r>
+              <a:rPr lang="en-US" dirty="0" smtClean="0"/>
+              <a:t> </a:t>
+            </a:r>
+          </a:p>
+          <a:p>
+            <a:pPr lvl="1"/>
+            <a:r>
+              <a:rPr lang="en-US" dirty="0" err="1" smtClean="0"/>
+              <a:t>Sieht</a:t>
+            </a:r>
+            <a:r>
+              <a:rPr lang="en-US" dirty="0" smtClean="0"/>
+              <a:t> </a:t>
+            </a:r>
+            <a:r>
+              <a:rPr lang="en-US" dirty="0" err="1" smtClean="0"/>
+              <a:t>er</a:t>
+            </a:r>
+            <a:r>
+              <a:rPr lang="en-US" dirty="0" smtClean="0"/>
+              <a:t> </a:t>
+            </a:r>
+            <a:r>
+              <a:rPr lang="en-US" dirty="0" err="1" smtClean="0"/>
+              <a:t>irgendwo</a:t>
+            </a:r>
+            <a:r>
+              <a:rPr lang="en-US" dirty="0" smtClean="0"/>
+              <a:t> was was </a:t>
+            </a:r>
+            <a:r>
+              <a:rPr lang="en-US" dirty="0" err="1" smtClean="0"/>
+              <a:t>keinen</a:t>
+            </a:r>
+            <a:r>
+              <a:rPr lang="en-US" dirty="0" smtClean="0"/>
+              <a:t> Sinn </a:t>
+            </a:r>
+            <a:r>
+              <a:rPr lang="en-US" dirty="0" err="1" smtClean="0"/>
+              <a:t>macht</a:t>
+            </a:r>
+            <a:r>
+              <a:rPr lang="en-US" dirty="0" smtClean="0"/>
+              <a:t>?/die </a:t>
+            </a:r>
+            <a:r>
+              <a:rPr lang="en-US" dirty="0" err="1" smtClean="0"/>
+              <a:t>Logik</a:t>
+            </a:r>
+            <a:r>
+              <a:rPr lang="en-US" dirty="0" smtClean="0"/>
+              <a:t> </a:t>
+            </a:r>
+            <a:r>
+              <a:rPr lang="en-US" dirty="0" err="1" smtClean="0"/>
+              <a:t>nicht</a:t>
+            </a:r>
+            <a:r>
+              <a:rPr lang="en-US" dirty="0" smtClean="0"/>
+              <a:t> </a:t>
+            </a:r>
+            <a:r>
+              <a:rPr lang="en-US" dirty="0" err="1" smtClean="0"/>
+              <a:t>stimmt</a:t>
+            </a:r>
+            <a:r>
+              <a:rPr lang="en-US" dirty="0" smtClean="0"/>
+              <a:t>?</a:t>
+            </a:r>
+          </a:p>
+          <a:p>
+            <a:pPr lvl="1"/>
+            <a:r>
+              <a:rPr lang="en-US" dirty="0" err="1" smtClean="0"/>
+              <a:t>Sieht</a:t>
+            </a:r>
+            <a:r>
+              <a:rPr lang="en-US" dirty="0" smtClean="0"/>
+              <a:t> </a:t>
+            </a:r>
+            <a:r>
+              <a:rPr lang="en-US" dirty="0" err="1" smtClean="0"/>
+              <a:t>er</a:t>
+            </a:r>
+            <a:r>
+              <a:rPr lang="en-US" dirty="0" smtClean="0"/>
+              <a:t> </a:t>
+            </a:r>
+            <a:r>
+              <a:rPr lang="en-US" dirty="0" err="1" smtClean="0"/>
+              <a:t>Fehler</a:t>
+            </a:r>
+            <a:endParaRPr lang="en-US" dirty="0" smtClean="0"/>
+          </a:p>
+          <a:p>
+            <a:pPr lvl="1"/>
+            <a:r>
+              <a:rPr lang="en-US" dirty="0" smtClean="0"/>
+              <a:t>Hat </a:t>
+            </a:r>
+            <a:r>
+              <a:rPr lang="en-US" dirty="0" err="1" smtClean="0"/>
+              <a:t>er</a:t>
+            </a:r>
+            <a:r>
+              <a:rPr lang="en-US" dirty="0" smtClean="0"/>
+              <a:t> </a:t>
+            </a:r>
+            <a:r>
+              <a:rPr lang="en-US" dirty="0" err="1" smtClean="0"/>
+              <a:t>noch</a:t>
+            </a:r>
+            <a:r>
+              <a:rPr lang="en-US" dirty="0" smtClean="0"/>
+              <a:t> </a:t>
+            </a:r>
+            <a:r>
+              <a:rPr lang="en-US" dirty="0" err="1" smtClean="0"/>
+              <a:t>ideen</a:t>
+            </a:r>
+            <a:r>
+              <a:rPr lang="en-US" dirty="0" smtClean="0"/>
+              <a:t> </a:t>
+            </a:r>
+            <a:r>
+              <a:rPr lang="en-US" dirty="0" err="1" smtClean="0"/>
+              <a:t>wie</a:t>
+            </a:r>
+            <a:r>
+              <a:rPr lang="en-US" dirty="0" smtClean="0"/>
+              <a:t> man was </a:t>
+            </a:r>
+            <a:r>
+              <a:rPr lang="en-US" dirty="0" err="1" smtClean="0"/>
+              <a:t>anders</a:t>
+            </a:r>
+            <a:r>
+              <a:rPr lang="en-US" dirty="0" smtClean="0"/>
+              <a:t> </a:t>
+            </a:r>
+            <a:r>
+              <a:rPr lang="en-US" dirty="0" err="1" smtClean="0"/>
+              <a:t>machen</a:t>
+            </a:r>
+            <a:r>
+              <a:rPr lang="en-US" dirty="0" smtClean="0"/>
+              <a:t> </a:t>
+            </a:r>
+            <a:r>
+              <a:rPr lang="en-US" dirty="0" err="1" smtClean="0"/>
+              <a:t>könnte</a:t>
+            </a:r>
+            <a:r>
+              <a:rPr lang="en-US" dirty="0" smtClean="0"/>
+              <a:t>?</a:t>
+            </a:r>
+            <a:endParaRPr lang="en-US" dirty="0"/>
+          </a:p>
+        </p:txBody>
+      </p:sp>
+    </p:spTree>
+    <p:extLst>
+      <p:ext uri="{BB962C8B-B14F-4D97-AF65-F5344CB8AC3E}">
+        <p14:creationId xmlns:p14="http://schemas.microsoft.com/office/powerpoint/2010/main" val="3302882041"/>
+      </p:ext>
+    </p:extLst>
+  </p:cSld>
+  <p:clrMapOvr>
+    <a:masterClrMapping/>
+  </p:clrMapOvr>
+</p:sld>
+</file>
+
+<file path=ppt/slides/slide7.xml><?xml version="1.0" encoding="utf-8"?>
+<p:sld xmlns:a="http://schemas.openxmlformats.org/drawingml/2006/main" xmlns:r="http://schemas.openxmlformats.org/officeDocument/2006/relationships" xmlns:p="http://schemas.openxmlformats.org/presentationml/2006/main">
+  <p:cSld>
+    <p:spTree>
+      <p:nvGrpSpPr>
+        <p:cNvPr id="1" name=""/>
+        <p:cNvGrpSpPr/>
+        <p:nvPr/>
+      </p:nvGrpSpPr>
+      <p:grpSpPr>
+        <a:xfrm>
+          <a:off x="0" y="0"/>
+          <a:ext cx="0" cy="0"/>
+          <a:chOff x="0" y="0"/>
+          <a:chExt cx="0" cy="0"/>
+        </a:xfrm>
+      </p:grpSpPr>
+      <p:sp>
+        <p:nvSpPr>
+          <p:cNvPr id="2" name="Titel 1"/>
+          <p:cNvSpPr>
+            <a:spLocks noGrp="1"/>
+          </p:cNvSpPr>
+          <p:nvPr>
+            <p:ph type="title"/>
+          </p:nvPr>
+        </p:nvSpPr>
+        <p:spPr/>
+        <p:txBody>
+          <a:bodyPr/>
+          <a:lstStyle/>
+          <a:p>
+            <a:r>
+              <a:rPr lang="en-US" dirty="0" smtClean="0"/>
+              <a:t>Meeting: 11.01.21</a:t>
+            </a:r>
+            <a:endParaRPr lang="en-US" dirty="0"/>
+          </a:p>
+        </p:txBody>
+      </p:sp>
+      <p:sp>
+        <p:nvSpPr>
+          <p:cNvPr id="3" name="Textfeld 2"/>
+          <p:cNvSpPr txBox="1"/>
+          <p:nvPr/>
+        </p:nvSpPr>
+        <p:spPr>
+          <a:xfrm>
+            <a:off x="457200" y="1181365"/>
+            <a:ext cx="8229600" cy="3416320"/>
+          </a:xfrm>
+          <a:prstGeom prst="rect">
+            <a:avLst/>
+          </a:prstGeom>
+          <a:noFill/>
+        </p:spPr>
+        <p:txBody>
+          <a:bodyPr wrap="square" rtlCol="0">
+            <a:spAutoFit/>
+          </a:bodyPr>
+          <a:lstStyle/>
+          <a:p>
+            <a:pPr marL="285750" indent="-285750">
+              <a:buFont typeface="Arial"/>
+              <a:buChar char="•"/>
+            </a:pPr>
+            <a:r>
+              <a:rPr lang="en-US" dirty="0" err="1" smtClean="0"/>
+              <a:t>Geht</a:t>
+            </a:r>
+            <a:r>
+              <a:rPr lang="en-US" dirty="0" smtClean="0"/>
+              <a:t> </a:t>
+            </a:r>
+            <a:r>
+              <a:rPr lang="en-US" dirty="0" err="1" smtClean="0"/>
+              <a:t>schon</a:t>
+            </a:r>
+            <a:r>
+              <a:rPr lang="en-US" dirty="0" smtClean="0"/>
+              <a:t> um den </a:t>
+            </a:r>
+            <a:r>
+              <a:rPr lang="en-US" dirty="0" err="1" smtClean="0"/>
+              <a:t>Sachverhalt</a:t>
+            </a:r>
+            <a:r>
+              <a:rPr lang="en-US" dirty="0" smtClean="0"/>
+              <a:t>: also </a:t>
+            </a:r>
+            <a:r>
+              <a:rPr lang="en-US" dirty="0" err="1" smtClean="0"/>
+              <a:t>nicht</a:t>
+            </a:r>
+            <a:r>
+              <a:rPr lang="en-US" dirty="0" smtClean="0"/>
+              <a:t> </a:t>
+            </a:r>
+            <a:r>
+              <a:rPr lang="en-US" dirty="0" err="1" smtClean="0"/>
+              <a:t>nur</a:t>
+            </a:r>
+            <a:r>
+              <a:rPr lang="en-US" dirty="0" smtClean="0"/>
+              <a:t> um die accuracy -&gt; </a:t>
+            </a:r>
+            <a:r>
+              <a:rPr lang="en-US" dirty="0" err="1" smtClean="0"/>
+              <a:t>macht</a:t>
+            </a:r>
+            <a:r>
+              <a:rPr lang="en-US" dirty="0" smtClean="0"/>
+              <a:t> </a:t>
+            </a:r>
+            <a:r>
+              <a:rPr lang="en-US" dirty="0" err="1" smtClean="0"/>
+              <a:t>für</a:t>
+            </a:r>
+            <a:r>
+              <a:rPr lang="en-US" dirty="0" smtClean="0"/>
+              <a:t> </a:t>
+            </a:r>
+            <a:r>
+              <a:rPr lang="en-US" dirty="0" err="1" smtClean="0"/>
+              <a:t>keinen</a:t>
+            </a:r>
+            <a:r>
+              <a:rPr lang="en-US" dirty="0" smtClean="0"/>
+              <a:t> Sinn </a:t>
+            </a:r>
+          </a:p>
+          <a:p>
+            <a:pPr marL="285750" indent="-285750">
+              <a:buFont typeface="Arial"/>
+              <a:buChar char="•"/>
+            </a:pPr>
+            <a:r>
+              <a:rPr lang="en-US" dirty="0" err="1" smtClean="0"/>
+              <a:t>Grundproblem</a:t>
+            </a:r>
+            <a:r>
+              <a:rPr lang="en-US" dirty="0" smtClean="0"/>
+              <a:t>: </a:t>
+            </a:r>
+            <a:r>
+              <a:rPr lang="en-US" dirty="0" err="1" smtClean="0"/>
+              <a:t>Daten</a:t>
+            </a:r>
+            <a:r>
+              <a:rPr lang="en-US" dirty="0" smtClean="0"/>
+              <a:t> </a:t>
+            </a:r>
+            <a:r>
+              <a:rPr lang="en-US" dirty="0" err="1" smtClean="0"/>
+              <a:t>sind</a:t>
+            </a:r>
+            <a:r>
+              <a:rPr lang="en-US" dirty="0" smtClean="0"/>
+              <a:t> </a:t>
+            </a:r>
+            <a:r>
+              <a:rPr lang="en-US" dirty="0" err="1" smtClean="0"/>
+              <a:t>schon</a:t>
+            </a:r>
+            <a:r>
+              <a:rPr lang="en-US" dirty="0" smtClean="0"/>
+              <a:t> da -&gt; </a:t>
+            </a:r>
+            <a:r>
+              <a:rPr lang="en-US" dirty="0" err="1" smtClean="0"/>
+              <a:t>nicht</a:t>
+            </a:r>
+            <a:r>
+              <a:rPr lang="en-US" dirty="0" smtClean="0"/>
+              <a:t> so </a:t>
+            </a:r>
+            <a:r>
+              <a:rPr lang="en-US" dirty="0" err="1" smtClean="0"/>
+              <a:t>einfach</a:t>
+            </a:r>
+            <a:r>
+              <a:rPr lang="en-US" dirty="0" smtClean="0"/>
+              <a:t> </a:t>
+            </a:r>
+            <a:r>
+              <a:rPr lang="en-US" dirty="0" err="1" smtClean="0"/>
+              <a:t>Kausalität</a:t>
+            </a:r>
+            <a:r>
+              <a:rPr lang="en-US" dirty="0" smtClean="0"/>
+              <a:t> </a:t>
+            </a:r>
+            <a:r>
+              <a:rPr lang="en-US" dirty="0" err="1" smtClean="0"/>
+              <a:t>zu</a:t>
+            </a:r>
+            <a:r>
+              <a:rPr lang="en-US" dirty="0" smtClean="0"/>
+              <a:t> </a:t>
+            </a:r>
+            <a:r>
+              <a:rPr lang="en-US" dirty="0" err="1" smtClean="0"/>
+              <a:t>machen</a:t>
+            </a:r>
+            <a:r>
+              <a:rPr lang="en-US" dirty="0" smtClean="0"/>
+              <a:t> </a:t>
+            </a:r>
+          </a:p>
+          <a:p>
+            <a:pPr marL="285750" indent="-285750">
+              <a:buFont typeface="Arial"/>
+              <a:buChar char="•"/>
+            </a:pPr>
+            <a:r>
+              <a:rPr lang="en-US" dirty="0" err="1" smtClean="0"/>
+              <a:t>Methodik</a:t>
+            </a:r>
+            <a:r>
+              <a:rPr lang="en-US" dirty="0" smtClean="0"/>
+              <a:t> </a:t>
+            </a:r>
+            <a:r>
+              <a:rPr lang="en-US" dirty="0" err="1" smtClean="0"/>
+              <a:t>ist</a:t>
+            </a:r>
+            <a:r>
+              <a:rPr lang="en-US" dirty="0" smtClean="0"/>
+              <a:t> </a:t>
+            </a:r>
+            <a:r>
+              <a:rPr lang="en-US" dirty="0" err="1" smtClean="0"/>
+              <a:t>im</a:t>
+            </a:r>
+            <a:r>
+              <a:rPr lang="en-US" dirty="0" smtClean="0"/>
+              <a:t> </a:t>
+            </a:r>
+            <a:r>
+              <a:rPr lang="en-US" dirty="0" err="1" smtClean="0"/>
+              <a:t>vordergrund</a:t>
+            </a:r>
+            <a:r>
+              <a:rPr lang="en-US" dirty="0" smtClean="0"/>
+              <a:t> und am </a:t>
+            </a:r>
+            <a:r>
+              <a:rPr lang="en-US" dirty="0" err="1" smtClean="0"/>
+              <a:t>ende</a:t>
+            </a:r>
+            <a:r>
+              <a:rPr lang="en-US" dirty="0" smtClean="0"/>
+              <a:t> </a:t>
+            </a:r>
+            <a:r>
+              <a:rPr lang="en-US" dirty="0" err="1" smtClean="0"/>
+              <a:t>vergleicht</a:t>
+            </a:r>
+            <a:r>
+              <a:rPr lang="en-US" dirty="0" smtClean="0"/>
+              <a:t> man </a:t>
+            </a:r>
+            <a:r>
+              <a:rPr lang="en-US" dirty="0" err="1"/>
+              <a:t>v</a:t>
+            </a:r>
+            <a:r>
+              <a:rPr lang="en-US" dirty="0" err="1" smtClean="0"/>
+              <a:t>llt</a:t>
+            </a:r>
+            <a:r>
+              <a:rPr lang="en-US" dirty="0" smtClean="0"/>
+              <a:t> die accuracy </a:t>
+            </a:r>
+          </a:p>
+          <a:p>
+            <a:pPr marL="285750" indent="-285750">
+              <a:buFont typeface="Arial"/>
+              <a:buChar char="•"/>
+            </a:pPr>
+            <a:endParaRPr lang="en-US" dirty="0"/>
+          </a:p>
+          <a:p>
+            <a:pPr marL="285750" indent="-285750">
+              <a:buFont typeface="Arial"/>
+              <a:buChar char="•"/>
+            </a:pPr>
+            <a:endParaRPr lang="en-US" dirty="0" smtClean="0"/>
+          </a:p>
+          <a:p>
+            <a:pPr marL="285750" indent="-285750">
+              <a:buFont typeface="Arial"/>
+              <a:buChar char="•"/>
+            </a:pPr>
+            <a:r>
+              <a:rPr lang="en-US" dirty="0" smtClean="0"/>
+              <a:t>Die </a:t>
+            </a:r>
+            <a:r>
+              <a:rPr lang="en-US" dirty="0" err="1"/>
+              <a:t>G</a:t>
+            </a:r>
+            <a:r>
+              <a:rPr lang="en-US" dirty="0" err="1" smtClean="0"/>
+              <a:t>radienten</a:t>
+            </a:r>
+            <a:r>
+              <a:rPr lang="en-US" dirty="0" smtClean="0"/>
+              <a:t> </a:t>
+            </a:r>
+            <a:r>
+              <a:rPr lang="en-US" dirty="0" err="1" smtClean="0"/>
+              <a:t>rauszusieben</a:t>
+            </a:r>
+            <a:r>
+              <a:rPr lang="en-US" dirty="0" smtClean="0"/>
+              <a:t> </a:t>
+            </a:r>
+            <a:r>
+              <a:rPr lang="en-US" dirty="0" err="1" smtClean="0"/>
+              <a:t>etc</a:t>
+            </a:r>
+            <a:r>
+              <a:rPr lang="en-US" dirty="0" smtClean="0"/>
+              <a:t> </a:t>
+            </a:r>
+            <a:r>
+              <a:rPr lang="en-US" dirty="0" err="1" smtClean="0"/>
+              <a:t>lassen</a:t>
+            </a:r>
+            <a:r>
+              <a:rPr lang="en-US" dirty="0" smtClean="0"/>
+              <a:t> </a:t>
+            </a:r>
+            <a:r>
+              <a:rPr lang="en-US" dirty="0" err="1" smtClean="0"/>
+              <a:t>wir</a:t>
+            </a:r>
+            <a:r>
+              <a:rPr lang="en-US" dirty="0" smtClean="0"/>
+              <a:t> </a:t>
+            </a:r>
+            <a:r>
+              <a:rPr lang="en-US" dirty="0" err="1" smtClean="0"/>
+              <a:t>weg</a:t>
+            </a:r>
+            <a:r>
+              <a:rPr lang="en-US" dirty="0" smtClean="0"/>
+              <a:t>: </a:t>
+            </a:r>
+            <a:r>
+              <a:rPr lang="en-US" dirty="0" err="1" smtClean="0"/>
+              <a:t>eher</a:t>
+            </a:r>
+            <a:r>
+              <a:rPr lang="en-US" dirty="0" smtClean="0"/>
+              <a:t> die </a:t>
+            </a:r>
+            <a:r>
+              <a:rPr lang="en-US" dirty="0" err="1" smtClean="0"/>
+              <a:t>einzelnen</a:t>
+            </a:r>
+            <a:r>
+              <a:rPr lang="en-US" dirty="0" smtClean="0"/>
+              <a:t> Inputs </a:t>
+            </a:r>
+            <a:r>
+              <a:rPr lang="en-US" dirty="0" err="1" smtClean="0"/>
+              <a:t>verändern</a:t>
+            </a:r>
+            <a:r>
+              <a:rPr lang="en-US" dirty="0" smtClean="0"/>
+              <a:t> (</a:t>
+            </a:r>
+            <a:r>
+              <a:rPr lang="en-US" dirty="0" err="1" smtClean="0"/>
+              <a:t>linke</a:t>
+            </a:r>
+            <a:r>
+              <a:rPr lang="en-US" dirty="0" smtClean="0"/>
+              <a:t> </a:t>
+            </a:r>
+            <a:r>
+              <a:rPr lang="en-US" dirty="0" err="1" smtClean="0"/>
+              <a:t>Seite</a:t>
+            </a:r>
+            <a:r>
+              <a:rPr lang="en-US" dirty="0" smtClean="0"/>
+              <a:t> auf </a:t>
+            </a:r>
+            <a:r>
+              <a:rPr lang="en-US" dirty="0" err="1" smtClean="0"/>
+              <a:t>dem</a:t>
+            </a:r>
+            <a:r>
+              <a:rPr lang="en-US" dirty="0" smtClean="0"/>
+              <a:t> </a:t>
+            </a:r>
+            <a:r>
+              <a:rPr lang="en-US" dirty="0" err="1" smtClean="0"/>
+              <a:t>Miro</a:t>
+            </a:r>
+            <a:r>
+              <a:rPr lang="en-US" dirty="0" smtClean="0"/>
+              <a:t> board) </a:t>
+            </a:r>
+          </a:p>
+          <a:p>
+            <a:pPr marL="742950" lvl="1" indent="-285750">
+              <a:buFont typeface="Arial"/>
+              <a:buChar char="•"/>
+            </a:pPr>
+            <a:r>
+              <a:rPr lang="en-US" dirty="0" err="1" smtClean="0"/>
+              <a:t>Bei</a:t>
+            </a:r>
+            <a:r>
+              <a:rPr lang="en-US" dirty="0" smtClean="0"/>
+              <a:t> Inputs: </a:t>
+            </a:r>
+            <a:r>
+              <a:rPr lang="en-US" dirty="0" err="1" smtClean="0"/>
+              <a:t>schaue</a:t>
+            </a:r>
+            <a:r>
+              <a:rPr lang="en-US" dirty="0" smtClean="0"/>
+              <a:t> </a:t>
+            </a:r>
+            <a:r>
+              <a:rPr lang="en-US" dirty="0" err="1" smtClean="0"/>
+              <a:t>ich</a:t>
+            </a:r>
+            <a:r>
+              <a:rPr lang="en-US" dirty="0" smtClean="0"/>
+              <a:t> </a:t>
+            </a:r>
+            <a:r>
+              <a:rPr lang="en-US" dirty="0" err="1" smtClean="0"/>
+              <a:t>welche</a:t>
+            </a:r>
+            <a:r>
+              <a:rPr lang="en-US" dirty="0" smtClean="0"/>
+              <a:t> </a:t>
+            </a:r>
+            <a:r>
+              <a:rPr lang="en-US" dirty="0" err="1" smtClean="0"/>
+              <a:t>teile</a:t>
+            </a:r>
+            <a:r>
+              <a:rPr lang="en-US" dirty="0" smtClean="0"/>
+              <a:t> des </a:t>
+            </a:r>
+            <a:r>
+              <a:rPr lang="en-US" dirty="0" err="1" smtClean="0"/>
+              <a:t>gradienten</a:t>
+            </a:r>
+            <a:r>
+              <a:rPr lang="en-US" dirty="0" smtClean="0"/>
+              <a:t> Sinn </a:t>
+            </a:r>
+            <a:r>
+              <a:rPr lang="en-US" dirty="0" err="1" smtClean="0"/>
+              <a:t>gemacht</a:t>
+            </a:r>
+            <a:r>
+              <a:rPr lang="en-US" dirty="0" smtClean="0"/>
+              <a:t> </a:t>
+            </a:r>
+            <a:r>
+              <a:rPr lang="en-US" dirty="0" err="1" smtClean="0"/>
+              <a:t>haben</a:t>
+            </a:r>
+            <a:r>
+              <a:rPr lang="en-US" dirty="0" smtClean="0"/>
+              <a:t> </a:t>
+            </a:r>
+          </a:p>
+          <a:p>
+            <a:pPr marL="742950" lvl="1" indent="-285750">
+              <a:buFont typeface="Arial"/>
+              <a:buChar char="•"/>
+            </a:pPr>
+            <a:r>
+              <a:rPr lang="en-US" dirty="0" err="1" smtClean="0"/>
+              <a:t>Bei</a:t>
+            </a:r>
+            <a:r>
+              <a:rPr lang="en-US" dirty="0" smtClean="0"/>
+              <a:t> gradient: </a:t>
+            </a:r>
+            <a:r>
+              <a:rPr lang="en-US" dirty="0" err="1" smtClean="0"/>
+              <a:t>bewerte</a:t>
+            </a:r>
+            <a:r>
+              <a:rPr lang="en-US" dirty="0" smtClean="0"/>
+              <a:t> </a:t>
+            </a:r>
+            <a:r>
+              <a:rPr lang="en-US" dirty="0" err="1" smtClean="0"/>
+              <a:t>ich</a:t>
+            </a:r>
+            <a:r>
+              <a:rPr lang="en-US" dirty="0" smtClean="0"/>
+              <a:t> </a:t>
+            </a:r>
+            <a:r>
+              <a:rPr lang="en-US" dirty="0" err="1" smtClean="0"/>
+              <a:t>ganze</a:t>
+            </a:r>
+            <a:r>
+              <a:rPr lang="en-US" dirty="0" smtClean="0"/>
+              <a:t> samples (</a:t>
+            </a:r>
+            <a:r>
+              <a:rPr lang="en-US" dirty="0" err="1" smtClean="0"/>
+              <a:t>weniger</a:t>
+            </a:r>
+            <a:r>
+              <a:rPr lang="en-US" dirty="0" smtClean="0"/>
+              <a:t> relevant)</a:t>
+            </a:r>
+          </a:p>
+          <a:p>
+            <a:pPr marL="742950" lvl="1" indent="-285750">
+              <a:buFont typeface="Arial"/>
+              <a:buChar char="•"/>
+            </a:pPr>
+            <a:endParaRPr lang="en-US" dirty="0"/>
+          </a:p>
+          <a:p>
+            <a:endParaRPr lang="en-US" dirty="0"/>
+          </a:p>
+        </p:txBody>
+      </p:sp>
+    </p:spTree>
+    <p:extLst>
+      <p:ext uri="{BB962C8B-B14F-4D97-AF65-F5344CB8AC3E}">
+        <p14:creationId xmlns:p14="http://schemas.microsoft.com/office/powerpoint/2010/main" val="714071043"/>
+      </p:ext>
+    </p:extLst>
+  </p:cSld>
+  <p:clrMapOvr>
+    <a:masterClrMapping/>
+  </p:clrMapOvr>
+</p:sld>
+</file>
+
+<file path=ppt/slides/slide8.xml><?xml version="1.0" encoding="utf-8"?>
+<p:sld xmlns:a="http://schemas.openxmlformats.org/drawingml/2006/main" xmlns:r="http://schemas.openxmlformats.org/officeDocument/2006/relationships" xmlns:p="http://schemas.openxmlformats.org/presentationml/2006/main">
+  <p:cSld>
+    <p:spTree>
+      <p:nvGrpSpPr>
+        <p:cNvPr id="1" name=""/>
+        <p:cNvGrpSpPr/>
+        <p:nvPr/>
+      </p:nvGrpSpPr>
+      <p:grpSpPr>
+        <a:xfrm>
+          <a:off x="0" y="0"/>
+          <a:ext cx="0" cy="0"/>
+          <a:chOff x="0" y="0"/>
+          <a:chExt cx="0" cy="0"/>
+        </a:xfrm>
+      </p:grpSpPr>
+      <p:sp>
+        <p:nvSpPr>
+          <p:cNvPr id="2" name="Titel 1"/>
+          <p:cNvSpPr>
+            <a:spLocks noGrp="1"/>
+          </p:cNvSpPr>
+          <p:nvPr>
+            <p:ph type="title"/>
+          </p:nvPr>
+        </p:nvSpPr>
+        <p:spPr/>
+        <p:txBody>
+          <a:bodyPr/>
+          <a:lstStyle/>
+          <a:p>
+            <a:r>
+              <a:rPr lang="en-US" dirty="0" smtClean="0"/>
+              <a:t>Meeting: 11.01.21</a:t>
+            </a:r>
+            <a:endParaRPr lang="en-US" dirty="0"/>
+          </a:p>
+        </p:txBody>
+      </p:sp>
+      <p:sp>
+        <p:nvSpPr>
+          <p:cNvPr id="3" name="Textfeld 2"/>
+          <p:cNvSpPr txBox="1"/>
+          <p:nvPr/>
+        </p:nvSpPr>
+        <p:spPr>
+          <a:xfrm>
+            <a:off x="457200" y="1181365"/>
+            <a:ext cx="8229600" cy="3416320"/>
+          </a:xfrm>
+          <a:prstGeom prst="rect">
+            <a:avLst/>
+          </a:prstGeom>
+          <a:noFill/>
+        </p:spPr>
+        <p:txBody>
+          <a:bodyPr wrap="square" rtlCol="0">
+            <a:spAutoFit/>
+          </a:bodyPr>
+          <a:lstStyle/>
+          <a:p>
+            <a:pPr marL="285750" indent="-285750">
+              <a:buFont typeface="Arial"/>
+              <a:buChar char="•"/>
+            </a:pPr>
+            <a:r>
+              <a:rPr lang="en-US" dirty="0" smtClean="0"/>
+              <a:t>Man </a:t>
+            </a:r>
+            <a:r>
+              <a:rPr lang="en-US" dirty="0" err="1"/>
+              <a:t>müsste</a:t>
+            </a:r>
+            <a:r>
+              <a:rPr lang="en-US" dirty="0"/>
+              <a:t> </a:t>
+            </a:r>
+            <a:r>
+              <a:rPr lang="en-US" dirty="0" err="1"/>
+              <a:t>sich</a:t>
+            </a:r>
+            <a:r>
+              <a:rPr lang="en-US" dirty="0"/>
+              <a:t> die counterfactuals </a:t>
+            </a:r>
+            <a:r>
+              <a:rPr lang="en-US" dirty="0" err="1"/>
+              <a:t>testen</a:t>
+            </a:r>
+            <a:r>
+              <a:rPr lang="en-US" dirty="0"/>
+              <a:t> </a:t>
+            </a:r>
+            <a:r>
+              <a:rPr lang="en-US" dirty="0" err="1"/>
+              <a:t>indem</a:t>
+            </a:r>
+            <a:r>
+              <a:rPr lang="en-US" dirty="0"/>
+              <a:t> man </a:t>
+            </a:r>
+            <a:r>
+              <a:rPr lang="en-US" dirty="0" err="1"/>
+              <a:t>versteht</a:t>
+            </a:r>
+            <a:r>
+              <a:rPr lang="en-US" dirty="0"/>
+              <a:t> was </a:t>
+            </a:r>
+            <a:r>
+              <a:rPr lang="en-US" dirty="0" err="1"/>
+              <a:t>eigentlich</a:t>
+            </a:r>
+            <a:r>
+              <a:rPr lang="en-US" dirty="0"/>
+              <a:t> </a:t>
+            </a:r>
+            <a:r>
+              <a:rPr lang="en-US" dirty="0" err="1"/>
+              <a:t>bei</a:t>
+            </a:r>
+            <a:r>
+              <a:rPr lang="en-US" dirty="0"/>
+              <a:t> den counterfactuals </a:t>
+            </a:r>
+            <a:r>
+              <a:rPr lang="en-US" dirty="0" err="1"/>
+              <a:t>rauskommen</a:t>
+            </a:r>
+            <a:r>
+              <a:rPr lang="en-US" dirty="0"/>
+              <a:t> </a:t>
+            </a:r>
+            <a:r>
+              <a:rPr lang="en-US" dirty="0" err="1"/>
+              <a:t>müsste</a:t>
+            </a:r>
+            <a:endParaRPr lang="en-US" dirty="0"/>
+          </a:p>
+          <a:p>
+            <a:pPr marL="742950" lvl="1" indent="-285750">
+              <a:buFont typeface="Arial"/>
+              <a:buChar char="•"/>
+            </a:pPr>
+            <a:r>
+              <a:rPr lang="en-US" dirty="0"/>
+              <a:t>Also </a:t>
+            </a:r>
+            <a:r>
+              <a:rPr lang="en-US" dirty="0" err="1"/>
+              <a:t>aus</a:t>
+            </a:r>
+            <a:r>
+              <a:rPr lang="en-US" dirty="0"/>
+              <a:t> </a:t>
+            </a:r>
+            <a:r>
+              <a:rPr lang="en-US" dirty="0" err="1" smtClean="0"/>
+              <a:t>Daten</a:t>
+            </a:r>
+            <a:r>
+              <a:rPr lang="en-US" dirty="0" smtClean="0"/>
+              <a:t> </a:t>
+            </a:r>
+            <a:r>
+              <a:rPr lang="en-US" dirty="0"/>
+              <a:t>die </a:t>
+            </a:r>
+            <a:r>
+              <a:rPr lang="en-US" dirty="0" err="1"/>
+              <a:t>richtige</a:t>
+            </a:r>
+            <a:r>
+              <a:rPr lang="en-US" dirty="0"/>
+              <a:t> </a:t>
+            </a:r>
+            <a:r>
+              <a:rPr lang="en-US" dirty="0" err="1" smtClean="0"/>
+              <a:t>Antwort</a:t>
+            </a:r>
+            <a:r>
+              <a:rPr lang="en-US" dirty="0" smtClean="0"/>
+              <a:t> </a:t>
+            </a:r>
+            <a:r>
+              <a:rPr lang="en-US" dirty="0" err="1"/>
+              <a:t>für</a:t>
+            </a:r>
+            <a:r>
+              <a:rPr lang="en-US" dirty="0"/>
+              <a:t> die counterfactuals </a:t>
+            </a:r>
+            <a:r>
+              <a:rPr lang="en-US" dirty="0" err="1"/>
+              <a:t>generieren</a:t>
+            </a:r>
+            <a:r>
+              <a:rPr lang="en-US" dirty="0"/>
+              <a:t> </a:t>
+            </a:r>
+          </a:p>
+          <a:p>
+            <a:pPr marL="742950" lvl="1" indent="-285750">
+              <a:buFont typeface="Arial"/>
+              <a:buChar char="•"/>
+            </a:pPr>
+            <a:r>
+              <a:rPr lang="en-US" dirty="0" err="1" smtClean="0"/>
+              <a:t>Wenn</a:t>
+            </a:r>
+            <a:r>
+              <a:rPr lang="en-US" dirty="0" smtClean="0"/>
+              <a:t> </a:t>
+            </a:r>
+            <a:r>
+              <a:rPr lang="en-US" dirty="0" err="1" smtClean="0"/>
+              <a:t>ich</a:t>
+            </a:r>
+            <a:r>
+              <a:rPr lang="en-US" dirty="0" smtClean="0"/>
+              <a:t> counterfactuals </a:t>
+            </a:r>
+            <a:r>
+              <a:rPr lang="en-US" dirty="0" err="1" smtClean="0"/>
+              <a:t>einsetze</a:t>
+            </a:r>
+            <a:r>
+              <a:rPr lang="en-US" dirty="0" smtClean="0"/>
+              <a:t> muss </a:t>
+            </a:r>
+            <a:r>
+              <a:rPr lang="en-US" dirty="0" err="1" smtClean="0"/>
+              <a:t>ich</a:t>
+            </a:r>
+            <a:r>
+              <a:rPr lang="en-US" dirty="0" smtClean="0"/>
+              <a:t> </a:t>
+            </a:r>
+            <a:r>
+              <a:rPr lang="en-US" dirty="0" err="1" smtClean="0"/>
+              <a:t>verstehen</a:t>
+            </a:r>
+            <a:r>
+              <a:rPr lang="en-US" dirty="0" smtClean="0"/>
+              <a:t> was </a:t>
+            </a:r>
+            <a:r>
+              <a:rPr lang="en-US" dirty="0" err="1" smtClean="0"/>
+              <a:t>rauskommen</a:t>
+            </a:r>
+            <a:r>
+              <a:rPr lang="en-US" dirty="0" smtClean="0"/>
+              <a:t> </a:t>
+            </a:r>
+            <a:r>
+              <a:rPr lang="en-US" dirty="0" err="1" smtClean="0"/>
+              <a:t>müsste</a:t>
+            </a:r>
+            <a:r>
+              <a:rPr lang="en-US" dirty="0" smtClean="0"/>
+              <a:t> </a:t>
+            </a:r>
+            <a:r>
+              <a:rPr lang="en-US" dirty="0" err="1" smtClean="0"/>
+              <a:t>damit</a:t>
+            </a:r>
+            <a:r>
+              <a:rPr lang="en-US" dirty="0" smtClean="0"/>
+              <a:t> </a:t>
+            </a:r>
+            <a:r>
+              <a:rPr lang="en-US" dirty="0" err="1" smtClean="0"/>
+              <a:t>ich</a:t>
+            </a:r>
+            <a:r>
+              <a:rPr lang="en-US" dirty="0" smtClean="0"/>
+              <a:t> den influence </a:t>
+            </a:r>
+            <a:r>
+              <a:rPr lang="en-US" dirty="0" err="1" smtClean="0"/>
+              <a:t>messen</a:t>
+            </a:r>
+            <a:r>
+              <a:rPr lang="en-US" dirty="0" smtClean="0"/>
+              <a:t> </a:t>
+            </a:r>
+            <a:r>
+              <a:rPr lang="en-US" dirty="0" err="1" smtClean="0"/>
+              <a:t>kann</a:t>
+            </a:r>
+            <a:r>
+              <a:rPr lang="en-US" dirty="0" smtClean="0"/>
+              <a:t>: </a:t>
+            </a:r>
+            <a:r>
+              <a:rPr lang="en-US" dirty="0" err="1" smtClean="0"/>
+              <a:t>kam</a:t>
+            </a:r>
+            <a:r>
+              <a:rPr lang="en-US" dirty="0" smtClean="0"/>
+              <a:t> das </a:t>
+            </a:r>
+            <a:r>
+              <a:rPr lang="en-US" dirty="0" err="1" smtClean="0"/>
+              <a:t>richtige</a:t>
+            </a:r>
+            <a:r>
+              <a:rPr lang="en-US" dirty="0" smtClean="0"/>
+              <a:t> </a:t>
+            </a:r>
+            <a:r>
+              <a:rPr lang="en-US" dirty="0" err="1" smtClean="0"/>
+              <a:t>raus</a:t>
+            </a:r>
+            <a:r>
+              <a:rPr lang="en-US" dirty="0" smtClean="0"/>
+              <a:t>? </a:t>
+            </a:r>
+            <a:r>
+              <a:rPr lang="en-US" dirty="0" err="1" smtClean="0"/>
+              <a:t>Ja</a:t>
+            </a:r>
+            <a:r>
+              <a:rPr lang="en-US" dirty="0" smtClean="0"/>
+              <a:t> nein? </a:t>
+            </a:r>
+          </a:p>
+          <a:p>
+            <a:pPr marL="742950" lvl="1" indent="-285750">
+              <a:buFont typeface="Arial"/>
+              <a:buChar char="•"/>
+            </a:pPr>
+            <a:r>
+              <a:rPr lang="en-US" dirty="0" smtClean="0"/>
+              <a:t>Die </a:t>
+            </a:r>
+            <a:r>
+              <a:rPr lang="en-US" dirty="0" err="1" smtClean="0"/>
+              <a:t>richtige</a:t>
+            </a:r>
+            <a:r>
+              <a:rPr lang="en-US" dirty="0" smtClean="0"/>
+              <a:t> </a:t>
+            </a:r>
+            <a:r>
+              <a:rPr lang="en-US" dirty="0" err="1" smtClean="0"/>
+              <a:t>Antwort</a:t>
+            </a:r>
+            <a:r>
+              <a:rPr lang="en-US" dirty="0" smtClean="0"/>
+              <a:t> </a:t>
+            </a:r>
+            <a:r>
+              <a:rPr lang="en-US" dirty="0" err="1" smtClean="0"/>
+              <a:t>generieren</a:t>
+            </a:r>
+            <a:r>
+              <a:rPr lang="en-US" dirty="0" smtClean="0"/>
+              <a:t> </a:t>
+            </a:r>
+            <a:r>
+              <a:rPr lang="en-US" dirty="0" err="1" smtClean="0"/>
+              <a:t>indem</a:t>
+            </a:r>
+            <a:r>
+              <a:rPr lang="en-US" dirty="0" smtClean="0"/>
+              <a:t> man </a:t>
+            </a:r>
+            <a:r>
+              <a:rPr lang="en-US" dirty="0" err="1" smtClean="0"/>
+              <a:t>sie</a:t>
+            </a:r>
+            <a:r>
+              <a:rPr lang="en-US" dirty="0" smtClean="0"/>
+              <a:t> </a:t>
+            </a:r>
+            <a:r>
+              <a:rPr lang="en-US" dirty="0" err="1" smtClean="0"/>
+              <a:t>aus</a:t>
+            </a:r>
+            <a:r>
+              <a:rPr lang="en-US" dirty="0" smtClean="0"/>
+              <a:t> den </a:t>
+            </a:r>
+            <a:r>
+              <a:rPr lang="en-US" dirty="0" err="1" smtClean="0"/>
+              <a:t>bestehenden</a:t>
+            </a:r>
+            <a:r>
+              <a:rPr lang="en-US" dirty="0" smtClean="0"/>
+              <a:t> </a:t>
+            </a:r>
+            <a:r>
+              <a:rPr lang="en-US" dirty="0" err="1" smtClean="0"/>
+              <a:t>daten</a:t>
+            </a:r>
+            <a:r>
+              <a:rPr lang="en-US" dirty="0" smtClean="0"/>
+              <a:t> </a:t>
+            </a:r>
+            <a:r>
+              <a:rPr lang="en-US" dirty="0" err="1" smtClean="0"/>
+              <a:t>approximiert</a:t>
+            </a:r>
+            <a:r>
+              <a:rPr lang="en-US" dirty="0" smtClean="0"/>
+              <a:t> </a:t>
+            </a:r>
+          </a:p>
+          <a:p>
+            <a:pPr marL="285750" indent="-285750">
+              <a:buFont typeface="Arial"/>
+              <a:buChar char="•"/>
+            </a:pPr>
+            <a:r>
+              <a:rPr lang="en-US" dirty="0" err="1" smtClean="0"/>
+              <a:t>Bewertung</a:t>
+            </a:r>
+            <a:r>
+              <a:rPr lang="en-US" dirty="0" smtClean="0"/>
+              <a:t> der Counterfactuals </a:t>
+            </a:r>
+            <a:r>
+              <a:rPr lang="en-US" dirty="0" err="1" smtClean="0"/>
+              <a:t>über</a:t>
+            </a:r>
+            <a:r>
+              <a:rPr lang="en-US" dirty="0" smtClean="0"/>
+              <a:t> loss function </a:t>
+            </a:r>
+          </a:p>
+          <a:p>
+            <a:pPr marL="742950" lvl="1" indent="-285750">
+              <a:buFont typeface="Arial"/>
+              <a:buChar char="•"/>
+            </a:pPr>
+            <a:r>
+              <a:rPr lang="en-US" dirty="0" smtClean="0"/>
+              <a:t> Update in </a:t>
+            </a:r>
+            <a:r>
+              <a:rPr lang="en-US" dirty="0" err="1" smtClean="0"/>
+              <a:t>meinem</a:t>
+            </a:r>
+            <a:r>
+              <a:rPr lang="en-US" dirty="0" smtClean="0"/>
+              <a:t> system und </a:t>
+            </a:r>
+            <a:r>
+              <a:rPr lang="en-US" dirty="0" err="1" smtClean="0"/>
+              <a:t>schaue</a:t>
+            </a:r>
+            <a:r>
+              <a:rPr lang="en-US" dirty="0" smtClean="0"/>
+              <a:t> </a:t>
+            </a:r>
+            <a:r>
+              <a:rPr lang="en-US" dirty="0" err="1" smtClean="0"/>
+              <a:t>ob</a:t>
+            </a:r>
+            <a:r>
+              <a:rPr lang="en-US" dirty="0" smtClean="0"/>
+              <a:t> die loss function </a:t>
+            </a:r>
+            <a:r>
+              <a:rPr lang="en-US" dirty="0" err="1" smtClean="0"/>
+              <a:t>runter</a:t>
+            </a:r>
+            <a:r>
+              <a:rPr lang="en-US" dirty="0" smtClean="0"/>
+              <a:t> </a:t>
+            </a:r>
+            <a:r>
+              <a:rPr lang="en-US" dirty="0" err="1" smtClean="0"/>
+              <a:t>geht</a:t>
+            </a:r>
+            <a:r>
+              <a:rPr lang="en-US" dirty="0" smtClean="0"/>
+              <a:t> </a:t>
+            </a:r>
+          </a:p>
+          <a:p>
+            <a:pPr marL="742950" lvl="1" indent="-285750">
+              <a:buFont typeface="Arial"/>
+              <a:buChar char="•"/>
+            </a:pPr>
+            <a:r>
+              <a:rPr lang="en-US" dirty="0" smtClean="0"/>
+              <a:t>Was </a:t>
+            </a:r>
+            <a:r>
+              <a:rPr lang="en-US" dirty="0" err="1" smtClean="0"/>
+              <a:t>ist</a:t>
+            </a:r>
+            <a:r>
+              <a:rPr lang="en-US" dirty="0" smtClean="0"/>
+              <a:t> </a:t>
+            </a:r>
+            <a:r>
+              <a:rPr lang="en-US" dirty="0" err="1" smtClean="0"/>
+              <a:t>mein</a:t>
+            </a:r>
+            <a:r>
+              <a:rPr lang="en-US" dirty="0" smtClean="0"/>
+              <a:t> </a:t>
+            </a:r>
+            <a:r>
+              <a:rPr lang="en-US" dirty="0" err="1"/>
+              <a:t>E</a:t>
+            </a:r>
+            <a:r>
+              <a:rPr lang="en-US" dirty="0" err="1" smtClean="0"/>
+              <a:t>influss</a:t>
+            </a:r>
+            <a:r>
+              <a:rPr lang="en-US" dirty="0" smtClean="0"/>
+              <a:t> auf die </a:t>
+            </a:r>
+            <a:r>
+              <a:rPr lang="en-US" dirty="0"/>
+              <a:t>L</a:t>
+            </a:r>
+            <a:r>
+              <a:rPr lang="en-US" dirty="0" smtClean="0"/>
+              <a:t>oss function? </a:t>
+            </a:r>
+            <a:endParaRPr lang="en-US" dirty="0"/>
+          </a:p>
+          <a:p>
+            <a:pPr marL="742950" lvl="1" indent="-285750">
+              <a:buFont typeface="Arial"/>
+              <a:buChar char="•"/>
+            </a:pPr>
+            <a:r>
+              <a:rPr lang="en-US" dirty="0" smtClean="0"/>
+              <a:t>Gradient word </a:t>
+            </a:r>
+            <a:r>
+              <a:rPr lang="en-US" dirty="0" err="1" smtClean="0"/>
+              <a:t>über</a:t>
+            </a:r>
+            <a:r>
+              <a:rPr lang="en-US" dirty="0" smtClean="0"/>
+              <a:t> loss-reduction </a:t>
+            </a:r>
+            <a:r>
+              <a:rPr lang="en-US" dirty="0" err="1" smtClean="0"/>
+              <a:t>bewertet</a:t>
+            </a:r>
+            <a:r>
+              <a:rPr lang="en-US" dirty="0" smtClean="0"/>
+              <a:t> </a:t>
+            </a:r>
+            <a:endParaRPr lang="en-US" dirty="0"/>
+          </a:p>
+          <a:p>
+            <a:pPr marL="285750" indent="-285750">
+              <a:buFont typeface="Arial"/>
+              <a:buChar char="•"/>
+            </a:pPr>
+            <a:endParaRPr lang="en-US" dirty="0"/>
+          </a:p>
+        </p:txBody>
+      </p:sp>
+    </p:spTree>
+    <p:extLst>
+      <p:ext uri="{BB962C8B-B14F-4D97-AF65-F5344CB8AC3E}">
+        <p14:creationId xmlns:p14="http://schemas.microsoft.com/office/powerpoint/2010/main" val="1598944734"/>
       </p:ext>
     </p:extLst>
   </p:cSld>

</xml_diff>

<commit_message>
new Meeting notes and matthias thoughts
</commit_message>
<xml_diff>
--- a/MeetingNotes.pptx
+++ b/MeetingNotes.pptx
@@ -13,6 +13,9 @@
     <p:sldId id="261" r:id="rId7"/>
     <p:sldId id="262" r:id="rId8"/>
     <p:sldId id="263" r:id="rId9"/>
+    <p:sldId id="264" r:id="rId10"/>
+    <p:sldId id="265" r:id="rId11"/>
+    <p:sldId id="266" r:id="rId12"/>
   </p:sldIdLst>
   <p:sldSz cx="9144000" cy="5715000" type="screen16x10"/>
   <p:notesSz cx="6858000" cy="9144000"/>
@@ -636,7 +639,7 @@
           <a:p>
             <a:fld id="{907AEC89-51F8-8C49-8F5C-7B8970AE8955}" type="datetimeFigureOut">
               <a:rPr lang="de-DE" smtClean="0"/>
-              <a:t>06.02.21</a:t>
+              <a:t>08.02.21</a:t>
             </a:fld>
             <a:endParaRPr lang="en-US"/>
           </a:p>
@@ -806,7 +809,7 @@
           <a:p>
             <a:fld id="{907AEC89-51F8-8C49-8F5C-7B8970AE8955}" type="datetimeFigureOut">
               <a:rPr lang="de-DE" smtClean="0"/>
-              <a:t>06.02.21</a:t>
+              <a:t>08.02.21</a:t>
             </a:fld>
             <a:endParaRPr lang="en-US"/>
           </a:p>
@@ -986,7 +989,7 @@
           <a:p>
             <a:fld id="{907AEC89-51F8-8C49-8F5C-7B8970AE8955}" type="datetimeFigureOut">
               <a:rPr lang="de-DE" smtClean="0"/>
-              <a:t>06.02.21</a:t>
+              <a:t>08.02.21</a:t>
             </a:fld>
             <a:endParaRPr lang="en-US"/>
           </a:p>
@@ -1104,7 +1107,7 @@
           <a:p>
             <a:fld id="{907AEC89-51F8-8C49-8F5C-7B8970AE8955}" type="datetimeFigureOut">
               <a:rPr lang="de-DE" smtClean="0"/>
-              <a:t>06.02.21</a:t>
+              <a:t>08.02.21</a:t>
             </a:fld>
             <a:endParaRPr lang="en-US"/>
           </a:p>
@@ -1424,7 +1427,7 @@
           <a:p>
             <a:fld id="{907AEC89-51F8-8C49-8F5C-7B8970AE8955}" type="datetimeFigureOut">
               <a:rPr lang="de-DE" smtClean="0"/>
-              <a:t>06.02.21</a:t>
+              <a:t>08.02.21</a:t>
             </a:fld>
             <a:endParaRPr lang="en-US"/>
           </a:p>
@@ -1976,7 +1979,7 @@
           <a:p>
             <a:fld id="{907AEC89-51F8-8C49-8F5C-7B8970AE8955}" type="datetimeFigureOut">
               <a:rPr lang="de-DE" smtClean="0"/>
-              <a:t>06.02.21</a:t>
+              <a:t>08.02.21</a:t>
             </a:fld>
             <a:endParaRPr lang="en-US"/>
           </a:p>
@@ -2398,7 +2401,7 @@
           <a:p>
             <a:fld id="{907AEC89-51F8-8C49-8F5C-7B8970AE8955}" type="datetimeFigureOut">
               <a:rPr lang="de-DE" smtClean="0"/>
-              <a:t>06.02.21</a:t>
+              <a:t>08.02.21</a:t>
             </a:fld>
             <a:endParaRPr lang="en-US"/>
           </a:p>
@@ -2516,7 +2519,7 @@
           <a:p>
             <a:fld id="{907AEC89-51F8-8C49-8F5C-7B8970AE8955}" type="datetimeFigureOut">
               <a:rPr lang="de-DE" smtClean="0"/>
-              <a:t>06.02.21</a:t>
+              <a:t>08.02.21</a:t>
             </a:fld>
             <a:endParaRPr lang="en-US"/>
           </a:p>
@@ -2611,7 +2614,7 @@
           <a:p>
             <a:fld id="{907AEC89-51F8-8C49-8F5C-7B8970AE8955}" type="datetimeFigureOut">
               <a:rPr lang="de-DE" smtClean="0"/>
-              <a:t>06.02.21</a:t>
+              <a:t>08.02.21</a:t>
             </a:fld>
             <a:endParaRPr lang="en-US"/>
           </a:p>
@@ -2888,7 +2891,7 @@
           <a:p>
             <a:fld id="{907AEC89-51F8-8C49-8F5C-7B8970AE8955}" type="datetimeFigureOut">
               <a:rPr lang="de-DE" smtClean="0"/>
-              <a:t>06.02.21</a:t>
+              <a:t>08.02.21</a:t>
             </a:fld>
             <a:endParaRPr lang="en-US"/>
           </a:p>
@@ -3101,7 +3104,7 @@
           <a:p>
             <a:fld id="{907AEC89-51F8-8C49-8F5C-7B8970AE8955}" type="datetimeFigureOut">
               <a:rPr lang="de-DE" smtClean="0"/>
-              <a:t>06.02.21</a:t>
+              <a:t>08.02.21</a:t>
             </a:fld>
             <a:endParaRPr lang="en-US"/>
           </a:p>
@@ -3513,6 +3516,1419 @@
 </p:sld>
 </file>
 
+<file path=ppt/slides/slide10.xml><?xml version="1.0" encoding="utf-8"?>
+<p:sld xmlns:a="http://schemas.openxmlformats.org/drawingml/2006/main" xmlns:r="http://schemas.openxmlformats.org/officeDocument/2006/relationships" xmlns:p="http://schemas.openxmlformats.org/presentationml/2006/main">
+  <p:cSld>
+    <p:spTree>
+      <p:nvGrpSpPr>
+        <p:cNvPr id="1" name=""/>
+        <p:cNvGrpSpPr/>
+        <p:nvPr/>
+      </p:nvGrpSpPr>
+      <p:grpSpPr>
+        <a:xfrm>
+          <a:off x="0" y="0"/>
+          <a:ext cx="0" cy="0"/>
+          <a:chOff x="0" y="0"/>
+          <a:chExt cx="0" cy="0"/>
+        </a:xfrm>
+      </p:grpSpPr>
+      <p:sp>
+        <p:nvSpPr>
+          <p:cNvPr id="2" name="Titel 1"/>
+          <p:cNvSpPr>
+            <a:spLocks noGrp="1"/>
+          </p:cNvSpPr>
+          <p:nvPr>
+            <p:ph type="title"/>
+          </p:nvPr>
+        </p:nvSpPr>
+        <p:spPr/>
+        <p:txBody>
+          <a:bodyPr/>
+          <a:lstStyle/>
+          <a:p>
+            <a:r>
+              <a:rPr lang="en-US" dirty="0" smtClean="0"/>
+              <a:t>Meeting: </a:t>
+            </a:r>
+            <a:r>
+              <a:rPr lang="en-US" dirty="0" smtClean="0"/>
+              <a:t>08.02</a:t>
+            </a:r>
+            <a:r>
+              <a:rPr lang="en-US" dirty="0" smtClean="0"/>
+              <a:t>.21</a:t>
+            </a:r>
+            <a:endParaRPr lang="en-US" dirty="0"/>
+          </a:p>
+        </p:txBody>
+      </p:sp>
+      <p:sp>
+        <p:nvSpPr>
+          <p:cNvPr id="3" name="Textfeld 2"/>
+          <p:cNvSpPr txBox="1"/>
+          <p:nvPr/>
+        </p:nvSpPr>
+        <p:spPr>
+          <a:xfrm>
+            <a:off x="457200" y="1181365"/>
+            <a:ext cx="8229600" cy="4247317"/>
+          </a:xfrm>
+          <a:prstGeom prst="rect">
+            <a:avLst/>
+          </a:prstGeom>
+          <a:noFill/>
+        </p:spPr>
+        <p:txBody>
+          <a:bodyPr wrap="square" rtlCol="0">
+            <a:spAutoFit/>
+          </a:bodyPr>
+          <a:lstStyle/>
+          <a:p>
+            <a:pPr marL="285750" indent="-285750">
+              <a:buFont typeface="Arial"/>
+              <a:buChar char="•"/>
+            </a:pPr>
+            <a:r>
+              <a:rPr lang="de-DE" dirty="0" err="1"/>
+              <a:t>Counterfactual</a:t>
+            </a:r>
+            <a:r>
+              <a:rPr lang="de-DE" dirty="0"/>
+              <a:t> Explanation </a:t>
+            </a:r>
+            <a:r>
+              <a:rPr lang="de-DE" dirty="0" err="1"/>
+              <a:t>using</a:t>
+            </a:r>
+            <a:r>
+              <a:rPr lang="de-DE" dirty="0"/>
+              <a:t> </a:t>
+            </a:r>
+            <a:r>
+              <a:rPr lang="de-DE" dirty="0" err="1"/>
+              <a:t>generated</a:t>
+            </a:r>
+            <a:r>
+              <a:rPr lang="de-DE" dirty="0"/>
+              <a:t> </a:t>
+            </a:r>
+            <a:r>
+              <a:rPr lang="de-DE" dirty="0" err="1"/>
+              <a:t>ground</a:t>
+            </a:r>
+            <a:r>
+              <a:rPr lang="de-DE" dirty="0"/>
+              <a:t> </a:t>
+            </a:r>
+            <a:r>
+              <a:rPr lang="de-DE" dirty="0" err="1" smtClean="0"/>
+              <a:t>truths</a:t>
+            </a:r>
+            <a:r>
+              <a:rPr lang="de-DE" dirty="0" smtClean="0"/>
+              <a:t>:</a:t>
+            </a:r>
+          </a:p>
+          <a:p>
+            <a:pPr marL="742950" lvl="1" indent="-285750">
+              <a:buFont typeface="Arial"/>
+              <a:buChar char="•"/>
+            </a:pPr>
+            <a:r>
+              <a:rPr lang="de-DE" dirty="0" smtClean="0"/>
+              <a:t>Ändere Inputs </a:t>
+            </a:r>
+            <a:r>
+              <a:rPr lang="de-DE" dirty="0" err="1" smtClean="0"/>
+              <a:t>bzw</a:t>
+            </a:r>
+            <a:r>
+              <a:rPr lang="de-DE" dirty="0" smtClean="0"/>
+              <a:t> packe </a:t>
+            </a:r>
+            <a:r>
+              <a:rPr lang="de-DE" dirty="0" err="1" smtClean="0"/>
+              <a:t>counterfactuals</a:t>
+            </a:r>
+            <a:r>
+              <a:rPr lang="de-DE" dirty="0" smtClean="0"/>
+              <a:t> rein</a:t>
+            </a:r>
+          </a:p>
+          <a:p>
+            <a:pPr marL="742950" lvl="1" indent="-285750">
+              <a:buFont typeface="Arial"/>
+              <a:buChar char="•"/>
+            </a:pPr>
+            <a:r>
+              <a:rPr lang="de-DE" dirty="0" smtClean="0"/>
+              <a:t>Wenn sich </a:t>
+            </a:r>
+            <a:r>
+              <a:rPr lang="de-DE" dirty="0" err="1" smtClean="0"/>
+              <a:t>gradient</a:t>
+            </a:r>
+            <a:r>
+              <a:rPr lang="de-DE" dirty="0" smtClean="0"/>
+              <a:t> verändert = scheiße</a:t>
+            </a:r>
+            <a:endParaRPr lang="en-US" dirty="0" smtClean="0"/>
+          </a:p>
+          <a:p>
+            <a:pPr marL="285750" indent="-285750">
+              <a:buFont typeface="Arial"/>
+              <a:buChar char="•"/>
+            </a:pPr>
+            <a:r>
+              <a:rPr lang="en-US" dirty="0" smtClean="0"/>
+              <a:t>Relationship gradient und loss function: der gradient </a:t>
+            </a:r>
+            <a:r>
+              <a:rPr lang="en-US" dirty="0" err="1" smtClean="0"/>
+              <a:t>zeigt</a:t>
+            </a:r>
+            <a:r>
+              <a:rPr lang="en-US" dirty="0" smtClean="0"/>
+              <a:t> </a:t>
+            </a:r>
+            <a:r>
+              <a:rPr lang="en-US" dirty="0" err="1" smtClean="0"/>
+              <a:t>bei</a:t>
+            </a:r>
+            <a:r>
+              <a:rPr lang="en-US" dirty="0" smtClean="0"/>
+              <a:t> </a:t>
+            </a:r>
+            <a:r>
+              <a:rPr lang="en-US" dirty="0" err="1" smtClean="0"/>
+              <a:t>kleiner</a:t>
+            </a:r>
+            <a:r>
+              <a:rPr lang="en-US" dirty="0" smtClean="0"/>
+              <a:t> step size eh </a:t>
+            </a:r>
+            <a:r>
+              <a:rPr lang="en-US" dirty="0" err="1" smtClean="0"/>
+              <a:t>schon</a:t>
+            </a:r>
+            <a:r>
+              <a:rPr lang="en-US" dirty="0" smtClean="0"/>
+              <a:t> in die </a:t>
+            </a:r>
+            <a:r>
+              <a:rPr lang="en-US" dirty="0" err="1" smtClean="0"/>
+              <a:t>Richtige</a:t>
+            </a:r>
+            <a:r>
+              <a:rPr lang="en-US" dirty="0" smtClean="0"/>
+              <a:t> </a:t>
+            </a:r>
+            <a:r>
+              <a:rPr lang="en-US" dirty="0" err="1" smtClean="0"/>
+              <a:t>richtung</a:t>
+            </a:r>
+            <a:r>
+              <a:rPr lang="en-US" dirty="0" smtClean="0"/>
+              <a:t> </a:t>
+            </a:r>
+          </a:p>
+          <a:p>
+            <a:pPr marL="742950" lvl="1" indent="-285750">
+              <a:buFont typeface="Arial"/>
+              <a:buChar char="•"/>
+            </a:pPr>
+            <a:r>
+              <a:rPr lang="en-US" dirty="0" smtClean="0"/>
+              <a:t>Je </a:t>
+            </a:r>
+            <a:r>
+              <a:rPr lang="en-US" dirty="0" err="1" smtClean="0"/>
+              <a:t>nachdem</a:t>
+            </a:r>
+            <a:r>
+              <a:rPr lang="en-US" dirty="0" smtClean="0"/>
+              <a:t> </a:t>
+            </a:r>
+            <a:r>
+              <a:rPr lang="en-US" dirty="0" err="1" smtClean="0"/>
+              <a:t>wo</a:t>
+            </a:r>
+            <a:r>
+              <a:rPr lang="en-US" dirty="0" smtClean="0"/>
+              <a:t> man den </a:t>
+            </a:r>
+            <a:r>
+              <a:rPr lang="en-US" dirty="0" err="1" smtClean="0"/>
+              <a:t>Kausalitätstest</a:t>
+            </a:r>
+            <a:r>
+              <a:rPr lang="en-US" dirty="0" smtClean="0"/>
+              <a:t> </a:t>
+            </a:r>
+            <a:r>
+              <a:rPr lang="en-US" dirty="0" err="1" smtClean="0"/>
+              <a:t>nutzt</a:t>
+            </a:r>
+            <a:r>
+              <a:rPr lang="en-US" dirty="0" smtClean="0"/>
+              <a:t> (</a:t>
+            </a:r>
+            <a:r>
+              <a:rPr lang="en-US" dirty="0" err="1" smtClean="0"/>
+              <a:t>nach</a:t>
+            </a:r>
+            <a:r>
+              <a:rPr lang="en-US" dirty="0" smtClean="0"/>
+              <a:t> der non-</a:t>
+            </a:r>
+            <a:r>
+              <a:rPr lang="en-US" dirty="0" err="1" smtClean="0"/>
+              <a:t>linearität</a:t>
+            </a:r>
+            <a:r>
+              <a:rPr lang="en-US" dirty="0" smtClean="0"/>
+              <a:t>) </a:t>
+            </a:r>
+            <a:r>
+              <a:rPr lang="en-US" dirty="0" err="1" smtClean="0"/>
+              <a:t>kommt</a:t>
+            </a:r>
+            <a:r>
+              <a:rPr lang="en-US" dirty="0" smtClean="0"/>
+              <a:t> </a:t>
+            </a:r>
+            <a:r>
+              <a:rPr lang="en-US" dirty="0" err="1" smtClean="0"/>
+              <a:t>dann</a:t>
+            </a:r>
+            <a:r>
+              <a:rPr lang="en-US" dirty="0" smtClean="0"/>
+              <a:t> eh </a:t>
+            </a:r>
+            <a:r>
+              <a:rPr lang="en-US" dirty="0" err="1" smtClean="0"/>
+              <a:t>raus</a:t>
+            </a:r>
+            <a:r>
+              <a:rPr lang="en-US" dirty="0" smtClean="0"/>
+              <a:t>, </a:t>
+            </a:r>
+            <a:r>
+              <a:rPr lang="en-US" dirty="0" err="1" smtClean="0"/>
+              <a:t>dass</a:t>
+            </a:r>
+            <a:r>
+              <a:rPr lang="en-US" dirty="0" smtClean="0"/>
+              <a:t> der gradient </a:t>
+            </a:r>
+            <a:r>
+              <a:rPr lang="en-US" dirty="0" err="1" smtClean="0"/>
+              <a:t>Kausal</a:t>
+            </a:r>
+            <a:r>
+              <a:rPr lang="en-US" dirty="0" smtClean="0"/>
+              <a:t> </a:t>
+            </a:r>
+            <a:r>
+              <a:rPr lang="en-US" dirty="0" err="1" smtClean="0"/>
+              <a:t>ist</a:t>
+            </a:r>
+            <a:r>
+              <a:rPr lang="en-US" dirty="0" smtClean="0"/>
+              <a:t> </a:t>
+            </a:r>
+          </a:p>
+          <a:p>
+            <a:pPr marL="742950" lvl="1" indent="-285750">
+              <a:buFont typeface="Arial"/>
+              <a:buChar char="•"/>
+            </a:pPr>
+            <a:r>
+              <a:rPr lang="en-US" dirty="0" smtClean="0"/>
+              <a:t>Der gradient </a:t>
+            </a:r>
+            <a:r>
+              <a:rPr lang="en-US" dirty="0" err="1" smtClean="0"/>
+              <a:t>reduziert</a:t>
+            </a:r>
+            <a:r>
+              <a:rPr lang="en-US" dirty="0" smtClean="0"/>
+              <a:t> </a:t>
+            </a:r>
+            <a:r>
+              <a:rPr lang="en-US" dirty="0" err="1" smtClean="0"/>
+              <a:t>ja</a:t>
+            </a:r>
+            <a:r>
+              <a:rPr lang="en-US" dirty="0" smtClean="0"/>
+              <a:t> </a:t>
+            </a:r>
+            <a:r>
+              <a:rPr lang="en-US" dirty="0" err="1" smtClean="0"/>
+              <a:t>immer</a:t>
+            </a:r>
+            <a:r>
+              <a:rPr lang="en-US" dirty="0" smtClean="0"/>
+              <a:t> die loss-function </a:t>
+            </a:r>
+          </a:p>
+          <a:p>
+            <a:pPr marL="285750" indent="-285750">
+              <a:buFont typeface="Arial"/>
+              <a:buChar char="•"/>
+            </a:pPr>
+            <a:r>
+              <a:rPr lang="en-US" dirty="0" err="1" smtClean="0"/>
+              <a:t>Zielführendere</a:t>
+            </a:r>
+            <a:r>
+              <a:rPr lang="en-US" dirty="0" smtClean="0"/>
+              <a:t> </a:t>
+            </a:r>
+            <a:r>
+              <a:rPr lang="en-US" dirty="0" err="1" smtClean="0"/>
+              <a:t>Idee</a:t>
+            </a:r>
+            <a:r>
+              <a:rPr lang="en-US" dirty="0"/>
+              <a:t> </a:t>
+            </a:r>
+            <a:r>
+              <a:rPr lang="mr-IN" dirty="0" smtClean="0"/>
+              <a:t>–</a:t>
+            </a:r>
+            <a:r>
+              <a:rPr lang="en-US" dirty="0" smtClean="0"/>
+              <a:t> </a:t>
+            </a:r>
+            <a:r>
+              <a:rPr lang="en-US" dirty="0" err="1" smtClean="0"/>
+              <a:t>gleich</a:t>
+            </a:r>
+            <a:r>
+              <a:rPr lang="en-US" dirty="0" smtClean="0"/>
+              <a:t> auf die activation </a:t>
+            </a:r>
+            <a:r>
+              <a:rPr lang="en-US" dirty="0" err="1" smtClean="0"/>
+              <a:t>zu</a:t>
+            </a:r>
+            <a:r>
+              <a:rPr lang="en-US" dirty="0" smtClean="0"/>
+              <a:t> </a:t>
+            </a:r>
+            <a:r>
+              <a:rPr lang="en-US" dirty="0" err="1" smtClean="0"/>
+              <a:t>gehen</a:t>
+            </a:r>
+            <a:r>
+              <a:rPr lang="en-US" dirty="0" smtClean="0"/>
+              <a:t> </a:t>
+            </a:r>
+          </a:p>
+          <a:p>
+            <a:pPr marL="742950" lvl="1" indent="-285750">
+              <a:buFont typeface="Arial"/>
+              <a:buChar char="•"/>
+            </a:pPr>
+            <a:r>
+              <a:rPr lang="en-US" dirty="0" err="1" smtClean="0"/>
+              <a:t>Mit</a:t>
+            </a:r>
+            <a:r>
+              <a:rPr lang="en-US" dirty="0" smtClean="0"/>
+              <a:t> ACE </a:t>
+            </a:r>
+            <a:r>
+              <a:rPr lang="en-US" dirty="0" err="1" smtClean="0"/>
+              <a:t>oder</a:t>
+            </a:r>
+            <a:r>
+              <a:rPr lang="en-US" dirty="0" smtClean="0"/>
+              <a:t> </a:t>
+            </a:r>
+            <a:r>
+              <a:rPr lang="en-US" dirty="0" err="1" smtClean="0"/>
+              <a:t>ähnlichem</a:t>
+            </a:r>
+            <a:r>
+              <a:rPr lang="en-US" dirty="0" smtClean="0"/>
+              <a:t> </a:t>
+            </a:r>
+            <a:r>
+              <a:rPr lang="en-US" dirty="0" err="1" smtClean="0"/>
+              <a:t>zu</a:t>
+            </a:r>
+            <a:r>
+              <a:rPr lang="en-US" dirty="0" smtClean="0"/>
+              <a:t> </a:t>
+            </a:r>
+            <a:r>
+              <a:rPr lang="en-US" dirty="0" err="1" smtClean="0"/>
+              <a:t>testen</a:t>
+            </a:r>
+            <a:r>
+              <a:rPr lang="en-US" dirty="0" smtClean="0"/>
+              <a:t> </a:t>
+            </a:r>
+            <a:r>
+              <a:rPr lang="en-US" dirty="0" err="1" smtClean="0"/>
+              <a:t>ob</a:t>
+            </a:r>
+            <a:r>
+              <a:rPr lang="en-US" dirty="0" smtClean="0"/>
+              <a:t> die activations in </a:t>
+            </a:r>
+            <a:r>
+              <a:rPr lang="en-US" dirty="0" err="1" smtClean="0"/>
+              <a:t>dem</a:t>
+            </a:r>
+            <a:r>
+              <a:rPr lang="en-US" dirty="0" smtClean="0"/>
+              <a:t> NN </a:t>
+            </a:r>
+            <a:r>
+              <a:rPr lang="en-US" dirty="0" err="1" smtClean="0"/>
+              <a:t>kausal</a:t>
+            </a:r>
+            <a:r>
+              <a:rPr lang="en-US" dirty="0" smtClean="0"/>
+              <a:t> </a:t>
+            </a:r>
+            <a:r>
+              <a:rPr lang="en-US" dirty="0" err="1" smtClean="0"/>
+              <a:t>verhalten</a:t>
+            </a:r>
+            <a:r>
+              <a:rPr lang="en-US" dirty="0" smtClean="0"/>
+              <a:t> </a:t>
+            </a:r>
+          </a:p>
+          <a:p>
+            <a:pPr marL="742950" lvl="1" indent="-285750">
+              <a:buFont typeface="Arial"/>
+              <a:buChar char="•"/>
+            </a:pPr>
+            <a:r>
+              <a:rPr lang="en-US" dirty="0" err="1" smtClean="0"/>
+              <a:t>Gibt</a:t>
+            </a:r>
+            <a:r>
+              <a:rPr lang="en-US" dirty="0" smtClean="0"/>
+              <a:t> </a:t>
+            </a:r>
+            <a:r>
+              <a:rPr lang="en-US" dirty="0" err="1" smtClean="0"/>
+              <a:t>es</a:t>
+            </a:r>
+            <a:r>
+              <a:rPr lang="en-US" dirty="0" smtClean="0"/>
+              <a:t> </a:t>
+            </a:r>
+            <a:r>
+              <a:rPr lang="en-US" dirty="0" err="1" smtClean="0"/>
+              <a:t>Neuronen</a:t>
+            </a:r>
+            <a:r>
+              <a:rPr lang="en-US" dirty="0" smtClean="0"/>
+              <a:t> die </a:t>
+            </a:r>
+            <a:r>
+              <a:rPr lang="en-US" dirty="0" err="1" smtClean="0"/>
+              <a:t>sich</a:t>
+            </a:r>
+            <a:r>
+              <a:rPr lang="en-US" dirty="0" smtClean="0"/>
+              <a:t> </a:t>
+            </a:r>
+            <a:r>
+              <a:rPr lang="en-US" dirty="0" err="1" smtClean="0"/>
+              <a:t>weniger</a:t>
+            </a:r>
+            <a:r>
+              <a:rPr lang="en-US" dirty="0" smtClean="0"/>
+              <a:t> </a:t>
+            </a:r>
+            <a:r>
+              <a:rPr lang="en-US" dirty="0" err="1" smtClean="0"/>
+              <a:t>kausal</a:t>
+            </a:r>
+            <a:r>
+              <a:rPr lang="en-US" dirty="0" smtClean="0"/>
+              <a:t> </a:t>
+            </a:r>
+            <a:r>
+              <a:rPr lang="en-US" dirty="0" err="1" smtClean="0"/>
+              <a:t>Verhalten</a:t>
+            </a:r>
+            <a:r>
+              <a:rPr lang="en-US" dirty="0" smtClean="0"/>
+              <a:t>? </a:t>
+            </a:r>
+          </a:p>
+          <a:p>
+            <a:pPr marL="742950" lvl="1" indent="-285750">
+              <a:buFont typeface="Arial"/>
+              <a:buChar char="•"/>
+            </a:pPr>
+            <a:r>
+              <a:rPr lang="en-US" dirty="0" err="1" smtClean="0"/>
+              <a:t>Gibt</a:t>
+            </a:r>
+            <a:r>
+              <a:rPr lang="en-US" dirty="0" smtClean="0"/>
+              <a:t> </a:t>
+            </a:r>
+            <a:r>
+              <a:rPr lang="en-US" dirty="0" err="1" smtClean="0"/>
+              <a:t>es</a:t>
+            </a:r>
+            <a:r>
+              <a:rPr lang="en-US" dirty="0" smtClean="0"/>
+              <a:t> </a:t>
+            </a:r>
+            <a:r>
+              <a:rPr lang="en-US" dirty="0" err="1" smtClean="0"/>
+              <a:t>Neuronen</a:t>
+            </a:r>
+            <a:r>
+              <a:rPr lang="en-US" dirty="0" smtClean="0"/>
+              <a:t> die </a:t>
+            </a:r>
+            <a:r>
+              <a:rPr lang="en-US" dirty="0" err="1" smtClean="0"/>
+              <a:t>für</a:t>
+            </a:r>
+            <a:r>
+              <a:rPr lang="en-US" dirty="0" smtClean="0"/>
+              <a:t> </a:t>
+            </a:r>
+            <a:r>
+              <a:rPr lang="en-US" dirty="0" err="1" smtClean="0"/>
+              <a:t>alles</a:t>
+            </a:r>
+            <a:r>
+              <a:rPr lang="en-US" dirty="0" smtClean="0"/>
+              <a:t> </a:t>
+            </a:r>
+            <a:r>
+              <a:rPr lang="en-US" dirty="0" err="1" smtClean="0"/>
+              <a:t>eine</a:t>
+            </a:r>
+            <a:r>
+              <a:rPr lang="en-US" dirty="0" smtClean="0"/>
+              <a:t> </a:t>
+            </a:r>
+            <a:r>
+              <a:rPr lang="en-US" dirty="0" err="1" smtClean="0"/>
+              <a:t>Rolle</a:t>
+            </a:r>
+            <a:r>
+              <a:rPr lang="en-US" dirty="0" smtClean="0"/>
+              <a:t> </a:t>
+            </a:r>
+            <a:r>
+              <a:rPr lang="en-US" dirty="0" err="1" smtClean="0"/>
+              <a:t>spielen</a:t>
+            </a:r>
+            <a:r>
+              <a:rPr lang="en-US" dirty="0" smtClean="0"/>
+              <a:t> </a:t>
+            </a:r>
+            <a:r>
+              <a:rPr lang="en-US" dirty="0" err="1" smtClean="0"/>
+              <a:t>oder</a:t>
+            </a:r>
+            <a:r>
+              <a:rPr lang="en-US" dirty="0" smtClean="0"/>
+              <a:t> </a:t>
+            </a:r>
+            <a:r>
+              <a:rPr lang="en-US" dirty="0" err="1" smtClean="0"/>
+              <a:t>nur</a:t>
+            </a:r>
+            <a:r>
+              <a:rPr lang="en-US" dirty="0" smtClean="0"/>
+              <a:t> </a:t>
+            </a:r>
+            <a:r>
+              <a:rPr lang="en-US" dirty="0" err="1" smtClean="0"/>
+              <a:t>für</a:t>
+            </a:r>
+            <a:r>
+              <a:rPr lang="en-US" dirty="0" smtClean="0"/>
+              <a:t> </a:t>
+            </a:r>
+            <a:r>
+              <a:rPr lang="en-US" dirty="0" err="1" smtClean="0"/>
+              <a:t>ein</a:t>
+            </a:r>
+            <a:r>
+              <a:rPr lang="en-US" dirty="0" smtClean="0"/>
+              <a:t> </a:t>
+            </a:r>
+            <a:r>
+              <a:rPr lang="en-US" dirty="0" err="1" smtClean="0"/>
+              <a:t>paar</a:t>
+            </a:r>
+            <a:r>
+              <a:rPr lang="en-US" dirty="0" smtClean="0"/>
+              <a:t> samples?</a:t>
+            </a:r>
+          </a:p>
+          <a:p>
+            <a:pPr marL="742950" lvl="1" indent="-285750">
+              <a:buFont typeface="Arial"/>
+              <a:buChar char="•"/>
+            </a:pPr>
+            <a:r>
+              <a:rPr lang="en-US" dirty="0" err="1" smtClean="0"/>
+              <a:t>Allgemein</a:t>
+            </a:r>
+            <a:r>
+              <a:rPr lang="en-US" dirty="0" smtClean="0"/>
+              <a:t> </a:t>
+            </a:r>
+            <a:r>
+              <a:rPr lang="en-US" dirty="0" err="1" smtClean="0"/>
+              <a:t>spannend</a:t>
+            </a:r>
+            <a:r>
+              <a:rPr lang="en-US" dirty="0" smtClean="0"/>
+              <a:t> </a:t>
+            </a:r>
+            <a:r>
+              <a:rPr lang="en-US" dirty="0" err="1" smtClean="0"/>
+              <a:t>wie</a:t>
+            </a:r>
+            <a:r>
+              <a:rPr lang="en-US" dirty="0" smtClean="0"/>
+              <a:t> </a:t>
+            </a:r>
+            <a:r>
+              <a:rPr lang="en-US" dirty="0" err="1" smtClean="0"/>
+              <a:t>diese</a:t>
+            </a:r>
+            <a:r>
+              <a:rPr lang="en-US" dirty="0" smtClean="0"/>
+              <a:t> </a:t>
+            </a:r>
+            <a:r>
+              <a:rPr lang="en-US" dirty="0" err="1" smtClean="0"/>
+              <a:t>sich</a:t>
+            </a:r>
+            <a:r>
+              <a:rPr lang="en-US" dirty="0" smtClean="0"/>
+              <a:t> </a:t>
+            </a:r>
+            <a:r>
+              <a:rPr lang="en-US" dirty="0" err="1" smtClean="0"/>
+              <a:t>verhalten</a:t>
+            </a:r>
+            <a:endParaRPr lang="en-US" dirty="0" smtClean="0"/>
+          </a:p>
+        </p:txBody>
+      </p:sp>
+    </p:spTree>
+    <p:extLst>
+      <p:ext uri="{BB962C8B-B14F-4D97-AF65-F5344CB8AC3E}">
+        <p14:creationId xmlns:p14="http://schemas.microsoft.com/office/powerpoint/2010/main" val="3008981945"/>
+      </p:ext>
+    </p:extLst>
+  </p:cSld>
+  <p:clrMapOvr>
+    <a:masterClrMapping/>
+  </p:clrMapOvr>
+</p:sld>
+</file>
+
+<file path=ppt/slides/slide11.xml><?xml version="1.0" encoding="utf-8"?>
+<p:sld xmlns:a="http://schemas.openxmlformats.org/drawingml/2006/main" xmlns:r="http://schemas.openxmlformats.org/officeDocument/2006/relationships" xmlns:p="http://schemas.openxmlformats.org/presentationml/2006/main">
+  <p:cSld>
+    <p:spTree>
+      <p:nvGrpSpPr>
+        <p:cNvPr id="1" name=""/>
+        <p:cNvGrpSpPr/>
+        <p:nvPr/>
+      </p:nvGrpSpPr>
+      <p:grpSpPr>
+        <a:xfrm>
+          <a:off x="0" y="0"/>
+          <a:ext cx="0" cy="0"/>
+          <a:chOff x="0" y="0"/>
+          <a:chExt cx="0" cy="0"/>
+        </a:xfrm>
+      </p:grpSpPr>
+      <p:sp>
+        <p:nvSpPr>
+          <p:cNvPr id="2" name="Titel 1"/>
+          <p:cNvSpPr>
+            <a:spLocks noGrp="1"/>
+          </p:cNvSpPr>
+          <p:nvPr>
+            <p:ph type="title"/>
+          </p:nvPr>
+        </p:nvSpPr>
+        <p:spPr/>
+        <p:txBody>
+          <a:bodyPr/>
+          <a:lstStyle/>
+          <a:p>
+            <a:r>
+              <a:rPr lang="en-US" dirty="0" smtClean="0"/>
+              <a:t>Meeting: </a:t>
+            </a:r>
+            <a:r>
+              <a:rPr lang="en-US" dirty="0" smtClean="0"/>
+              <a:t>08.02</a:t>
+            </a:r>
+            <a:r>
+              <a:rPr lang="en-US" dirty="0" smtClean="0"/>
+              <a:t>.21</a:t>
+            </a:r>
+            <a:endParaRPr lang="en-US" dirty="0"/>
+          </a:p>
+        </p:txBody>
+      </p:sp>
+      <p:sp>
+        <p:nvSpPr>
+          <p:cNvPr id="3" name="Textfeld 2"/>
+          <p:cNvSpPr txBox="1"/>
+          <p:nvPr/>
+        </p:nvSpPr>
+        <p:spPr>
+          <a:xfrm>
+            <a:off x="457200" y="1181365"/>
+            <a:ext cx="8229600" cy="3970318"/>
+          </a:xfrm>
+          <a:prstGeom prst="rect">
+            <a:avLst/>
+          </a:prstGeom>
+          <a:noFill/>
+        </p:spPr>
+        <p:txBody>
+          <a:bodyPr wrap="square" rtlCol="0">
+            <a:spAutoFit/>
+          </a:bodyPr>
+          <a:lstStyle/>
+          <a:p>
+            <a:pPr marL="285750" indent="-285750">
+              <a:buFont typeface="Arial"/>
+              <a:buChar char="•"/>
+            </a:pPr>
+            <a:r>
+              <a:rPr lang="en-US" dirty="0" err="1" smtClean="0"/>
+              <a:t>Testen</a:t>
+            </a:r>
+            <a:r>
+              <a:rPr lang="en-US" dirty="0" smtClean="0"/>
+              <a:t> der </a:t>
+            </a:r>
+            <a:r>
+              <a:rPr lang="en-US" dirty="0" err="1" smtClean="0"/>
+              <a:t>Kausalität</a:t>
+            </a:r>
+            <a:r>
+              <a:rPr lang="en-US" dirty="0" smtClean="0"/>
+              <a:t>:</a:t>
+            </a:r>
+          </a:p>
+          <a:p>
+            <a:pPr marL="742950" lvl="1" indent="-285750">
+              <a:buFont typeface="Arial"/>
+              <a:buChar char="•"/>
+            </a:pPr>
+            <a:r>
+              <a:rPr lang="en-US" dirty="0" smtClean="0"/>
+              <a:t>Der Test error </a:t>
+            </a:r>
+            <a:r>
+              <a:rPr lang="en-US" dirty="0" err="1" smtClean="0"/>
+              <a:t>sollte</a:t>
+            </a:r>
+            <a:r>
+              <a:rPr lang="en-US" dirty="0" smtClean="0"/>
+              <a:t> </a:t>
+            </a:r>
+            <a:r>
+              <a:rPr lang="en-US" dirty="0" err="1" smtClean="0"/>
+              <a:t>kleiner</a:t>
+            </a:r>
+            <a:r>
+              <a:rPr lang="en-US" dirty="0" smtClean="0"/>
+              <a:t> </a:t>
+            </a:r>
+            <a:r>
+              <a:rPr lang="en-US" dirty="0" err="1" smtClean="0"/>
+              <a:t>werden</a:t>
+            </a:r>
+            <a:r>
+              <a:rPr lang="en-US" dirty="0" smtClean="0"/>
+              <a:t> </a:t>
+            </a:r>
+          </a:p>
+          <a:p>
+            <a:pPr marL="742950" lvl="1" indent="-285750">
+              <a:buFont typeface="Arial"/>
+              <a:buChar char="•"/>
+            </a:pPr>
+            <a:r>
+              <a:rPr lang="en-US" dirty="0" smtClean="0"/>
+              <a:t>Der training error </a:t>
+            </a:r>
+            <a:r>
+              <a:rPr lang="en-US" dirty="0" err="1" smtClean="0"/>
+              <a:t>eher</a:t>
+            </a:r>
+            <a:r>
+              <a:rPr lang="en-US" dirty="0" smtClean="0"/>
+              <a:t> </a:t>
+            </a:r>
+            <a:r>
+              <a:rPr lang="en-US" dirty="0" err="1" smtClean="0"/>
+              <a:t>größer</a:t>
+            </a:r>
+            <a:r>
+              <a:rPr lang="en-US" dirty="0" smtClean="0"/>
+              <a:t> </a:t>
+            </a:r>
+          </a:p>
+          <a:p>
+            <a:pPr marL="285750" indent="-285750">
+              <a:buFont typeface="Arial"/>
+              <a:buChar char="•"/>
+            </a:pPr>
+            <a:r>
+              <a:rPr lang="en-US" dirty="0" smtClean="0"/>
+              <a:t>Der </a:t>
+            </a:r>
+            <a:r>
+              <a:rPr lang="en-US" dirty="0" err="1" smtClean="0"/>
+              <a:t>normale</a:t>
+            </a:r>
+            <a:r>
+              <a:rPr lang="en-US" dirty="0" smtClean="0"/>
+              <a:t> </a:t>
+            </a:r>
+            <a:r>
+              <a:rPr lang="en-US" dirty="0" err="1" smtClean="0"/>
+              <a:t>vgl</a:t>
+            </a:r>
+            <a:r>
+              <a:rPr lang="en-US" dirty="0" smtClean="0"/>
+              <a:t>. </a:t>
+            </a:r>
+            <a:r>
+              <a:rPr lang="en-US" dirty="0" err="1" smtClean="0"/>
+              <a:t>Zwischen</a:t>
+            </a:r>
+            <a:r>
+              <a:rPr lang="en-US" dirty="0" smtClean="0"/>
+              <a:t> Training und </a:t>
+            </a:r>
+            <a:r>
+              <a:rPr lang="en-US" dirty="0" err="1" smtClean="0"/>
+              <a:t>Testerror</a:t>
+            </a:r>
+            <a:r>
+              <a:rPr lang="en-US" dirty="0" smtClean="0"/>
+              <a:t> </a:t>
+            </a:r>
+            <a:r>
+              <a:rPr lang="en-US" dirty="0" err="1" smtClean="0"/>
+              <a:t>hält</a:t>
+            </a:r>
+            <a:r>
+              <a:rPr lang="en-US" dirty="0" smtClean="0"/>
+              <a:t> </a:t>
+            </a:r>
+            <a:r>
+              <a:rPr lang="en-US" dirty="0" err="1" smtClean="0"/>
+              <a:t>nicht</a:t>
+            </a:r>
+            <a:r>
+              <a:rPr lang="en-US" dirty="0" smtClean="0"/>
+              <a:t> </a:t>
+            </a:r>
+            <a:r>
+              <a:rPr lang="en-US" dirty="0" err="1" smtClean="0"/>
+              <a:t>mehr</a:t>
+            </a:r>
+            <a:r>
+              <a:rPr lang="en-US" dirty="0" smtClean="0"/>
+              <a:t> </a:t>
+            </a:r>
+          </a:p>
+          <a:p>
+            <a:pPr marL="285750" indent="-285750">
+              <a:buFont typeface="Arial"/>
+              <a:buChar char="•"/>
+            </a:pPr>
+            <a:r>
+              <a:rPr lang="en-US" dirty="0" err="1" smtClean="0"/>
+              <a:t>Kausalität</a:t>
+            </a:r>
+            <a:r>
+              <a:rPr lang="en-US" dirty="0" smtClean="0"/>
+              <a:t> </a:t>
+            </a:r>
+            <a:r>
+              <a:rPr lang="en-US" dirty="0" err="1" smtClean="0"/>
+              <a:t>hilft</a:t>
+            </a:r>
+            <a:r>
+              <a:rPr lang="en-US" dirty="0" smtClean="0"/>
+              <a:t> das NN </a:t>
+            </a:r>
+            <a:r>
+              <a:rPr lang="en-US" dirty="0" err="1" smtClean="0"/>
+              <a:t>zu</a:t>
+            </a:r>
+            <a:r>
+              <a:rPr lang="en-US" dirty="0" smtClean="0"/>
+              <a:t> </a:t>
+            </a:r>
+            <a:r>
+              <a:rPr lang="en-US" dirty="0" err="1" smtClean="0"/>
+              <a:t>generalisieren</a:t>
+            </a:r>
+            <a:r>
+              <a:rPr lang="en-US" dirty="0" smtClean="0"/>
+              <a:t> </a:t>
+            </a:r>
+          </a:p>
+          <a:p>
+            <a:pPr marL="742950" lvl="1" indent="-285750">
+              <a:buFont typeface="Arial"/>
+              <a:buChar char="•"/>
+            </a:pPr>
+            <a:r>
+              <a:rPr lang="en-US" dirty="0" err="1" smtClean="0"/>
+              <a:t>Mindestens</a:t>
+            </a:r>
+            <a:r>
+              <a:rPr lang="en-US" dirty="0" smtClean="0"/>
+              <a:t> </a:t>
+            </a:r>
+            <a:r>
+              <a:rPr lang="en-US" dirty="0" err="1" smtClean="0"/>
+              <a:t>gleich</a:t>
+            </a:r>
+            <a:r>
+              <a:rPr lang="en-US" dirty="0" smtClean="0"/>
+              <a:t> </a:t>
+            </a:r>
+            <a:r>
+              <a:rPr lang="en-US" dirty="0" err="1" smtClean="0"/>
+              <a:t>gutes</a:t>
+            </a:r>
+            <a:r>
+              <a:rPr lang="en-US" dirty="0" smtClean="0"/>
+              <a:t> </a:t>
+            </a:r>
+            <a:r>
+              <a:rPr lang="en-US" dirty="0" err="1" smtClean="0"/>
+              <a:t>verhalten</a:t>
+            </a:r>
+            <a:r>
+              <a:rPr lang="en-US" dirty="0" smtClean="0"/>
+              <a:t> </a:t>
+            </a:r>
+            <a:r>
+              <a:rPr lang="en-US" dirty="0" err="1" smtClean="0"/>
+              <a:t>wenn</a:t>
+            </a:r>
+            <a:r>
+              <a:rPr lang="en-US" dirty="0" smtClean="0"/>
+              <a:t> </a:t>
+            </a:r>
+            <a:r>
+              <a:rPr lang="en-US" dirty="0" err="1" smtClean="0"/>
+              <a:t>nicht</a:t>
+            </a:r>
+            <a:r>
+              <a:rPr lang="en-US" dirty="0" smtClean="0"/>
+              <a:t> </a:t>
+            </a:r>
+            <a:r>
+              <a:rPr lang="en-US" dirty="0" err="1" smtClean="0"/>
+              <a:t>besseres</a:t>
+            </a:r>
+            <a:r>
+              <a:rPr lang="en-US" dirty="0" smtClean="0"/>
+              <a:t> auf </a:t>
+            </a:r>
+            <a:r>
+              <a:rPr lang="en-US" dirty="0" err="1" smtClean="0"/>
+              <a:t>testdaten</a:t>
+            </a:r>
+            <a:r>
+              <a:rPr lang="en-US" dirty="0" smtClean="0"/>
+              <a:t> des </a:t>
+            </a:r>
+            <a:r>
+              <a:rPr lang="en-US" dirty="0" err="1" smtClean="0"/>
+              <a:t>Kausalen</a:t>
+            </a:r>
+            <a:r>
+              <a:rPr lang="en-US" dirty="0" smtClean="0"/>
+              <a:t> </a:t>
+            </a:r>
+            <a:r>
+              <a:rPr lang="en-US" dirty="0" err="1" smtClean="0"/>
+              <a:t>Netzes</a:t>
+            </a:r>
+            <a:r>
+              <a:rPr lang="en-US" dirty="0" smtClean="0"/>
+              <a:t> </a:t>
+            </a:r>
+            <a:r>
+              <a:rPr lang="en-US" dirty="0" err="1" smtClean="0"/>
+              <a:t>im</a:t>
+            </a:r>
+            <a:r>
+              <a:rPr lang="en-US" dirty="0" smtClean="0"/>
+              <a:t> </a:t>
+            </a:r>
+            <a:r>
+              <a:rPr lang="en-US" dirty="0" err="1" smtClean="0"/>
+              <a:t>vgl</a:t>
+            </a:r>
+            <a:r>
+              <a:rPr lang="en-US" dirty="0" smtClean="0"/>
+              <a:t> </a:t>
+            </a:r>
+            <a:r>
+              <a:rPr lang="en-US" dirty="0" err="1" smtClean="0"/>
+              <a:t>zum</a:t>
+            </a:r>
+            <a:r>
+              <a:rPr lang="en-US" dirty="0" smtClean="0"/>
+              <a:t> Standard </a:t>
+            </a:r>
+            <a:r>
+              <a:rPr lang="en-US" dirty="0" err="1" smtClean="0"/>
+              <a:t>Netz</a:t>
+            </a:r>
+            <a:r>
+              <a:rPr lang="en-US" dirty="0" smtClean="0"/>
+              <a:t> </a:t>
+            </a:r>
+          </a:p>
+          <a:p>
+            <a:pPr marL="742950" lvl="1" indent="-285750">
+              <a:buFont typeface="Arial"/>
+              <a:buChar char="•"/>
+            </a:pPr>
+            <a:r>
+              <a:rPr lang="en-US" dirty="0" err="1" smtClean="0"/>
+              <a:t>Bereich</a:t>
+            </a:r>
+            <a:r>
+              <a:rPr lang="en-US" dirty="0" smtClean="0"/>
+              <a:t> in den </a:t>
+            </a:r>
+            <a:r>
+              <a:rPr lang="en-US" dirty="0" err="1" smtClean="0"/>
+              <a:t>Daten</a:t>
+            </a:r>
+            <a:r>
+              <a:rPr lang="en-US" dirty="0" smtClean="0"/>
+              <a:t> </a:t>
+            </a:r>
+            <a:r>
+              <a:rPr lang="en-US" dirty="0" err="1" smtClean="0"/>
+              <a:t>rausholen</a:t>
+            </a:r>
+            <a:r>
+              <a:rPr lang="en-US" dirty="0" smtClean="0"/>
+              <a:t> und </a:t>
+            </a:r>
+            <a:r>
+              <a:rPr lang="en-US" dirty="0" err="1" smtClean="0"/>
+              <a:t>nicht</a:t>
+            </a:r>
+            <a:r>
+              <a:rPr lang="en-US" dirty="0" smtClean="0"/>
+              <a:t> random points von </a:t>
+            </a:r>
+            <a:r>
+              <a:rPr lang="en-US" dirty="0" err="1" smtClean="0"/>
+              <a:t>überall</a:t>
+            </a:r>
+            <a:r>
+              <a:rPr lang="en-US" dirty="0" smtClean="0"/>
+              <a:t> </a:t>
+            </a:r>
+            <a:r>
+              <a:rPr lang="en-US" dirty="0" err="1" smtClean="0"/>
+              <a:t>zum</a:t>
+            </a:r>
+            <a:r>
+              <a:rPr lang="en-US" dirty="0" smtClean="0"/>
+              <a:t> </a:t>
+            </a:r>
+            <a:r>
+              <a:rPr lang="en-US" dirty="0" err="1" smtClean="0"/>
+              <a:t>testen</a:t>
+            </a:r>
+            <a:r>
+              <a:rPr lang="en-US" dirty="0" smtClean="0"/>
+              <a:t> (dataset shift): </a:t>
+            </a:r>
+            <a:r>
+              <a:rPr lang="en-US" dirty="0" err="1" smtClean="0"/>
+              <a:t>hier</a:t>
+            </a:r>
+            <a:r>
+              <a:rPr lang="en-US" dirty="0" smtClean="0"/>
+              <a:t> </a:t>
+            </a:r>
+            <a:r>
+              <a:rPr lang="en-US" dirty="0" err="1" smtClean="0"/>
+              <a:t>sollte</a:t>
+            </a:r>
+            <a:r>
+              <a:rPr lang="en-US" dirty="0" smtClean="0"/>
+              <a:t> der error </a:t>
+            </a:r>
+            <a:r>
+              <a:rPr lang="en-US" dirty="0" err="1" smtClean="0"/>
+              <a:t>dann</a:t>
+            </a:r>
+            <a:r>
+              <a:rPr lang="en-US" dirty="0" smtClean="0"/>
+              <a:t> </a:t>
+            </a:r>
+            <a:r>
+              <a:rPr lang="en-US" dirty="0" err="1" smtClean="0"/>
+              <a:t>besser</a:t>
+            </a:r>
+            <a:r>
+              <a:rPr lang="en-US" dirty="0" smtClean="0"/>
+              <a:t> </a:t>
+            </a:r>
+            <a:r>
+              <a:rPr lang="en-US" dirty="0" err="1" smtClean="0"/>
+              <a:t>sein</a:t>
+            </a:r>
+            <a:r>
+              <a:rPr lang="en-US" dirty="0" smtClean="0"/>
+              <a:t> </a:t>
+            </a:r>
+            <a:r>
+              <a:rPr lang="en-US" dirty="0" err="1" smtClean="0"/>
+              <a:t>als</a:t>
+            </a:r>
+            <a:r>
+              <a:rPr lang="en-US" dirty="0" smtClean="0"/>
+              <a:t> </a:t>
+            </a:r>
+            <a:r>
+              <a:rPr lang="en-US" dirty="0" err="1" smtClean="0"/>
+              <a:t>beim</a:t>
+            </a:r>
+            <a:r>
+              <a:rPr lang="en-US" dirty="0" smtClean="0"/>
+              <a:t> </a:t>
+            </a:r>
+            <a:r>
+              <a:rPr lang="en-US" dirty="0" err="1" smtClean="0"/>
+              <a:t>normalen</a:t>
+            </a:r>
+            <a:r>
+              <a:rPr lang="en-US" dirty="0" smtClean="0"/>
+              <a:t> </a:t>
+            </a:r>
+            <a:r>
+              <a:rPr lang="en-US" dirty="0" err="1" smtClean="0"/>
+              <a:t>Netz</a:t>
+            </a:r>
+            <a:endParaRPr lang="en-US" dirty="0" smtClean="0"/>
+          </a:p>
+          <a:p>
+            <a:pPr marL="285750" indent="-285750">
+              <a:buFont typeface="Arial"/>
+              <a:buChar char="•"/>
+            </a:pPr>
+            <a:r>
+              <a:rPr lang="en-US" dirty="0"/>
+              <a:t>Test-Samples </a:t>
+            </a:r>
+            <a:r>
+              <a:rPr lang="en-US" dirty="0" err="1"/>
+              <a:t>zufällig</a:t>
+            </a:r>
+            <a:r>
+              <a:rPr lang="en-US" dirty="0"/>
+              <a:t> </a:t>
+            </a:r>
+            <a:r>
+              <a:rPr lang="en-US" dirty="0" err="1"/>
+              <a:t>aus</a:t>
+            </a:r>
+            <a:r>
+              <a:rPr lang="en-US" dirty="0"/>
+              <a:t> der </a:t>
+            </a:r>
+            <a:r>
+              <a:rPr lang="en-US" dirty="0" err="1"/>
+              <a:t>gleichen</a:t>
+            </a:r>
+            <a:r>
+              <a:rPr lang="en-US" dirty="0"/>
+              <a:t> Domain </a:t>
+            </a:r>
+            <a:r>
+              <a:rPr lang="en-US" dirty="0" err="1"/>
+              <a:t>gezogen</a:t>
+            </a:r>
+            <a:r>
+              <a:rPr lang="en-US" dirty="0"/>
+              <a:t> </a:t>
+            </a:r>
+            <a:r>
+              <a:rPr lang="en-US" dirty="0" err="1"/>
+              <a:t>werden</a:t>
+            </a:r>
+            <a:r>
+              <a:rPr lang="en-US" dirty="0"/>
+              <a:t> </a:t>
+            </a:r>
+            <a:r>
+              <a:rPr lang="en-US" dirty="0" err="1"/>
+              <a:t>wie</a:t>
+            </a:r>
+            <a:r>
+              <a:rPr lang="en-US" dirty="0"/>
+              <a:t> die </a:t>
+            </a:r>
+            <a:r>
+              <a:rPr lang="en-US" dirty="0" err="1" smtClean="0"/>
+              <a:t>Trainingssamples</a:t>
+            </a:r>
+            <a:r>
+              <a:rPr lang="en-US" dirty="0" smtClean="0"/>
+              <a:t>: </a:t>
+            </a:r>
+            <a:r>
+              <a:rPr lang="en-US" dirty="0" err="1" smtClean="0"/>
+              <a:t>Effekt</a:t>
+            </a:r>
+            <a:r>
+              <a:rPr lang="en-US" dirty="0" smtClean="0"/>
+              <a:t> (</a:t>
+            </a:r>
+            <a:r>
+              <a:rPr lang="en-US" dirty="0" err="1" smtClean="0"/>
+              <a:t>genereller</a:t>
+            </a:r>
+            <a:r>
+              <a:rPr lang="en-US" dirty="0" smtClean="0"/>
+              <a:t>) </a:t>
+            </a:r>
+            <a:r>
+              <a:rPr lang="en-US" dirty="0" err="1"/>
+              <a:t>nicht</a:t>
+            </a:r>
+            <a:r>
+              <a:rPr lang="en-US" dirty="0"/>
+              <a:t> </a:t>
+            </a:r>
+            <a:r>
+              <a:rPr lang="en-US" dirty="0" err="1"/>
+              <a:t>sehen</a:t>
+            </a:r>
+            <a:r>
+              <a:rPr lang="en-US" dirty="0"/>
+              <a:t> </a:t>
+            </a:r>
+            <a:r>
+              <a:rPr lang="en-US" dirty="0" err="1"/>
+              <a:t>könnte</a:t>
+            </a:r>
+            <a:r>
+              <a:rPr lang="en-US" dirty="0"/>
+              <a:t> (</a:t>
+            </a:r>
+            <a:r>
+              <a:rPr lang="en-US" dirty="0" err="1"/>
+              <a:t>oder</a:t>
+            </a:r>
+            <a:r>
+              <a:rPr lang="en-US" dirty="0"/>
+              <a:t> </a:t>
+            </a:r>
+            <a:r>
+              <a:rPr lang="en-US" dirty="0" err="1"/>
+              <a:t>sogar</a:t>
+            </a:r>
+            <a:r>
+              <a:rPr lang="en-US" dirty="0"/>
+              <a:t> </a:t>
+            </a:r>
+            <a:r>
+              <a:rPr lang="en-US" dirty="0" err="1"/>
+              <a:t>schlechtere</a:t>
+            </a:r>
+            <a:r>
+              <a:rPr lang="en-US" dirty="0"/>
+              <a:t> </a:t>
+            </a:r>
+            <a:r>
+              <a:rPr lang="en-US" dirty="0" err="1"/>
+              <a:t>Ergebnisse</a:t>
+            </a:r>
+            <a:r>
+              <a:rPr lang="en-US" dirty="0"/>
+              <a:t> </a:t>
+            </a:r>
+            <a:r>
+              <a:rPr lang="en-US" dirty="0" err="1"/>
+              <a:t>erzielen</a:t>
+            </a:r>
+            <a:r>
+              <a:rPr lang="en-US" dirty="0"/>
+              <a:t> </a:t>
+            </a:r>
+            <a:r>
+              <a:rPr lang="en-US" dirty="0" err="1"/>
+              <a:t>könnte</a:t>
+            </a:r>
+            <a:r>
+              <a:rPr lang="en-US" dirty="0"/>
+              <a:t>)</a:t>
+            </a:r>
+            <a:r>
+              <a:rPr lang="en-US" dirty="0" smtClean="0"/>
+              <a:t>.</a:t>
+            </a:r>
+            <a:endParaRPr lang="en-US" dirty="0"/>
+          </a:p>
+          <a:p>
+            <a:pPr marL="285750" indent="-285750">
+              <a:buFont typeface="Arial"/>
+              <a:buChar char="•"/>
+            </a:pPr>
+            <a:endParaRPr lang="en-US" dirty="0" smtClean="0"/>
+          </a:p>
+        </p:txBody>
+      </p:sp>
+    </p:spTree>
+    <p:extLst>
+      <p:ext uri="{BB962C8B-B14F-4D97-AF65-F5344CB8AC3E}">
+        <p14:creationId xmlns:p14="http://schemas.microsoft.com/office/powerpoint/2010/main" val="3275406550"/>
+      </p:ext>
+    </p:extLst>
+  </p:cSld>
+  <p:clrMapOvr>
+    <a:masterClrMapping/>
+  </p:clrMapOvr>
+</p:sld>
+</file>
+
 <file path=ppt/slides/slide2.xml><?xml version="1.0" encoding="utf-8"?>
 <p:sld xmlns:a="http://schemas.openxmlformats.org/drawingml/2006/main" xmlns:r="http://schemas.openxmlformats.org/officeDocument/2006/relationships" xmlns:p="http://schemas.openxmlformats.org/presentationml/2006/main">
   <p:cSld>
@@ -7952,11 +9368,7 @@
             </a:pPr>
             <a:r>
               <a:rPr lang="en-US" dirty="0" smtClean="0"/>
-              <a:t>Update </a:t>
-            </a:r>
-            <a:r>
-              <a:rPr lang="en-US" dirty="0" smtClean="0"/>
-              <a:t>in </a:t>
+              <a:t>Update in </a:t>
             </a:r>
             <a:r>
               <a:rPr lang="en-US" dirty="0" err="1" smtClean="0"/>
@@ -8094,6 +9506,438 @@
     <p:extLst>
       <p:ext uri="{BB962C8B-B14F-4D97-AF65-F5344CB8AC3E}">
         <p14:creationId xmlns:p14="http://schemas.microsoft.com/office/powerpoint/2010/main" val="1598944734"/>
+      </p:ext>
+    </p:extLst>
+  </p:cSld>
+  <p:clrMapOvr>
+    <a:masterClrMapping/>
+  </p:clrMapOvr>
+</p:sld>
+</file>
+
+<file path=ppt/slides/slide9.xml><?xml version="1.0" encoding="utf-8"?>
+<p:sld xmlns:a="http://schemas.openxmlformats.org/drawingml/2006/main" xmlns:r="http://schemas.openxmlformats.org/officeDocument/2006/relationships" xmlns:p="http://schemas.openxmlformats.org/presentationml/2006/main">
+  <p:cSld>
+    <p:spTree>
+      <p:nvGrpSpPr>
+        <p:cNvPr id="1" name=""/>
+        <p:cNvGrpSpPr/>
+        <p:nvPr/>
+      </p:nvGrpSpPr>
+      <p:grpSpPr>
+        <a:xfrm>
+          <a:off x="0" y="0"/>
+          <a:ext cx="0" cy="0"/>
+          <a:chOff x="0" y="0"/>
+          <a:chExt cx="0" cy="0"/>
+        </a:xfrm>
+      </p:grpSpPr>
+      <p:sp>
+        <p:nvSpPr>
+          <p:cNvPr id="2" name="Inhaltsplatzhalter 1"/>
+          <p:cNvSpPr>
+            <a:spLocks noGrp="1"/>
+          </p:cNvSpPr>
+          <p:nvPr>
+            <p:ph sz="half" idx="1"/>
+          </p:nvPr>
+        </p:nvSpPr>
+        <p:spPr/>
+        <p:txBody>
+          <a:bodyPr/>
+          <a:lstStyle/>
+          <a:p>
+            <a:r>
+              <a:rPr lang="en-US" dirty="0" smtClean="0"/>
+              <a:t>Lit review </a:t>
+            </a:r>
+            <a:r>
+              <a:rPr lang="en-US" dirty="0" err="1" smtClean="0"/>
+              <a:t>dauert</a:t>
+            </a:r>
+            <a:r>
+              <a:rPr lang="en-US" dirty="0" smtClean="0"/>
+              <a:t> </a:t>
+            </a:r>
+            <a:r>
+              <a:rPr lang="en-US" dirty="0" err="1" smtClean="0"/>
+              <a:t>noch</a:t>
+            </a:r>
+            <a:r>
+              <a:rPr lang="en-US" dirty="0" smtClean="0"/>
+              <a:t> </a:t>
+            </a:r>
+            <a:r>
+              <a:rPr lang="en-US" dirty="0" err="1" smtClean="0"/>
+              <a:t>ein</a:t>
+            </a:r>
+            <a:r>
+              <a:rPr lang="en-US" dirty="0" smtClean="0"/>
+              <a:t> </a:t>
+            </a:r>
+            <a:r>
+              <a:rPr lang="en-US" dirty="0" err="1" smtClean="0"/>
+              <a:t>bisschen</a:t>
+            </a:r>
+            <a:r>
+              <a:rPr lang="en-US" dirty="0" smtClean="0"/>
+              <a:t> (</a:t>
+            </a:r>
+            <a:r>
+              <a:rPr lang="en-US" dirty="0" err="1" smtClean="0"/>
+              <a:t>mache</a:t>
+            </a:r>
+            <a:r>
+              <a:rPr lang="en-US" dirty="0" smtClean="0"/>
+              <a:t> das parallel </a:t>
+            </a:r>
+            <a:r>
+              <a:rPr lang="en-US" dirty="0" err="1" smtClean="0"/>
+              <a:t>zum</a:t>
+            </a:r>
+            <a:r>
+              <a:rPr lang="en-US" dirty="0" smtClean="0"/>
+              <a:t> </a:t>
+            </a:r>
+            <a:r>
+              <a:rPr lang="en-US" dirty="0" err="1" smtClean="0"/>
+              <a:t>Methoden</a:t>
+            </a:r>
+            <a:r>
+              <a:rPr lang="en-US" dirty="0" smtClean="0"/>
+              <a:t> </a:t>
+            </a:r>
+            <a:r>
+              <a:rPr lang="en-US" dirty="0" err="1" smtClean="0"/>
+              <a:t>ausdenken</a:t>
+            </a:r>
+            <a:r>
+              <a:rPr lang="en-US" dirty="0" smtClean="0"/>
+              <a:t>)</a:t>
+            </a:r>
+            <a:r>
+              <a:rPr lang="en-US" dirty="0" smtClean="0"/>
+              <a:t>:</a:t>
+            </a:r>
+            <a:r>
+              <a:rPr lang="en-US" dirty="0" err="1" smtClean="0"/>
+              <a:t>füge</a:t>
+            </a:r>
+            <a:r>
+              <a:rPr lang="en-US" dirty="0" smtClean="0"/>
+              <a:t> </a:t>
+            </a:r>
+            <a:r>
+              <a:rPr lang="en-US" dirty="0" err="1" smtClean="0"/>
+              <a:t>immer</a:t>
+            </a:r>
+            <a:r>
+              <a:rPr lang="en-US" dirty="0" smtClean="0"/>
+              <a:t> </a:t>
+            </a:r>
+            <a:r>
+              <a:rPr lang="en-US" dirty="0" err="1" smtClean="0"/>
+              <a:t>wieder</a:t>
+            </a:r>
+            <a:r>
+              <a:rPr lang="en-US" dirty="0" smtClean="0"/>
+              <a:t> </a:t>
+            </a:r>
+            <a:r>
+              <a:rPr lang="en-US" dirty="0" err="1" smtClean="0"/>
+              <a:t>welche</a:t>
+            </a:r>
+            <a:r>
+              <a:rPr lang="en-US" dirty="0" smtClean="0"/>
+              <a:t> </a:t>
+            </a:r>
+            <a:r>
+              <a:rPr lang="en-US" dirty="0" err="1" smtClean="0"/>
+              <a:t>hinzu</a:t>
+            </a:r>
+            <a:r>
+              <a:rPr lang="en-US" dirty="0" smtClean="0"/>
+              <a:t> </a:t>
+            </a:r>
+            <a:r>
+              <a:rPr lang="en-US" dirty="0" err="1" smtClean="0"/>
+              <a:t>oder</a:t>
+            </a:r>
+            <a:r>
+              <a:rPr lang="en-US" dirty="0" smtClean="0"/>
+              <a:t> </a:t>
+            </a:r>
+            <a:r>
+              <a:rPr lang="en-US" dirty="0" err="1" smtClean="0"/>
+              <a:t>nehme</a:t>
+            </a:r>
+            <a:r>
+              <a:rPr lang="en-US" dirty="0" smtClean="0"/>
+              <a:t> </a:t>
+            </a:r>
+            <a:r>
+              <a:rPr lang="en-US" dirty="0" err="1" smtClean="0"/>
+              <a:t>welche</a:t>
+            </a:r>
+            <a:r>
+              <a:rPr lang="en-US" dirty="0" smtClean="0"/>
+              <a:t> </a:t>
+            </a:r>
+            <a:r>
+              <a:rPr lang="en-US" dirty="0" err="1" smtClean="0"/>
+              <a:t>mit</a:t>
+            </a:r>
+            <a:endParaRPr lang="en-US" dirty="0" smtClean="0"/>
+          </a:p>
+          <a:p>
+            <a:r>
+              <a:rPr lang="en-US" dirty="0" err="1" smtClean="0"/>
+              <a:t>Tabelle</a:t>
+            </a:r>
+            <a:r>
+              <a:rPr lang="en-US" dirty="0" smtClean="0"/>
+              <a:t> </a:t>
+            </a:r>
+            <a:r>
+              <a:rPr lang="en-US" dirty="0" err="1" smtClean="0"/>
+              <a:t>mit</a:t>
+            </a:r>
+            <a:r>
+              <a:rPr lang="en-US" dirty="0" smtClean="0"/>
+              <a:t> </a:t>
+            </a:r>
+            <a:r>
+              <a:rPr lang="en-US" dirty="0" err="1" smtClean="0"/>
+              <a:t>eigenschaften</a:t>
+            </a:r>
+            <a:r>
+              <a:rPr lang="en-US" dirty="0" smtClean="0"/>
+              <a:t> </a:t>
+            </a:r>
+            <a:r>
+              <a:rPr lang="en-US" dirty="0" err="1" smtClean="0"/>
+              <a:t>gemacht</a:t>
+            </a:r>
+            <a:r>
+              <a:rPr lang="en-US" dirty="0" smtClean="0"/>
+              <a:t> </a:t>
+            </a:r>
+            <a:r>
+              <a:rPr lang="en-US" dirty="0" err="1" smtClean="0"/>
+              <a:t>vllt</a:t>
+            </a:r>
+            <a:r>
+              <a:rPr lang="en-US" dirty="0" smtClean="0"/>
+              <a:t> </a:t>
+            </a:r>
+            <a:r>
+              <a:rPr lang="en-US" dirty="0" err="1" smtClean="0"/>
+              <a:t>kannst</a:t>
+            </a:r>
+            <a:r>
+              <a:rPr lang="en-US" dirty="0" smtClean="0"/>
+              <a:t> du </a:t>
+            </a:r>
+            <a:r>
+              <a:rPr lang="en-US" dirty="0" err="1" smtClean="0"/>
+              <a:t>mir</a:t>
+            </a:r>
+            <a:r>
+              <a:rPr lang="en-US" dirty="0" smtClean="0"/>
+              <a:t> da feedback </a:t>
+            </a:r>
+            <a:r>
+              <a:rPr lang="en-US" dirty="0" err="1" smtClean="0"/>
+              <a:t>geben</a:t>
+            </a:r>
+            <a:endParaRPr lang="en-US" dirty="0" smtClean="0"/>
+          </a:p>
+          <a:p>
+            <a:r>
+              <a:rPr lang="en-US" dirty="0" err="1" smtClean="0"/>
+              <a:t>Hab</a:t>
+            </a:r>
+            <a:r>
+              <a:rPr lang="en-US" dirty="0" smtClean="0"/>
+              <a:t> die flow charts </a:t>
+            </a:r>
+            <a:r>
+              <a:rPr lang="en-US" dirty="0" err="1" smtClean="0"/>
+              <a:t>noch</a:t>
+            </a:r>
+            <a:r>
+              <a:rPr lang="en-US" dirty="0" smtClean="0"/>
+              <a:t> mal </a:t>
+            </a:r>
+            <a:r>
+              <a:rPr lang="en-US" dirty="0" err="1" smtClean="0"/>
+              <a:t>itertiert</a:t>
+            </a:r>
+            <a:r>
+              <a:rPr lang="en-US" dirty="0" smtClean="0"/>
+              <a:t>, </a:t>
+            </a:r>
+            <a:r>
+              <a:rPr lang="en-US" dirty="0" err="1" smtClean="0"/>
+              <a:t>verfeinert</a:t>
+            </a:r>
+            <a:r>
+              <a:rPr lang="en-US" dirty="0" smtClean="0"/>
+              <a:t> und </a:t>
+            </a:r>
+            <a:r>
+              <a:rPr lang="en-US" dirty="0" err="1" smtClean="0"/>
+              <a:t>neue</a:t>
+            </a:r>
+            <a:r>
+              <a:rPr lang="en-US" dirty="0" smtClean="0"/>
+              <a:t> </a:t>
+            </a:r>
+            <a:r>
+              <a:rPr lang="en-US" dirty="0" err="1" smtClean="0"/>
+              <a:t>methoden</a:t>
+            </a:r>
+            <a:r>
+              <a:rPr lang="en-US" dirty="0" smtClean="0"/>
+              <a:t> </a:t>
+            </a:r>
+            <a:r>
+              <a:rPr lang="en-US" dirty="0" err="1" smtClean="0"/>
+              <a:t>gefunden</a:t>
+            </a:r>
+            <a:endParaRPr lang="en-US" dirty="0" smtClean="0"/>
+          </a:p>
+          <a:p>
+            <a:r>
+              <a:rPr lang="en-US" dirty="0" err="1" smtClean="0"/>
+              <a:t>Würde</a:t>
+            </a:r>
+            <a:r>
+              <a:rPr lang="en-US" dirty="0" smtClean="0"/>
+              <a:t> die </a:t>
+            </a:r>
+            <a:r>
+              <a:rPr lang="en-US" dirty="0" err="1" smtClean="0"/>
+              <a:t>mit</a:t>
+            </a:r>
+            <a:r>
+              <a:rPr lang="en-US" dirty="0" smtClean="0"/>
+              <a:t> </a:t>
+            </a:r>
+            <a:r>
+              <a:rPr lang="en-US" dirty="0" err="1" smtClean="0"/>
+              <a:t>dir</a:t>
+            </a:r>
+            <a:r>
+              <a:rPr lang="en-US" dirty="0" smtClean="0"/>
+              <a:t> </a:t>
+            </a:r>
+            <a:r>
+              <a:rPr lang="en-US" dirty="0" err="1" smtClean="0"/>
+              <a:t>diskutieren</a:t>
+            </a:r>
+            <a:r>
+              <a:rPr lang="en-US" dirty="0" smtClean="0"/>
+              <a:t> und </a:t>
+            </a:r>
+            <a:r>
+              <a:rPr lang="en-US" dirty="0" err="1" smtClean="0"/>
+              <a:t>dann</a:t>
+            </a:r>
+            <a:r>
+              <a:rPr lang="en-US" dirty="0" smtClean="0"/>
+              <a:t> mal </a:t>
+            </a:r>
+            <a:r>
+              <a:rPr lang="en-US" dirty="0" err="1" smtClean="0"/>
+              <a:t>anfangen</a:t>
+            </a:r>
+            <a:r>
+              <a:rPr lang="en-US" dirty="0" smtClean="0"/>
+              <a:t> was </a:t>
+            </a:r>
+            <a:r>
+              <a:rPr lang="en-US" dirty="0" err="1" smtClean="0"/>
+              <a:t>zu</a:t>
+            </a:r>
+            <a:r>
+              <a:rPr lang="en-US" dirty="0" smtClean="0"/>
+              <a:t> </a:t>
+            </a:r>
+            <a:r>
+              <a:rPr lang="en-US" dirty="0" err="1" smtClean="0"/>
+              <a:t>bauen</a:t>
+            </a:r>
+            <a:r>
+              <a:rPr lang="en-US" dirty="0" smtClean="0"/>
+              <a:t>? </a:t>
+            </a:r>
+            <a:endParaRPr lang="en-US" dirty="0" smtClean="0"/>
+          </a:p>
+          <a:p>
+            <a:endParaRPr lang="en-US" dirty="0" smtClean="0"/>
+          </a:p>
+          <a:p>
+            <a:pPr lvl="1"/>
+            <a:endParaRPr lang="en-US" dirty="0" smtClean="0"/>
+          </a:p>
+          <a:p>
+            <a:pPr lvl="1"/>
+            <a:endParaRPr lang="en-US" dirty="0" smtClean="0"/>
+          </a:p>
+        </p:txBody>
+      </p:sp>
+      <p:sp>
+        <p:nvSpPr>
+          <p:cNvPr id="3" name="Titel 2"/>
+          <p:cNvSpPr>
+            <a:spLocks noGrp="1"/>
+          </p:cNvSpPr>
+          <p:nvPr>
+            <p:ph type="title"/>
+          </p:nvPr>
+        </p:nvSpPr>
+        <p:spPr/>
+        <p:txBody>
+          <a:bodyPr/>
+          <a:lstStyle/>
+          <a:p>
+            <a:pPr algn="l"/>
+            <a:r>
+              <a:rPr lang="en-US" dirty="0" smtClean="0"/>
+              <a:t>08</a:t>
+            </a:r>
+            <a:r>
+              <a:rPr lang="en-US" dirty="0" smtClean="0"/>
+              <a:t>.02.21</a:t>
+            </a:r>
+            <a:endParaRPr lang="en-US" dirty="0"/>
+          </a:p>
+        </p:txBody>
+      </p:sp>
+      <p:sp>
+        <p:nvSpPr>
+          <p:cNvPr id="4" name="Inhaltsplatzhalter 3"/>
+          <p:cNvSpPr>
+            <a:spLocks noGrp="1"/>
+          </p:cNvSpPr>
+          <p:nvPr>
+            <p:ph sz="half" idx="10"/>
+          </p:nvPr>
+        </p:nvSpPr>
+        <p:spPr/>
+        <p:txBody>
+          <a:bodyPr/>
+          <a:lstStyle/>
+          <a:p>
+            <a:endParaRPr lang="en-US" dirty="0"/>
+          </a:p>
+        </p:txBody>
+      </p:sp>
+    </p:spTree>
+    <p:extLst>
+      <p:ext uri="{BB962C8B-B14F-4D97-AF65-F5344CB8AC3E}">
+        <p14:creationId xmlns:p14="http://schemas.microsoft.com/office/powerpoint/2010/main" val="725548912"/>
       </p:ext>
     </p:extLst>
   </p:cSld>

</xml_diff>

<commit_message>
new tests on datasetshift
</commit_message>
<xml_diff>
--- a/MeetingNotes.pptx
+++ b/MeetingNotes.pptx
@@ -16,6 +16,8 @@
     <p:sldId id="264" r:id="rId10"/>
     <p:sldId id="265" r:id="rId11"/>
     <p:sldId id="266" r:id="rId12"/>
+    <p:sldId id="267" r:id="rId13"/>
+    <p:sldId id="268" r:id="rId14"/>
   </p:sldIdLst>
   <p:sldSz cx="9144000" cy="5715000" type="screen16x10"/>
   <p:notesSz cx="6858000" cy="9144000"/>
@@ -639,7 +641,7 @@
           <a:p>
             <a:fld id="{907AEC89-51F8-8C49-8F5C-7B8970AE8955}" type="datetimeFigureOut">
               <a:rPr lang="de-DE" smtClean="0"/>
-              <a:t>08.02.21</a:t>
+              <a:t>22.02.21</a:t>
             </a:fld>
             <a:endParaRPr lang="en-US"/>
           </a:p>
@@ -809,7 +811,7 @@
           <a:p>
             <a:fld id="{907AEC89-51F8-8C49-8F5C-7B8970AE8955}" type="datetimeFigureOut">
               <a:rPr lang="de-DE" smtClean="0"/>
-              <a:t>08.02.21</a:t>
+              <a:t>22.02.21</a:t>
             </a:fld>
             <a:endParaRPr lang="en-US"/>
           </a:p>
@@ -989,7 +991,7 @@
           <a:p>
             <a:fld id="{907AEC89-51F8-8C49-8F5C-7B8970AE8955}" type="datetimeFigureOut">
               <a:rPr lang="de-DE" smtClean="0"/>
-              <a:t>08.02.21</a:t>
+              <a:t>22.02.21</a:t>
             </a:fld>
             <a:endParaRPr lang="en-US"/>
           </a:p>
@@ -1107,7 +1109,7 @@
           <a:p>
             <a:fld id="{907AEC89-51F8-8C49-8F5C-7B8970AE8955}" type="datetimeFigureOut">
               <a:rPr lang="de-DE" smtClean="0"/>
-              <a:t>08.02.21</a:t>
+              <a:t>22.02.21</a:t>
             </a:fld>
             <a:endParaRPr lang="en-US"/>
           </a:p>
@@ -1427,7 +1429,7 @@
           <a:p>
             <a:fld id="{907AEC89-51F8-8C49-8F5C-7B8970AE8955}" type="datetimeFigureOut">
               <a:rPr lang="de-DE" smtClean="0"/>
-              <a:t>08.02.21</a:t>
+              <a:t>22.02.21</a:t>
             </a:fld>
             <a:endParaRPr lang="en-US"/>
           </a:p>
@@ -1979,7 +1981,7 @@
           <a:p>
             <a:fld id="{907AEC89-51F8-8C49-8F5C-7B8970AE8955}" type="datetimeFigureOut">
               <a:rPr lang="de-DE" smtClean="0"/>
-              <a:t>08.02.21</a:t>
+              <a:t>22.02.21</a:t>
             </a:fld>
             <a:endParaRPr lang="en-US"/>
           </a:p>
@@ -2401,7 +2403,7 @@
           <a:p>
             <a:fld id="{907AEC89-51F8-8C49-8F5C-7B8970AE8955}" type="datetimeFigureOut">
               <a:rPr lang="de-DE" smtClean="0"/>
-              <a:t>08.02.21</a:t>
+              <a:t>22.02.21</a:t>
             </a:fld>
             <a:endParaRPr lang="en-US"/>
           </a:p>
@@ -2519,7 +2521,7 @@
           <a:p>
             <a:fld id="{907AEC89-51F8-8C49-8F5C-7B8970AE8955}" type="datetimeFigureOut">
               <a:rPr lang="de-DE" smtClean="0"/>
-              <a:t>08.02.21</a:t>
+              <a:t>22.02.21</a:t>
             </a:fld>
             <a:endParaRPr lang="en-US"/>
           </a:p>
@@ -2614,7 +2616,7 @@
           <a:p>
             <a:fld id="{907AEC89-51F8-8C49-8F5C-7B8970AE8955}" type="datetimeFigureOut">
               <a:rPr lang="de-DE" smtClean="0"/>
-              <a:t>08.02.21</a:t>
+              <a:t>22.02.21</a:t>
             </a:fld>
             <a:endParaRPr lang="en-US"/>
           </a:p>
@@ -2891,7 +2893,7 @@
           <a:p>
             <a:fld id="{907AEC89-51F8-8C49-8F5C-7B8970AE8955}" type="datetimeFigureOut">
               <a:rPr lang="de-DE" smtClean="0"/>
-              <a:t>08.02.21</a:t>
+              <a:t>22.02.21</a:t>
             </a:fld>
             <a:endParaRPr lang="en-US"/>
           </a:p>
@@ -3104,7 +3106,7 @@
           <a:p>
             <a:fld id="{907AEC89-51F8-8C49-8F5C-7B8970AE8955}" type="datetimeFigureOut">
               <a:rPr lang="de-DE" smtClean="0"/>
-              <a:t>08.02.21</a:t>
+              <a:t>22.02.21</a:t>
             </a:fld>
             <a:endParaRPr lang="en-US"/>
           </a:p>
@@ -3550,15 +3552,7 @@
           <a:p>
             <a:r>
               <a:rPr lang="en-US" dirty="0" smtClean="0"/>
-              <a:t>Meeting: </a:t>
-            </a:r>
-            <a:r>
-              <a:rPr lang="en-US" dirty="0" smtClean="0"/>
-              <a:t>08.02</a:t>
-            </a:r>
-            <a:r>
-              <a:rPr lang="en-US" dirty="0" smtClean="0"/>
-              <a:t>.21</a:t>
+              <a:t>Meeting: 08.02.21</a:t>
             </a:r>
             <a:endParaRPr lang="en-US" dirty="0"/>
           </a:p>
@@ -4278,15 +4272,7 @@
           <a:p>
             <a:r>
               <a:rPr lang="en-US" dirty="0" smtClean="0"/>
-              <a:t>Meeting: </a:t>
-            </a:r>
-            <a:r>
-              <a:rPr lang="en-US" dirty="0" smtClean="0"/>
-              <a:t>08.02</a:t>
-            </a:r>
-            <a:r>
-              <a:rPr lang="en-US" dirty="0" smtClean="0"/>
-              <a:t>.21</a:t>
+              <a:t>Meeting: 08.02.21</a:t>
             </a:r>
             <a:endParaRPr lang="en-US" dirty="0"/>
           </a:p>
@@ -4920,6 +4906,607 @@
     <p:extLst>
       <p:ext uri="{BB962C8B-B14F-4D97-AF65-F5344CB8AC3E}">
         <p14:creationId xmlns:p14="http://schemas.microsoft.com/office/powerpoint/2010/main" val="3275406550"/>
+      </p:ext>
+    </p:extLst>
+  </p:cSld>
+  <p:clrMapOvr>
+    <a:masterClrMapping/>
+  </p:clrMapOvr>
+</p:sld>
+</file>
+
+<file path=ppt/slides/slide12.xml><?xml version="1.0" encoding="utf-8"?>
+<p:sld xmlns:a="http://schemas.openxmlformats.org/drawingml/2006/main" xmlns:r="http://schemas.openxmlformats.org/officeDocument/2006/relationships" xmlns:p="http://schemas.openxmlformats.org/presentationml/2006/main">
+  <p:cSld>
+    <p:spTree>
+      <p:nvGrpSpPr>
+        <p:cNvPr id="1" name=""/>
+        <p:cNvGrpSpPr/>
+        <p:nvPr/>
+      </p:nvGrpSpPr>
+      <p:grpSpPr>
+        <a:xfrm>
+          <a:off x="0" y="0"/>
+          <a:ext cx="0" cy="0"/>
+          <a:chOff x="0" y="0"/>
+          <a:chExt cx="0" cy="0"/>
+        </a:xfrm>
+      </p:grpSpPr>
+      <p:sp>
+        <p:nvSpPr>
+          <p:cNvPr id="2" name="Inhaltsplatzhalter 1"/>
+          <p:cNvSpPr>
+            <a:spLocks noGrp="1"/>
+          </p:cNvSpPr>
+          <p:nvPr>
+            <p:ph sz="half" idx="1"/>
+          </p:nvPr>
+        </p:nvSpPr>
+        <p:spPr/>
+        <p:txBody>
+          <a:bodyPr>
+            <a:normAutofit lnSpcReduction="10000"/>
+          </a:bodyPr>
+          <a:lstStyle/>
+          <a:p>
+            <a:r>
+              <a:rPr lang="en-US" dirty="0" err="1" smtClean="0"/>
+              <a:t>Hab</a:t>
+            </a:r>
+            <a:r>
+              <a:rPr lang="en-US" dirty="0" smtClean="0"/>
+              <a:t> </a:t>
+            </a:r>
+            <a:r>
+              <a:rPr lang="en-US" dirty="0" err="1" smtClean="0"/>
+              <a:t>ein</a:t>
+            </a:r>
+            <a:r>
+              <a:rPr lang="en-US" dirty="0" smtClean="0"/>
+              <a:t> </a:t>
+            </a:r>
+            <a:r>
+              <a:rPr lang="en-US" dirty="0" err="1" smtClean="0"/>
+              <a:t>einfaches</a:t>
+            </a:r>
+            <a:r>
+              <a:rPr lang="en-US" dirty="0" smtClean="0"/>
+              <a:t> NN </a:t>
+            </a:r>
+            <a:r>
+              <a:rPr lang="en-US" dirty="0" err="1" smtClean="0"/>
+              <a:t>gebaut</a:t>
+            </a:r>
+            <a:r>
+              <a:rPr lang="en-US" dirty="0" smtClean="0"/>
+              <a:t> </a:t>
+            </a:r>
+            <a:r>
+              <a:rPr lang="en-US" dirty="0" err="1" smtClean="0"/>
+              <a:t>mit</a:t>
+            </a:r>
+            <a:r>
+              <a:rPr lang="en-US" dirty="0" smtClean="0"/>
+              <a:t> </a:t>
+            </a:r>
+            <a:r>
+              <a:rPr lang="en-US" dirty="0" err="1" smtClean="0"/>
+              <a:t>dem</a:t>
+            </a:r>
+            <a:r>
+              <a:rPr lang="en-US" dirty="0" smtClean="0"/>
+              <a:t> </a:t>
+            </a:r>
+            <a:r>
+              <a:rPr lang="en-US" dirty="0" err="1" smtClean="0"/>
+              <a:t>boston</a:t>
+            </a:r>
+            <a:r>
+              <a:rPr lang="en-US" dirty="0" smtClean="0"/>
+              <a:t> dataset -&gt; </a:t>
+            </a:r>
+            <a:r>
+              <a:rPr lang="en-US" dirty="0" err="1" smtClean="0"/>
+              <a:t>erst</a:t>
+            </a:r>
+            <a:r>
+              <a:rPr lang="en-US" dirty="0" smtClean="0"/>
+              <a:t> mal simple</a:t>
+            </a:r>
+          </a:p>
+          <a:p>
+            <a:r>
+              <a:rPr lang="en-US" dirty="0" smtClean="0"/>
+              <a:t>Dataset shift </a:t>
+            </a:r>
+            <a:r>
+              <a:rPr lang="en-US" dirty="0" err="1" smtClean="0"/>
+              <a:t>eigebaut</a:t>
+            </a:r>
+            <a:r>
+              <a:rPr lang="en-US" dirty="0" smtClean="0"/>
+              <a:t>: </a:t>
+            </a:r>
+            <a:r>
+              <a:rPr lang="en-US" dirty="0" err="1" smtClean="0"/>
+              <a:t>manche</a:t>
+            </a:r>
+            <a:r>
+              <a:rPr lang="en-US" dirty="0" smtClean="0"/>
+              <a:t> </a:t>
+            </a:r>
+            <a:r>
+              <a:rPr lang="en-US" dirty="0" err="1" smtClean="0"/>
+              <a:t>haben</a:t>
+            </a:r>
+            <a:r>
+              <a:rPr lang="en-US" dirty="0" smtClean="0"/>
+              <a:t> </a:t>
+            </a:r>
+            <a:r>
+              <a:rPr lang="en-US" dirty="0" err="1" smtClean="0"/>
+              <a:t>sich</a:t>
+            </a:r>
+            <a:r>
+              <a:rPr lang="en-US" dirty="0" smtClean="0"/>
+              <a:t> </a:t>
+            </a:r>
+            <a:r>
+              <a:rPr lang="en-US" dirty="0" err="1" smtClean="0"/>
+              <a:t>verschoben</a:t>
+            </a:r>
+            <a:r>
+              <a:rPr lang="en-US" dirty="0" smtClean="0"/>
+              <a:t> </a:t>
+            </a:r>
+            <a:r>
+              <a:rPr lang="en-US" dirty="0" err="1" smtClean="0"/>
+              <a:t>andere</a:t>
+            </a:r>
+            <a:r>
+              <a:rPr lang="en-US" dirty="0" smtClean="0"/>
+              <a:t> </a:t>
+            </a:r>
+            <a:r>
+              <a:rPr lang="en-US" dirty="0" err="1" smtClean="0"/>
+              <a:t>nicht</a:t>
+            </a:r>
+            <a:r>
+              <a:rPr lang="en-US" dirty="0" smtClean="0"/>
+              <a:t> (</a:t>
+            </a:r>
+            <a:r>
+              <a:rPr lang="en-US" dirty="0" err="1" smtClean="0"/>
+              <a:t>bei</a:t>
+            </a:r>
+            <a:r>
+              <a:rPr lang="en-US" dirty="0" smtClean="0"/>
+              <a:t> den inputs </a:t>
+            </a:r>
+            <a:r>
+              <a:rPr lang="en-US" dirty="0" err="1" smtClean="0"/>
+              <a:t>besonders</a:t>
+            </a:r>
+            <a:r>
+              <a:rPr lang="en-US" dirty="0" smtClean="0"/>
+              <a:t> auf activation </a:t>
+            </a:r>
+            <a:r>
+              <a:rPr lang="en-US" dirty="0" err="1" smtClean="0"/>
+              <a:t>schauen</a:t>
+            </a:r>
+            <a:r>
+              <a:rPr lang="en-US" dirty="0" smtClean="0"/>
+              <a:t>)-&gt; </a:t>
+            </a:r>
+            <a:r>
+              <a:rPr lang="en-US" dirty="0" err="1" smtClean="0"/>
+              <a:t>ist</a:t>
+            </a:r>
+            <a:r>
+              <a:rPr lang="en-US" dirty="0" smtClean="0"/>
+              <a:t> </a:t>
+            </a:r>
+            <a:r>
+              <a:rPr lang="en-US" dirty="0" err="1" smtClean="0"/>
+              <a:t>jetzt</a:t>
+            </a:r>
+            <a:r>
+              <a:rPr lang="en-US" dirty="0" smtClean="0"/>
+              <a:t> halt covariant shift</a:t>
+            </a:r>
+          </a:p>
+          <a:p>
+            <a:r>
+              <a:rPr lang="en-US" dirty="0" err="1" smtClean="0"/>
+              <a:t>Ssh</a:t>
+            </a:r>
+            <a:r>
+              <a:rPr lang="en-US" dirty="0" smtClean="0"/>
+              <a:t> hat </a:t>
+            </a:r>
+            <a:r>
+              <a:rPr lang="en-US" dirty="0" err="1" smtClean="0"/>
+              <a:t>alles</a:t>
+            </a:r>
+            <a:r>
+              <a:rPr lang="en-US" dirty="0" smtClean="0"/>
+              <a:t> </a:t>
+            </a:r>
+            <a:r>
+              <a:rPr lang="en-US" dirty="0" err="1" smtClean="0"/>
+              <a:t>funktioniert</a:t>
+            </a:r>
+            <a:r>
+              <a:rPr lang="en-US" dirty="0" smtClean="0"/>
+              <a:t> </a:t>
+            </a:r>
+            <a:r>
+              <a:rPr lang="en-US" dirty="0" err="1" smtClean="0"/>
+              <a:t>danke</a:t>
+            </a:r>
+            <a:r>
+              <a:rPr lang="en-US" dirty="0" smtClean="0"/>
+              <a:t> </a:t>
+            </a:r>
+            <a:r>
+              <a:rPr lang="en-US" dirty="0" err="1" smtClean="0"/>
+              <a:t>dir</a:t>
+            </a:r>
+            <a:r>
+              <a:rPr lang="en-US" dirty="0" smtClean="0"/>
+              <a:t> </a:t>
+            </a:r>
+          </a:p>
+          <a:p>
+            <a:r>
+              <a:rPr lang="en-US" dirty="0" err="1" smtClean="0"/>
+              <a:t>Nächste</a:t>
+            </a:r>
+            <a:r>
+              <a:rPr lang="en-US" dirty="0" smtClean="0"/>
+              <a:t> Steps: activations </a:t>
+            </a:r>
+            <a:r>
+              <a:rPr lang="en-US" dirty="0" err="1" smtClean="0"/>
+              <a:t>rausholen</a:t>
+            </a:r>
+            <a:r>
+              <a:rPr lang="en-US" dirty="0" smtClean="0"/>
+              <a:t> und ACE </a:t>
+            </a:r>
+            <a:r>
+              <a:rPr lang="en-US" dirty="0" err="1" smtClean="0"/>
+              <a:t>anwenden</a:t>
+            </a:r>
+            <a:r>
+              <a:rPr lang="en-US" dirty="0" smtClean="0"/>
+              <a:t> </a:t>
+            </a:r>
+          </a:p>
+          <a:p>
+            <a:r>
+              <a:rPr lang="en-US" dirty="0" err="1" smtClean="0"/>
+              <a:t>Neue</a:t>
+            </a:r>
+            <a:r>
+              <a:rPr lang="en-US" dirty="0" smtClean="0"/>
+              <a:t> </a:t>
+            </a:r>
+            <a:r>
+              <a:rPr lang="en-US" dirty="0" err="1" smtClean="0"/>
+              <a:t>entwicklung</a:t>
+            </a:r>
+            <a:r>
+              <a:rPr lang="en-US" dirty="0" smtClean="0"/>
+              <a:t>:</a:t>
+            </a:r>
+          </a:p>
+          <a:p>
+            <a:pPr lvl="1"/>
+            <a:r>
+              <a:rPr lang="en-US" dirty="0" err="1" smtClean="0"/>
+              <a:t>Zufällig</a:t>
+            </a:r>
+            <a:r>
+              <a:rPr lang="en-US" dirty="0" smtClean="0"/>
+              <a:t> die opportunity </a:t>
+            </a:r>
+            <a:r>
+              <a:rPr lang="en-US" dirty="0" err="1" smtClean="0"/>
+              <a:t>ergeben</a:t>
+            </a:r>
+            <a:r>
+              <a:rPr lang="en-US" dirty="0" smtClean="0"/>
+              <a:t> </a:t>
+            </a:r>
+            <a:r>
+              <a:rPr lang="en-US" dirty="0" err="1" smtClean="0"/>
+              <a:t>zu</a:t>
+            </a:r>
+            <a:r>
+              <a:rPr lang="en-US" dirty="0" smtClean="0"/>
+              <a:t> </a:t>
+            </a:r>
+            <a:r>
+              <a:rPr lang="en-US" dirty="0" err="1" smtClean="0"/>
+              <a:t>gründen</a:t>
+            </a:r>
+            <a:r>
+              <a:rPr lang="en-US" dirty="0" smtClean="0"/>
+              <a:t> (hobby </a:t>
+            </a:r>
+            <a:r>
+              <a:rPr lang="en-US" dirty="0" err="1" smtClean="0"/>
+              <a:t>ist</a:t>
+            </a:r>
+            <a:r>
+              <a:rPr lang="en-US" dirty="0" smtClean="0"/>
+              <a:t> </a:t>
+            </a:r>
+            <a:r>
+              <a:rPr lang="en-US" dirty="0" err="1" smtClean="0"/>
+              <a:t>eskaliert</a:t>
+            </a:r>
+            <a:r>
+              <a:rPr lang="en-US" dirty="0" smtClean="0"/>
+              <a:t>)</a:t>
+            </a:r>
+          </a:p>
+          <a:p>
+            <a:pPr lvl="1"/>
+            <a:r>
+              <a:rPr lang="en-US" dirty="0" err="1" smtClean="0"/>
+              <a:t>Würde</a:t>
+            </a:r>
+            <a:r>
+              <a:rPr lang="en-US" dirty="0" smtClean="0"/>
+              <a:t> das </a:t>
+            </a:r>
+            <a:r>
+              <a:rPr lang="en-US" dirty="0" err="1" smtClean="0"/>
+              <a:t>jetzt</a:t>
+            </a:r>
+            <a:r>
+              <a:rPr lang="en-US" dirty="0" smtClean="0"/>
+              <a:t> </a:t>
+            </a:r>
+            <a:r>
+              <a:rPr lang="en-US" dirty="0" err="1" smtClean="0"/>
+              <a:t>echt</a:t>
+            </a:r>
+            <a:r>
+              <a:rPr lang="en-US" dirty="0" smtClean="0"/>
+              <a:t> </a:t>
+            </a:r>
+            <a:r>
+              <a:rPr lang="en-US" dirty="0" err="1" smtClean="0"/>
+              <a:t>ungerne</a:t>
+            </a:r>
+            <a:r>
+              <a:rPr lang="en-US" dirty="0" smtClean="0"/>
+              <a:t> </a:t>
+            </a:r>
+            <a:r>
+              <a:rPr lang="en-US" dirty="0" err="1" smtClean="0"/>
+              <a:t>ziehen</a:t>
+            </a:r>
+            <a:r>
+              <a:rPr lang="en-US" dirty="0" smtClean="0"/>
+              <a:t> </a:t>
+            </a:r>
+            <a:r>
+              <a:rPr lang="en-US" dirty="0" err="1" smtClean="0"/>
+              <a:t>lassen</a:t>
+            </a:r>
+            <a:r>
+              <a:rPr lang="en-US" dirty="0" smtClean="0"/>
+              <a:t> </a:t>
+            </a:r>
+          </a:p>
+          <a:p>
+            <a:pPr lvl="1"/>
+            <a:r>
+              <a:rPr lang="en-US" dirty="0" err="1" smtClean="0"/>
+              <a:t>Deswegen</a:t>
+            </a:r>
+            <a:r>
+              <a:rPr lang="en-US" dirty="0" smtClean="0"/>
+              <a:t> </a:t>
+            </a:r>
+            <a:r>
+              <a:rPr lang="en-US" dirty="0" err="1" smtClean="0"/>
+              <a:t>einfach</a:t>
+            </a:r>
+            <a:r>
+              <a:rPr lang="en-US" dirty="0" smtClean="0"/>
+              <a:t> die </a:t>
+            </a:r>
+            <a:r>
+              <a:rPr lang="en-US" dirty="0" err="1" smtClean="0"/>
+              <a:t>masterarbeit</a:t>
+            </a:r>
+            <a:r>
+              <a:rPr lang="en-US" dirty="0" smtClean="0"/>
+              <a:t> </a:t>
+            </a:r>
+            <a:r>
+              <a:rPr lang="en-US" dirty="0" err="1" smtClean="0"/>
+              <a:t>etwas</a:t>
+            </a:r>
+            <a:r>
+              <a:rPr lang="en-US" dirty="0" smtClean="0"/>
+              <a:t> </a:t>
+            </a:r>
+            <a:r>
+              <a:rPr lang="en-US" dirty="0" err="1" smtClean="0"/>
+              <a:t>strecken</a:t>
+            </a:r>
+            <a:r>
+              <a:rPr lang="en-US" dirty="0" smtClean="0"/>
+              <a:t> </a:t>
+            </a:r>
+            <a:endParaRPr lang="en-US" dirty="0" smtClean="0"/>
+          </a:p>
+          <a:p>
+            <a:endParaRPr lang="en-US" dirty="0" smtClean="0"/>
+          </a:p>
+          <a:p>
+            <a:pPr lvl="1"/>
+            <a:endParaRPr lang="en-US" dirty="0" smtClean="0"/>
+          </a:p>
+          <a:p>
+            <a:pPr lvl="1"/>
+            <a:endParaRPr lang="en-US" dirty="0" smtClean="0"/>
+          </a:p>
+        </p:txBody>
+      </p:sp>
+      <p:sp>
+        <p:nvSpPr>
+          <p:cNvPr id="3" name="Titel 2"/>
+          <p:cNvSpPr>
+            <a:spLocks noGrp="1"/>
+          </p:cNvSpPr>
+          <p:nvPr>
+            <p:ph type="title"/>
+          </p:nvPr>
+        </p:nvSpPr>
+        <p:spPr/>
+        <p:txBody>
+          <a:bodyPr/>
+          <a:lstStyle/>
+          <a:p>
+            <a:pPr algn="l"/>
+            <a:r>
+              <a:rPr lang="en-US" dirty="0" smtClean="0"/>
+              <a:t>22</a:t>
+            </a:r>
+            <a:r>
+              <a:rPr lang="en-US" dirty="0" smtClean="0"/>
+              <a:t>.02.21</a:t>
+            </a:r>
+            <a:endParaRPr lang="en-US" dirty="0"/>
+          </a:p>
+        </p:txBody>
+      </p:sp>
+      <p:sp>
+        <p:nvSpPr>
+          <p:cNvPr id="4" name="Inhaltsplatzhalter 3"/>
+          <p:cNvSpPr>
+            <a:spLocks noGrp="1"/>
+          </p:cNvSpPr>
+          <p:nvPr>
+            <p:ph sz="half" idx="10"/>
+          </p:nvPr>
+        </p:nvSpPr>
+        <p:spPr/>
+        <p:txBody>
+          <a:bodyPr/>
+          <a:lstStyle/>
+          <a:p>
+            <a:endParaRPr lang="en-US" dirty="0"/>
+          </a:p>
+        </p:txBody>
+      </p:sp>
+    </p:spTree>
+    <p:extLst>
+      <p:ext uri="{BB962C8B-B14F-4D97-AF65-F5344CB8AC3E}">
+        <p14:creationId xmlns:p14="http://schemas.microsoft.com/office/powerpoint/2010/main" val="2718647156"/>
+      </p:ext>
+    </p:extLst>
+  </p:cSld>
+  <p:clrMapOvr>
+    <a:masterClrMapping/>
+  </p:clrMapOvr>
+</p:sld>
+</file>
+
+<file path=ppt/slides/slide13.xml><?xml version="1.0" encoding="utf-8"?>
+<p:sld xmlns:a="http://schemas.openxmlformats.org/drawingml/2006/main" xmlns:r="http://schemas.openxmlformats.org/officeDocument/2006/relationships" xmlns:p="http://schemas.openxmlformats.org/presentationml/2006/main">
+  <p:cSld>
+    <p:spTree>
+      <p:nvGrpSpPr>
+        <p:cNvPr id="1" name=""/>
+        <p:cNvGrpSpPr/>
+        <p:nvPr/>
+      </p:nvGrpSpPr>
+      <p:grpSpPr>
+        <a:xfrm>
+          <a:off x="0" y="0"/>
+          <a:ext cx="0" cy="0"/>
+          <a:chOff x="0" y="0"/>
+          <a:chExt cx="0" cy="0"/>
+        </a:xfrm>
+      </p:grpSpPr>
+      <p:sp>
+        <p:nvSpPr>
+          <p:cNvPr id="2" name="Titel 1"/>
+          <p:cNvSpPr>
+            <a:spLocks noGrp="1"/>
+          </p:cNvSpPr>
+          <p:nvPr>
+            <p:ph type="title"/>
+          </p:nvPr>
+        </p:nvSpPr>
+        <p:spPr/>
+        <p:txBody>
+          <a:bodyPr/>
+          <a:lstStyle/>
+          <a:p>
+            <a:r>
+              <a:rPr lang="en-US" dirty="0" smtClean="0"/>
+              <a:t>Meeting: </a:t>
+            </a:r>
+            <a:r>
+              <a:rPr lang="en-US" dirty="0" smtClean="0"/>
+              <a:t>22</a:t>
+            </a:r>
+            <a:r>
+              <a:rPr lang="en-US" dirty="0" smtClean="0"/>
+              <a:t>.02.21</a:t>
+            </a:r>
+            <a:endParaRPr lang="en-US" dirty="0"/>
+          </a:p>
+        </p:txBody>
+      </p:sp>
+      <p:sp>
+        <p:nvSpPr>
+          <p:cNvPr id="3" name="Textfeld 2"/>
+          <p:cNvSpPr txBox="1"/>
+          <p:nvPr/>
+        </p:nvSpPr>
+        <p:spPr>
+          <a:xfrm>
+            <a:off x="457200" y="1181365"/>
+            <a:ext cx="8229600" cy="369332"/>
+          </a:xfrm>
+          <a:prstGeom prst="rect">
+            <a:avLst/>
+          </a:prstGeom>
+          <a:noFill/>
+        </p:spPr>
+        <p:txBody>
+          <a:bodyPr wrap="square" rtlCol="0">
+            <a:spAutoFit/>
+          </a:bodyPr>
+          <a:lstStyle/>
+          <a:p>
+            <a:pPr marL="285750" indent="-285750">
+              <a:buFont typeface="Arial"/>
+              <a:buChar char="•"/>
+            </a:pPr>
+            <a:r>
+              <a:rPr lang="de-DE" dirty="0" smtClean="0"/>
+              <a:t>...</a:t>
+            </a:r>
+            <a:endParaRPr lang="en-US" dirty="0" smtClean="0"/>
+          </a:p>
+        </p:txBody>
+      </p:sp>
+    </p:spTree>
+    <p:extLst>
+      <p:ext uri="{BB962C8B-B14F-4D97-AF65-F5344CB8AC3E}">
+        <p14:creationId xmlns:p14="http://schemas.microsoft.com/office/powerpoint/2010/main" val="831482385"/>
       </p:ext>
     </p:extLst>
   </p:cSld>
@@ -9613,11 +10200,7 @@
             </a:r>
             <a:r>
               <a:rPr lang="en-US" dirty="0" smtClean="0"/>
-              <a:t>)</a:t>
-            </a:r>
-            <a:r>
-              <a:rPr lang="en-US" dirty="0" smtClean="0"/>
-              <a:t>:</a:t>
+              <a:t>):</a:t>
             </a:r>
             <a:r>
               <a:rPr lang="en-US" dirty="0" err="1" smtClean="0"/>
@@ -9872,7 +10455,6 @@
               <a:rPr lang="en-US" dirty="0" smtClean="0"/>
               <a:t>? </a:t>
             </a:r>
-            <a:endParaRPr lang="en-US" dirty="0" smtClean="0"/>
           </a:p>
           <a:p>
             <a:endParaRPr lang="en-US" dirty="0" smtClean="0"/>
@@ -9905,11 +10487,7 @@
             <a:pPr algn="l"/>
             <a:r>
               <a:rPr lang="en-US" dirty="0" smtClean="0"/>
-              <a:t>08</a:t>
-            </a:r>
-            <a:r>
-              <a:rPr lang="en-US" dirty="0" smtClean="0"/>
-              <a:t>.02.21</a:t>
+              <a:t>08.02.21</a:t>
             </a:r>
             <a:endParaRPr lang="en-US" dirty="0"/>
           </a:p>

</xml_diff>

<commit_message>
new ACE code and meeting notes
</commit_message>
<xml_diff>
--- a/MeetingNotes.pptx
+++ b/MeetingNotes.pptx
@@ -19,6 +19,8 @@
     <p:sldId id="267" r:id="rId13"/>
     <p:sldId id="268" r:id="rId14"/>
     <p:sldId id="269" r:id="rId15"/>
+    <p:sldId id="271" r:id="rId16"/>
+    <p:sldId id="270" r:id="rId17"/>
   </p:sldIdLst>
   <p:sldSz cx="9144000" cy="5715000" type="screen16x10"/>
   <p:notesSz cx="6858000" cy="9144000"/>
@@ -642,7 +644,7 @@
           <a:p>
             <a:fld id="{907AEC89-51F8-8C49-8F5C-7B8970AE8955}" type="datetimeFigureOut">
               <a:rPr lang="de-DE" smtClean="0"/>
-              <a:t>08.03.21</a:t>
+              <a:t>18.03.21</a:t>
             </a:fld>
             <a:endParaRPr lang="en-US"/>
           </a:p>
@@ -812,7 +814,7 @@
           <a:p>
             <a:fld id="{907AEC89-51F8-8C49-8F5C-7B8970AE8955}" type="datetimeFigureOut">
               <a:rPr lang="de-DE" smtClean="0"/>
-              <a:t>08.03.21</a:t>
+              <a:t>18.03.21</a:t>
             </a:fld>
             <a:endParaRPr lang="en-US"/>
           </a:p>
@@ -992,7 +994,7 @@
           <a:p>
             <a:fld id="{907AEC89-51F8-8C49-8F5C-7B8970AE8955}" type="datetimeFigureOut">
               <a:rPr lang="de-DE" smtClean="0"/>
-              <a:t>08.03.21</a:t>
+              <a:t>18.03.21</a:t>
             </a:fld>
             <a:endParaRPr lang="en-US"/>
           </a:p>
@@ -1110,7 +1112,7 @@
           <a:p>
             <a:fld id="{907AEC89-51F8-8C49-8F5C-7B8970AE8955}" type="datetimeFigureOut">
               <a:rPr lang="de-DE" smtClean="0"/>
-              <a:t>08.03.21</a:t>
+              <a:t>18.03.21</a:t>
             </a:fld>
             <a:endParaRPr lang="en-US"/>
           </a:p>
@@ -1430,7 +1432,7 @@
           <a:p>
             <a:fld id="{907AEC89-51F8-8C49-8F5C-7B8970AE8955}" type="datetimeFigureOut">
               <a:rPr lang="de-DE" smtClean="0"/>
-              <a:t>08.03.21</a:t>
+              <a:t>18.03.21</a:t>
             </a:fld>
             <a:endParaRPr lang="en-US"/>
           </a:p>
@@ -1982,7 +1984,7 @@
           <a:p>
             <a:fld id="{907AEC89-51F8-8C49-8F5C-7B8970AE8955}" type="datetimeFigureOut">
               <a:rPr lang="de-DE" smtClean="0"/>
-              <a:t>08.03.21</a:t>
+              <a:t>18.03.21</a:t>
             </a:fld>
             <a:endParaRPr lang="en-US"/>
           </a:p>
@@ -2404,7 +2406,7 @@
           <a:p>
             <a:fld id="{907AEC89-51F8-8C49-8F5C-7B8970AE8955}" type="datetimeFigureOut">
               <a:rPr lang="de-DE" smtClean="0"/>
-              <a:t>08.03.21</a:t>
+              <a:t>18.03.21</a:t>
             </a:fld>
             <a:endParaRPr lang="en-US"/>
           </a:p>
@@ -2522,7 +2524,7 @@
           <a:p>
             <a:fld id="{907AEC89-51F8-8C49-8F5C-7B8970AE8955}" type="datetimeFigureOut">
               <a:rPr lang="de-DE" smtClean="0"/>
-              <a:t>08.03.21</a:t>
+              <a:t>18.03.21</a:t>
             </a:fld>
             <a:endParaRPr lang="en-US"/>
           </a:p>
@@ -2617,7 +2619,7 @@
           <a:p>
             <a:fld id="{907AEC89-51F8-8C49-8F5C-7B8970AE8955}" type="datetimeFigureOut">
               <a:rPr lang="de-DE" smtClean="0"/>
-              <a:t>08.03.21</a:t>
+              <a:t>18.03.21</a:t>
             </a:fld>
             <a:endParaRPr lang="en-US"/>
           </a:p>
@@ -2894,7 +2896,7 @@
           <a:p>
             <a:fld id="{907AEC89-51F8-8C49-8F5C-7B8970AE8955}" type="datetimeFigureOut">
               <a:rPr lang="de-DE" smtClean="0"/>
-              <a:t>08.03.21</a:t>
+              <a:t>18.03.21</a:t>
             </a:fld>
             <a:endParaRPr lang="en-US"/>
           </a:p>
@@ -3107,7 +3109,7 @@
           <a:p>
             <a:fld id="{907AEC89-51F8-8C49-8F5C-7B8970AE8955}" type="datetimeFigureOut">
               <a:rPr lang="de-DE" smtClean="0"/>
-              <a:t>08.03.21</a:t>
+              <a:t>18.03.21</a:t>
             </a:fld>
             <a:endParaRPr lang="en-US"/>
           </a:p>
@@ -5637,7 +5639,6 @@
               <a:rPr lang="en-US" dirty="0" smtClean="0"/>
               <a:t> die Activations </a:t>
             </a:r>
-            <a:endParaRPr lang="en-US" dirty="0" smtClean="0"/>
           </a:p>
           <a:p>
             <a:pPr lvl="1"/>
@@ -5667,11 +5668,7 @@
             <a:pPr algn="l"/>
             <a:r>
               <a:rPr lang="en-US" dirty="0" smtClean="0"/>
-              <a:t>08</a:t>
-            </a:r>
-            <a:r>
-              <a:rPr lang="en-US" dirty="0" smtClean="0"/>
-              <a:t>.03.21</a:t>
+              <a:t>08.03.21</a:t>
             </a:r>
             <a:endParaRPr lang="en-US" dirty="0"/>
           </a:p>
@@ -5747,11 +5744,7 @@
           <a:p>
             <a:r>
               <a:rPr lang="en-US" dirty="0" smtClean="0"/>
-              <a:t>Meeting: </a:t>
-            </a:r>
-            <a:r>
-              <a:rPr lang="en-US" dirty="0" smtClean="0"/>
-              <a:t>08.03.21</a:t>
+              <a:t>Meeting: 08.03.21</a:t>
             </a:r>
             <a:endParaRPr lang="en-US" dirty="0"/>
           </a:p>
@@ -6125,11 +6118,7 @@
             </a:r>
             <a:r>
               <a:rPr lang="en-US" dirty="0" err="1" smtClean="0"/>
-              <a:t>ein</a:t>
-            </a:r>
-            <a:r>
-              <a:rPr lang="en-US" dirty="0" err="1" smtClean="0"/>
-              <a:t>e</a:t>
+              <a:t>eine</a:t>
             </a:r>
             <a:r>
               <a:rPr lang="en-US" dirty="0" smtClean="0"/>
@@ -6554,6 +6543,493 @@
     <p:extLst>
       <p:ext uri="{BB962C8B-B14F-4D97-AF65-F5344CB8AC3E}">
         <p14:creationId xmlns:p14="http://schemas.microsoft.com/office/powerpoint/2010/main" val="2343675515"/>
+      </p:ext>
+    </p:extLst>
+  </p:cSld>
+  <p:clrMapOvr>
+    <a:masterClrMapping/>
+  </p:clrMapOvr>
+</p:sld>
+</file>
+
+<file path=ppt/slides/slide15.xml><?xml version="1.0" encoding="utf-8"?>
+<p:sld xmlns:a="http://schemas.openxmlformats.org/drawingml/2006/main" xmlns:r="http://schemas.openxmlformats.org/officeDocument/2006/relationships" xmlns:p="http://schemas.openxmlformats.org/presentationml/2006/main">
+  <p:cSld>
+    <p:spTree>
+      <p:nvGrpSpPr>
+        <p:cNvPr id="1" name=""/>
+        <p:cNvGrpSpPr/>
+        <p:nvPr/>
+      </p:nvGrpSpPr>
+      <p:grpSpPr>
+        <a:xfrm>
+          <a:off x="0" y="0"/>
+          <a:ext cx="0" cy="0"/>
+          <a:chOff x="0" y="0"/>
+          <a:chExt cx="0" cy="0"/>
+        </a:xfrm>
+      </p:grpSpPr>
+      <p:sp>
+        <p:nvSpPr>
+          <p:cNvPr id="2" name="Inhaltsplatzhalter 1"/>
+          <p:cNvSpPr>
+            <a:spLocks noGrp="1"/>
+          </p:cNvSpPr>
+          <p:nvPr>
+            <p:ph sz="half" idx="1"/>
+          </p:nvPr>
+        </p:nvSpPr>
+        <p:spPr/>
+        <p:txBody>
+          <a:bodyPr>
+            <a:normAutofit/>
+          </a:bodyPr>
+          <a:lstStyle/>
+          <a:p>
+            <a:r>
+              <a:rPr lang="en-US" dirty="0" err="1" smtClean="0"/>
+              <a:t>Hab</a:t>
+            </a:r>
+            <a:r>
+              <a:rPr lang="en-US" dirty="0" smtClean="0"/>
+              <a:t> </a:t>
+            </a:r>
+            <a:r>
+              <a:rPr lang="en-US" dirty="0" err="1" smtClean="0"/>
+              <a:t>mich</a:t>
+            </a:r>
+            <a:r>
+              <a:rPr lang="en-US" dirty="0" smtClean="0"/>
+              <a:t> </a:t>
+            </a:r>
+            <a:r>
+              <a:rPr lang="en-US" dirty="0" err="1" smtClean="0"/>
+              <a:t>viel</a:t>
+            </a:r>
+            <a:r>
+              <a:rPr lang="en-US" dirty="0" smtClean="0"/>
+              <a:t> </a:t>
+            </a:r>
+            <a:r>
+              <a:rPr lang="en-US" dirty="0" err="1" smtClean="0"/>
+              <a:t>mit</a:t>
+            </a:r>
+            <a:r>
+              <a:rPr lang="en-US" dirty="0" smtClean="0"/>
+              <a:t> der </a:t>
+            </a:r>
+            <a:r>
+              <a:rPr lang="en-US" dirty="0" err="1" smtClean="0"/>
+              <a:t>mathematik</a:t>
+            </a:r>
+            <a:r>
+              <a:rPr lang="en-US" dirty="0" smtClean="0"/>
+              <a:t> und </a:t>
+            </a:r>
+            <a:r>
+              <a:rPr lang="en-US" dirty="0" err="1" smtClean="0"/>
+              <a:t>wie</a:t>
+            </a:r>
+            <a:r>
+              <a:rPr lang="en-US" dirty="0" smtClean="0"/>
+              <a:t> man das </a:t>
+            </a:r>
+            <a:r>
+              <a:rPr lang="en-US" dirty="0" err="1" smtClean="0"/>
+              <a:t>implmentiert</a:t>
+            </a:r>
+            <a:r>
+              <a:rPr lang="en-US" dirty="0" smtClean="0"/>
+              <a:t> </a:t>
+            </a:r>
+            <a:r>
+              <a:rPr lang="en-US" dirty="0" err="1" smtClean="0"/>
+              <a:t>auseinadner</a:t>
+            </a:r>
+            <a:r>
+              <a:rPr lang="en-US" dirty="0" smtClean="0"/>
+              <a:t> </a:t>
+            </a:r>
+            <a:r>
+              <a:rPr lang="en-US" dirty="0" err="1" smtClean="0"/>
+              <a:t>gesetzt</a:t>
+            </a:r>
+            <a:r>
+              <a:rPr lang="en-US" dirty="0" smtClean="0"/>
+              <a:t> </a:t>
+            </a:r>
+          </a:p>
+          <a:p>
+            <a:r>
+              <a:rPr lang="en-US" dirty="0" err="1" smtClean="0"/>
+              <a:t>Miro</a:t>
+            </a:r>
+            <a:r>
+              <a:rPr lang="en-US" dirty="0" smtClean="0"/>
+              <a:t> board </a:t>
+            </a:r>
+            <a:r>
+              <a:rPr lang="en-US" dirty="0" err="1" smtClean="0"/>
+              <a:t>kurz</a:t>
+            </a:r>
+            <a:r>
+              <a:rPr lang="en-US" dirty="0" smtClean="0"/>
+              <a:t> flo</a:t>
+            </a:r>
+            <a:r>
+              <a:rPr lang="en-US" dirty="0" smtClean="0"/>
+              <a:t>w chart &amp; code </a:t>
+            </a:r>
+            <a:r>
+              <a:rPr lang="en-US" dirty="0" err="1" smtClean="0"/>
+              <a:t>zeigen</a:t>
+            </a:r>
+            <a:r>
+              <a:rPr lang="en-US" dirty="0" smtClean="0"/>
+              <a:t>: feedback </a:t>
+            </a:r>
+            <a:r>
+              <a:rPr lang="en-US" dirty="0" err="1" smtClean="0"/>
+              <a:t>einholen</a:t>
+            </a:r>
+            <a:r>
+              <a:rPr lang="en-US" dirty="0" smtClean="0"/>
+              <a:t> + </a:t>
+            </a:r>
+            <a:r>
+              <a:rPr lang="en-US" dirty="0" err="1" smtClean="0"/>
+              <a:t>zeigen</a:t>
+            </a:r>
+            <a:r>
+              <a:rPr lang="en-US" dirty="0" smtClean="0"/>
+              <a:t> was </a:t>
+            </a:r>
+            <a:r>
+              <a:rPr lang="en-US" dirty="0" err="1" smtClean="0"/>
+              <a:t>ich</a:t>
+            </a:r>
+            <a:r>
+              <a:rPr lang="en-US" dirty="0" smtClean="0"/>
+              <a:t> da </a:t>
+            </a:r>
+            <a:r>
+              <a:rPr lang="en-US" dirty="0" err="1" smtClean="0"/>
+              <a:t>mache</a:t>
+            </a:r>
+            <a:endParaRPr lang="en-US" dirty="0" smtClean="0"/>
+          </a:p>
+          <a:p>
+            <a:pPr marL="0" indent="0">
+              <a:buNone/>
+            </a:pPr>
+            <a:endParaRPr lang="en-US" dirty="0" smtClean="0"/>
+          </a:p>
+          <a:p>
+            <a:endParaRPr lang="en-US" dirty="0"/>
+          </a:p>
+          <a:p>
+            <a:r>
+              <a:rPr lang="en-US" dirty="0" smtClean="0"/>
+              <a:t>Next Steps:</a:t>
+            </a:r>
+          </a:p>
+          <a:p>
+            <a:pPr lvl="1"/>
+            <a:r>
+              <a:rPr lang="en-US" dirty="0" smtClean="0"/>
+              <a:t>Lit review </a:t>
+            </a:r>
+            <a:r>
+              <a:rPr lang="en-US" dirty="0" err="1" smtClean="0"/>
+              <a:t>korrigieren</a:t>
+            </a:r>
+            <a:r>
+              <a:rPr lang="en-US" dirty="0" smtClean="0"/>
+              <a:t> </a:t>
+            </a:r>
+          </a:p>
+          <a:p>
+            <a:pPr lvl="1"/>
+            <a:r>
+              <a:rPr lang="en-US" dirty="0" smtClean="0"/>
+              <a:t>ACE </a:t>
+            </a:r>
+            <a:r>
+              <a:rPr lang="en-US" dirty="0" err="1" smtClean="0"/>
+              <a:t>implementieren</a:t>
+            </a:r>
+            <a:endParaRPr lang="en-US" dirty="0" smtClean="0"/>
+          </a:p>
+          <a:p>
+            <a:pPr lvl="1"/>
+            <a:endParaRPr lang="en-US" dirty="0" smtClean="0"/>
+          </a:p>
+          <a:p>
+            <a:pPr lvl="1"/>
+            <a:endParaRPr lang="en-US" dirty="0" smtClean="0"/>
+          </a:p>
+        </p:txBody>
+      </p:sp>
+      <p:sp>
+        <p:nvSpPr>
+          <p:cNvPr id="3" name="Titel 2"/>
+          <p:cNvSpPr>
+            <a:spLocks noGrp="1"/>
+          </p:cNvSpPr>
+          <p:nvPr>
+            <p:ph type="title"/>
+          </p:nvPr>
+        </p:nvSpPr>
+        <p:spPr/>
+        <p:txBody>
+          <a:bodyPr/>
+          <a:lstStyle/>
+          <a:p>
+            <a:pPr algn="l"/>
+            <a:r>
+              <a:rPr lang="en-US" dirty="0" smtClean="0"/>
+              <a:t>22</a:t>
+            </a:r>
+            <a:r>
+              <a:rPr lang="en-US" dirty="0" smtClean="0"/>
+              <a:t>.03.21</a:t>
+            </a:r>
+            <a:endParaRPr lang="en-US" dirty="0"/>
+          </a:p>
+        </p:txBody>
+      </p:sp>
+      <p:sp>
+        <p:nvSpPr>
+          <p:cNvPr id="4" name="Inhaltsplatzhalter 3"/>
+          <p:cNvSpPr>
+            <a:spLocks noGrp="1"/>
+          </p:cNvSpPr>
+          <p:nvPr>
+            <p:ph sz="half" idx="10"/>
+          </p:nvPr>
+        </p:nvSpPr>
+        <p:spPr/>
+        <p:txBody>
+          <a:bodyPr/>
+          <a:lstStyle/>
+          <a:p>
+            <a:r>
+              <a:rPr lang="en-US" dirty="0" err="1"/>
+              <a:t>Nach</a:t>
+            </a:r>
+            <a:r>
+              <a:rPr lang="en-US" dirty="0"/>
+              <a:t> </a:t>
+            </a:r>
+            <a:r>
+              <a:rPr lang="en-US" dirty="0" err="1"/>
+              <a:t>dem</a:t>
+            </a:r>
+            <a:r>
+              <a:rPr lang="en-US" dirty="0"/>
+              <a:t> </a:t>
+            </a:r>
+            <a:r>
+              <a:rPr lang="en-US" dirty="0" err="1"/>
+              <a:t>Tr</a:t>
+            </a:r>
+            <a:r>
+              <a:rPr lang="en-US" dirty="0"/>
+              <a:t> </a:t>
+            </a:r>
+            <a:r>
+              <a:rPr lang="en-US" dirty="0" err="1"/>
+              <a:t>fragen</a:t>
+            </a:r>
+            <a:r>
+              <a:rPr lang="en-US" dirty="0"/>
+              <a:t> (</a:t>
+            </a:r>
+            <a:r>
+              <a:rPr lang="en-US" dirty="0" err="1"/>
+              <a:t>ist</a:t>
+            </a:r>
+            <a:r>
+              <a:rPr lang="en-US" dirty="0"/>
+              <a:t> das die trace?</a:t>
+            </a:r>
+            <a:r>
+              <a:rPr lang="en-US" dirty="0" smtClean="0"/>
+              <a:t>)</a:t>
+            </a:r>
+          </a:p>
+          <a:p>
+            <a:r>
+              <a:rPr lang="en-US" dirty="0" smtClean="0"/>
+              <a:t>Neuron activation </a:t>
+            </a:r>
+            <a:r>
+              <a:rPr lang="en-US" dirty="0" err="1" smtClean="0"/>
+              <a:t>ist</a:t>
+            </a:r>
+            <a:r>
+              <a:rPr lang="en-US" dirty="0" smtClean="0"/>
+              <a:t> </a:t>
+            </a:r>
+            <a:r>
+              <a:rPr lang="en-US" dirty="0" err="1" smtClean="0"/>
+              <a:t>schon</a:t>
+            </a:r>
+            <a:r>
+              <a:rPr lang="en-US" dirty="0" smtClean="0"/>
+              <a:t> das was </a:t>
+            </a:r>
+            <a:r>
+              <a:rPr lang="en-US" dirty="0" err="1" smtClean="0"/>
+              <a:t>ich</a:t>
+            </a:r>
+            <a:r>
+              <a:rPr lang="en-US" dirty="0" smtClean="0"/>
+              <a:t> </a:t>
+            </a:r>
+            <a:r>
+              <a:rPr lang="en-US" dirty="0" err="1" smtClean="0"/>
+              <a:t>denke</a:t>
+            </a:r>
+            <a:r>
+              <a:rPr lang="en-US" dirty="0" smtClean="0"/>
+              <a:t>?/ </a:t>
+            </a:r>
+            <a:r>
+              <a:rPr lang="en-US" dirty="0" err="1" smtClean="0"/>
+              <a:t>oder</a:t>
+            </a:r>
+            <a:r>
+              <a:rPr lang="en-US" dirty="0" smtClean="0"/>
+              <a:t> </a:t>
+            </a:r>
+            <a:r>
+              <a:rPr lang="en-US" dirty="0" err="1" smtClean="0"/>
+              <a:t>macht</a:t>
+            </a:r>
+            <a:r>
+              <a:rPr lang="en-US" dirty="0" smtClean="0"/>
+              <a:t> </a:t>
+            </a:r>
+            <a:r>
+              <a:rPr lang="en-US" dirty="0" err="1" smtClean="0"/>
+              <a:t>es</a:t>
+            </a:r>
+            <a:r>
+              <a:rPr lang="en-US" dirty="0" smtClean="0"/>
+              <a:t> Sinn den training gradient </a:t>
+            </a:r>
+            <a:r>
+              <a:rPr lang="en-US" dirty="0" err="1" smtClean="0"/>
+              <a:t>anzuschauen</a:t>
+            </a:r>
+            <a:r>
+              <a:rPr lang="en-US" dirty="0" smtClean="0"/>
+              <a:t>?</a:t>
+            </a:r>
+            <a:endParaRPr lang="en-US" dirty="0"/>
+          </a:p>
+        </p:txBody>
+      </p:sp>
+    </p:spTree>
+    <p:extLst>
+      <p:ext uri="{BB962C8B-B14F-4D97-AF65-F5344CB8AC3E}">
+        <p14:creationId xmlns:p14="http://schemas.microsoft.com/office/powerpoint/2010/main" val="2216381543"/>
+      </p:ext>
+    </p:extLst>
+  </p:cSld>
+  <p:clrMapOvr>
+    <a:masterClrMapping/>
+  </p:clrMapOvr>
+</p:sld>
+</file>
+
+<file path=ppt/slides/slide16.xml><?xml version="1.0" encoding="utf-8"?>
+<p:sld xmlns:a="http://schemas.openxmlformats.org/drawingml/2006/main" xmlns:r="http://schemas.openxmlformats.org/officeDocument/2006/relationships" xmlns:p="http://schemas.openxmlformats.org/presentationml/2006/main">
+  <p:cSld>
+    <p:spTree>
+      <p:nvGrpSpPr>
+        <p:cNvPr id="1" name=""/>
+        <p:cNvGrpSpPr/>
+        <p:nvPr/>
+      </p:nvGrpSpPr>
+      <p:grpSpPr>
+        <a:xfrm>
+          <a:off x="0" y="0"/>
+          <a:ext cx="0" cy="0"/>
+          <a:chOff x="0" y="0"/>
+          <a:chExt cx="0" cy="0"/>
+        </a:xfrm>
+      </p:grpSpPr>
+      <p:sp>
+        <p:nvSpPr>
+          <p:cNvPr id="2" name="Titel 1"/>
+          <p:cNvSpPr>
+            <a:spLocks noGrp="1"/>
+          </p:cNvSpPr>
+          <p:nvPr>
+            <p:ph type="title"/>
+          </p:nvPr>
+        </p:nvSpPr>
+        <p:spPr/>
+        <p:txBody>
+          <a:bodyPr/>
+          <a:lstStyle/>
+          <a:p>
+            <a:r>
+              <a:rPr lang="en-US" dirty="0" smtClean="0"/>
+              <a:t>Meeting: </a:t>
+            </a:r>
+            <a:r>
+              <a:rPr lang="en-US" dirty="0" smtClean="0"/>
+              <a:t>22</a:t>
+            </a:r>
+            <a:r>
+              <a:rPr lang="en-US" dirty="0" smtClean="0"/>
+              <a:t>.03.21</a:t>
+            </a:r>
+            <a:endParaRPr lang="en-US" dirty="0"/>
+          </a:p>
+        </p:txBody>
+      </p:sp>
+      <p:sp>
+        <p:nvSpPr>
+          <p:cNvPr id="3" name="Textfeld 2"/>
+          <p:cNvSpPr txBox="1"/>
+          <p:nvPr/>
+        </p:nvSpPr>
+        <p:spPr>
+          <a:xfrm>
+            <a:off x="457200" y="1181365"/>
+            <a:ext cx="8229600" cy="369332"/>
+          </a:xfrm>
+          <a:prstGeom prst="rect">
+            <a:avLst/>
+          </a:prstGeom>
+          <a:noFill/>
+        </p:spPr>
+        <p:txBody>
+          <a:bodyPr wrap="square" rtlCol="0">
+            <a:spAutoFit/>
+          </a:bodyPr>
+          <a:lstStyle/>
+          <a:p>
+            <a:pPr marL="285750" indent="-285750">
+              <a:buFont typeface="Arial"/>
+              <a:buChar char="•"/>
+            </a:pPr>
+            <a:r>
+              <a:rPr lang="mr-IN" dirty="0" smtClean="0"/>
+              <a:t>…</a:t>
+            </a:r>
+            <a:endParaRPr lang="en-US" dirty="0" smtClean="0"/>
+          </a:p>
+        </p:txBody>
+      </p:sp>
+    </p:spTree>
+    <p:extLst>
+      <p:ext uri="{BB962C8B-B14F-4D97-AF65-F5344CB8AC3E}">
+        <p14:creationId xmlns:p14="http://schemas.microsoft.com/office/powerpoint/2010/main" val="411533227"/>
       </p:ext>
     </p:extLst>
   </p:cSld>

</xml_diff>